<commit_message>
- Atualiza apresentação e checklist
</commit_message>
<xml_diff>
--- a/Documentos/Apresentação -Gestão de Academia.pptx
+++ b/Documentos/Apresentação -Gestão de Academia.pptx
@@ -5,7 +5,7 @@
     <p:sldMasterId id="2147483660" r:id="rId1"/>
   </p:sldMasterIdLst>
   <p:notesMasterIdLst>
-    <p:notesMasterId r:id="rId21"/>
+    <p:notesMasterId r:id="rId22"/>
   </p:notesMasterIdLst>
   <p:sldIdLst>
     <p:sldId id="256" r:id="rId2"/>
@@ -23,10 +23,11 @@
     <p:sldId id="274" r:id="rId14"/>
     <p:sldId id="275" r:id="rId15"/>
     <p:sldId id="276" r:id="rId16"/>
-    <p:sldId id="277" r:id="rId17"/>
-    <p:sldId id="260" r:id="rId18"/>
-    <p:sldId id="278" r:id="rId19"/>
-    <p:sldId id="279" r:id="rId20"/>
+    <p:sldId id="283" r:id="rId17"/>
+    <p:sldId id="277" r:id="rId18"/>
+    <p:sldId id="260" r:id="rId19"/>
+    <p:sldId id="278" r:id="rId20"/>
+    <p:sldId id="279" r:id="rId21"/>
   </p:sldIdLst>
   <p:sldSz cx="12192000" cy="6858000"/>
   <p:notesSz cx="6858000" cy="9144000"/>
@@ -566,6 +567,90 @@
 </p:notes>
 </file>
 
+<file path=ppt/notesSlides/notesSlide10.xml><?xml version="1.0" encoding="utf-8"?>
+<p:notes xmlns:a="http://schemas.openxmlformats.org/drawingml/2006/main" xmlns:r="http://schemas.openxmlformats.org/officeDocument/2006/relationships" xmlns:p="http://schemas.openxmlformats.org/presentationml/2006/main">
+  <p:cSld>
+    <p:spTree>
+      <p:nvGrpSpPr>
+        <p:cNvPr id="1" name=""/>
+        <p:cNvGrpSpPr/>
+        <p:nvPr/>
+      </p:nvGrpSpPr>
+      <p:grpSpPr>
+        <a:xfrm>
+          <a:off x="0" y="0"/>
+          <a:ext cx="0" cy="0"/>
+          <a:chOff x="0" y="0"/>
+          <a:chExt cx="0" cy="0"/>
+        </a:xfrm>
+      </p:grpSpPr>
+      <p:sp>
+        <p:nvSpPr>
+          <p:cNvPr id="2" name="Espaço Reservado para Imagem de Slide 1"/>
+          <p:cNvSpPr>
+            <a:spLocks noGrp="1" noRot="1" noChangeAspect="1"/>
+          </p:cNvSpPr>
+          <p:nvPr>
+            <p:ph type="sldImg"/>
+          </p:nvPr>
+        </p:nvSpPr>
+        <p:spPr/>
+      </p:sp>
+      <p:sp>
+        <p:nvSpPr>
+          <p:cNvPr id="3" name="Espaço Reservado para Anotações 2"/>
+          <p:cNvSpPr>
+            <a:spLocks noGrp="1"/>
+          </p:cNvSpPr>
+          <p:nvPr>
+            <p:ph type="body" idx="1"/>
+          </p:nvPr>
+        </p:nvSpPr>
+        <p:spPr/>
+        <p:txBody>
+          <a:bodyPr/>
+          <a:lstStyle/>
+          <a:p>
+            <a:endParaRPr lang="pt-BR" dirty="0"/>
+          </a:p>
+        </p:txBody>
+      </p:sp>
+      <p:sp>
+        <p:nvSpPr>
+          <p:cNvPr id="4" name="Espaço Reservado para Número de Slide 3"/>
+          <p:cNvSpPr>
+            <a:spLocks noGrp="1"/>
+          </p:cNvSpPr>
+          <p:nvPr>
+            <p:ph type="sldNum" sz="quarter" idx="5"/>
+          </p:nvPr>
+        </p:nvSpPr>
+        <p:spPr/>
+        <p:txBody>
+          <a:bodyPr/>
+          <a:lstStyle/>
+          <a:p>
+            <a:fld id="{3116101D-3B63-9249-8DE5-B89A0CA224DC}" type="slidenum">
+              <a:rPr lang="pt-BR" smtClean="0"/>
+              <a:t>17</a:t>
+            </a:fld>
+            <a:endParaRPr lang="pt-BR"/>
+          </a:p>
+        </p:txBody>
+      </p:sp>
+    </p:spTree>
+    <p:extLst>
+      <p:ext uri="{BB962C8B-B14F-4D97-AF65-F5344CB8AC3E}">
+        <p14:creationId xmlns:p14="http://schemas.microsoft.com/office/powerpoint/2010/main" val="1940073983"/>
+      </p:ext>
+    </p:extLst>
+  </p:cSld>
+  <p:clrMapOvr>
+    <a:masterClrMapping/>
+  </p:clrMapOvr>
+</p:notes>
+</file>
+
 <file path=ppt/notesSlides/notesSlide2.xml><?xml version="1.0" encoding="utf-8"?>
 <p:notes xmlns:a="http://schemas.openxmlformats.org/drawingml/2006/main" xmlns:r="http://schemas.openxmlformats.org/officeDocument/2006/relationships" xmlns:p="http://schemas.openxmlformats.org/presentationml/2006/main">
   <p:cSld>
@@ -1228,7 +1313,7 @@
     </p:spTree>
     <p:extLst>
       <p:ext uri="{BB962C8B-B14F-4D97-AF65-F5344CB8AC3E}">
-        <p14:creationId xmlns:p14="http://schemas.microsoft.com/office/powerpoint/2010/main" val="1940073983"/>
+        <p14:creationId xmlns:p14="http://schemas.microsoft.com/office/powerpoint/2010/main" val="870660966"/>
       </p:ext>
     </p:extLst>
   </p:cSld>
@@ -7533,7 +7618,7 @@
           <a:p>
             <a:r>
               <a:rPr lang="pt-BR" b="1" dirty="0"/>
-              <a:t>RELATORIO – Aniversariantes do mês</a:t>
+              <a:t>RELATORIO – Gráfico Top Salários por Setor</a:t>
             </a:r>
             <a:br>
               <a:rPr lang="pt-BR" dirty="0">
@@ -7572,7 +7657,7 @@
           </a:bodyPr>
           <a:lstStyle/>
           <a:p>
-            <a:pPr>
+            <a:pPr algn="just">
               <a:spcBef>
                 <a:spcPts val="1125"/>
               </a:spcBef>
@@ -7584,8 +7669,15 @@
               <a:rPr lang="pt-BR" dirty="0">
                 <a:effectLst/>
               </a:rPr>
-              <a:t>Aniversariantes do mês: Permite a visualização da relação de aniversariantes a partir da definição do mês.</a:t>
-            </a:r>
+              <a:t>Gráfico Maiores Salários por setor: Permite a visualização dos Top salários por </a:t>
+            </a:r>
+            <a:r>
+              <a:rPr lang="pt-BR" dirty="0"/>
+              <a:t>cargo e setor, definindo a quantidade de linhas a ser plotada.</a:t>
+            </a:r>
+            <a:endParaRPr lang="pt-BR" dirty="0">
+              <a:effectLst/>
+            </a:endParaRPr>
           </a:p>
         </p:txBody>
       </p:sp>
@@ -7607,7 +7699,7 @@
         </p:nvSpPr>
         <p:spPr>
           <a:xfrm>
-            <a:off x="3917581" y="6308355"/>
+            <a:off x="4155819" y="6288805"/>
             <a:ext cx="6598019" cy="365125"/>
           </a:xfrm>
         </p:spPr>
@@ -7632,21 +7724,8 @@
             </a:r>
             <a:r>
               <a:rPr lang="en-US" b="1" dirty="0"/>
-              <a:t> de RELATORIO DOS </a:t>
-            </a:r>
-            <a:r>
-              <a:rPr lang="en-US" b="1" dirty="0" err="1"/>
-              <a:t>aniversariantes</a:t>
-            </a:r>
-            <a:r>
-              <a:rPr lang="en-US" b="1" dirty="0"/>
-              <a:t> do </a:t>
-            </a:r>
-            <a:r>
-              <a:rPr lang="en-US" b="1" dirty="0" err="1"/>
-              <a:t>mes</a:t>
-            </a:r>
-            <a:endParaRPr lang="en-US" b="1" dirty="0"/>
+              <a:t> de RELATORIO DOS MAIORES SALARIOS POR CARGO E SETOR</a:t>
+            </a:r>
           </a:p>
         </p:txBody>
       </p:sp>
@@ -7691,6 +7770,259 @@
                 </a:spcAft>
               </a:pPr>
               <a:t>16</a:t>
+            </a:fld>
+            <a:endParaRPr lang="en-US"/>
+          </a:p>
+        </p:txBody>
+      </p:sp>
+      <p:pic>
+        <p:nvPicPr>
+          <p:cNvPr id="10" name="Imagem 9" descr="Gráfico&#10;&#10;Descrição gerada automaticamente">
+            <a:extLst>
+              <a:ext uri="{FF2B5EF4-FFF2-40B4-BE49-F238E27FC236}">
+                <a16:creationId xmlns:a16="http://schemas.microsoft.com/office/drawing/2014/main" id="{53591E66-7A3D-E44F-8209-EE5F9FEF0527}"/>
+              </a:ext>
+            </a:extLst>
+          </p:cNvPr>
+          <p:cNvPicPr>
+            <a:picLocks noChangeAspect="1"/>
+          </p:cNvPicPr>
+          <p:nvPr/>
+        </p:nvPicPr>
+        <p:blipFill>
+          <a:blip r:embed="rId3"/>
+          <a:stretch>
+            <a:fillRect/>
+          </a:stretch>
+        </p:blipFill>
+        <p:spPr>
+          <a:xfrm>
+            <a:off x="4266392" y="1456700"/>
+            <a:ext cx="6960407" cy="4812732"/>
+          </a:xfrm>
+          <a:prstGeom prst="rect">
+            <a:avLst/>
+          </a:prstGeom>
+        </p:spPr>
+      </p:pic>
+    </p:spTree>
+    <p:extLst>
+      <p:ext uri="{BB962C8B-B14F-4D97-AF65-F5344CB8AC3E}">
+        <p14:creationId xmlns:p14="http://schemas.microsoft.com/office/powerpoint/2010/main" val="1366242271"/>
+      </p:ext>
+    </p:extLst>
+  </p:cSld>
+  <p:clrMapOvr>
+    <a:masterClrMapping/>
+  </p:clrMapOvr>
+</p:sld>
+</file>
+
+<file path=ppt/slides/slide17.xml><?xml version="1.0" encoding="utf-8"?>
+<p:sld xmlns:a="http://schemas.openxmlformats.org/drawingml/2006/main" xmlns:r="http://schemas.openxmlformats.org/officeDocument/2006/relationships" xmlns:p="http://schemas.openxmlformats.org/presentationml/2006/main">
+  <p:cSld>
+    <p:spTree>
+      <p:nvGrpSpPr>
+        <p:cNvPr id="1" name=""/>
+        <p:cNvGrpSpPr/>
+        <p:nvPr/>
+      </p:nvGrpSpPr>
+      <p:grpSpPr>
+        <a:xfrm>
+          <a:off x="0" y="0"/>
+          <a:ext cx="0" cy="0"/>
+          <a:chOff x="0" y="0"/>
+          <a:chExt cx="0" cy="0"/>
+        </a:xfrm>
+      </p:grpSpPr>
+      <p:sp>
+        <p:nvSpPr>
+          <p:cNvPr id="2" name="Título 1">
+            <a:extLst>
+              <a:ext uri="{FF2B5EF4-FFF2-40B4-BE49-F238E27FC236}">
+                <a16:creationId xmlns:a16="http://schemas.microsoft.com/office/drawing/2014/main" id="{CD65535C-7ACA-7FF9-6F9D-B7FFAF3D1840}"/>
+              </a:ext>
+            </a:extLst>
+          </p:cNvPr>
+          <p:cNvSpPr>
+            <a:spLocks noGrp="1"/>
+          </p:cNvSpPr>
+          <p:nvPr>
+            <p:ph type="title"/>
+          </p:nvPr>
+        </p:nvSpPr>
+        <p:spPr>
+          <a:xfrm>
+            <a:off x="871107" y="588245"/>
+            <a:ext cx="10711293" cy="1265928"/>
+          </a:xfrm>
+        </p:spPr>
+        <p:txBody>
+          <a:bodyPr anchor="b">
+            <a:normAutofit/>
+          </a:bodyPr>
+          <a:lstStyle/>
+          <a:p>
+            <a:r>
+              <a:rPr lang="pt-BR" b="1" dirty="0"/>
+              <a:t>RELATORIO – Aniversariantes do mês</a:t>
+            </a:r>
+            <a:br>
+              <a:rPr lang="pt-BR" dirty="0">
+                <a:effectLst/>
+              </a:rPr>
+            </a:br>
+            <a:endParaRPr lang="pt-BR" dirty="0"/>
+          </a:p>
+        </p:txBody>
+      </p:sp>
+      <p:sp>
+        <p:nvSpPr>
+          <p:cNvPr id="3" name="Espaço Reservado para Conteúdo 2">
+            <a:extLst>
+              <a:ext uri="{FF2B5EF4-FFF2-40B4-BE49-F238E27FC236}">
+                <a16:creationId xmlns:a16="http://schemas.microsoft.com/office/drawing/2014/main" id="{A8175E1B-23A5-A611-B855-D864BE9BDC26}"/>
+              </a:ext>
+            </a:extLst>
+          </p:cNvPr>
+          <p:cNvSpPr>
+            <a:spLocks noGrp="1"/>
+          </p:cNvSpPr>
+          <p:nvPr>
+            <p:ph sz="half" idx="1"/>
+          </p:nvPr>
+        </p:nvSpPr>
+        <p:spPr>
+          <a:xfrm>
+            <a:off x="763525" y="1854173"/>
+            <a:ext cx="3255402" cy="4017787"/>
+          </a:xfrm>
+        </p:spPr>
+        <p:txBody>
+          <a:bodyPr>
+            <a:normAutofit/>
+          </a:bodyPr>
+          <a:lstStyle/>
+          <a:p>
+            <a:pPr>
+              <a:spcBef>
+                <a:spcPts val="1125"/>
+              </a:spcBef>
+              <a:spcAft>
+                <a:spcPts val="1125"/>
+              </a:spcAft>
+            </a:pPr>
+            <a:r>
+              <a:rPr lang="pt-BR" dirty="0">
+                <a:effectLst/>
+              </a:rPr>
+              <a:t>Aniversariantes do mês: Permite a visualização da relação de aniversariantes a partir da definição do mês.</a:t>
+            </a:r>
+          </a:p>
+        </p:txBody>
+      </p:sp>
+      <p:sp>
+        <p:nvSpPr>
+          <p:cNvPr id="4" name="Espaço Reservado para Data 3">
+            <a:extLst>
+              <a:ext uri="{FF2B5EF4-FFF2-40B4-BE49-F238E27FC236}">
+                <a16:creationId xmlns:a16="http://schemas.microsoft.com/office/drawing/2014/main" id="{DE64AD48-096C-E7CA-6B00-5EADBEB037B0}"/>
+              </a:ext>
+            </a:extLst>
+          </p:cNvPr>
+          <p:cNvSpPr>
+            <a:spLocks noGrp="1"/>
+          </p:cNvSpPr>
+          <p:nvPr>
+            <p:ph type="dt" sz="half" idx="10"/>
+          </p:nvPr>
+        </p:nvSpPr>
+        <p:spPr>
+          <a:xfrm>
+            <a:off x="3917581" y="6308355"/>
+            <a:ext cx="6598019" cy="365125"/>
+          </a:xfrm>
+        </p:spPr>
+        <p:txBody>
+          <a:bodyPr anchor="ctr">
+            <a:normAutofit/>
+          </a:bodyPr>
+          <a:lstStyle/>
+          <a:p>
+            <a:pPr>
+              <a:spcAft>
+                <a:spcPts val="600"/>
+              </a:spcAft>
+            </a:pPr>
+            <a:r>
+              <a:rPr lang="en-US" b="1" dirty="0"/>
+              <a:t>FigurA17 – </a:t>
+            </a:r>
+            <a:r>
+              <a:rPr lang="en-US" b="1" dirty="0" err="1"/>
+              <a:t>tela</a:t>
+            </a:r>
+            <a:r>
+              <a:rPr lang="en-US" b="1" dirty="0"/>
+              <a:t> de RELATORIO DOS </a:t>
+            </a:r>
+            <a:r>
+              <a:rPr lang="en-US" b="1" dirty="0" err="1"/>
+              <a:t>aniversariantes</a:t>
+            </a:r>
+            <a:r>
+              <a:rPr lang="en-US" b="1" dirty="0"/>
+              <a:t> do </a:t>
+            </a:r>
+            <a:r>
+              <a:rPr lang="en-US" b="1" dirty="0" err="1"/>
+              <a:t>mes</a:t>
+            </a:r>
+            <a:endParaRPr lang="en-US" b="1" dirty="0"/>
+          </a:p>
+        </p:txBody>
+      </p:sp>
+      <p:sp>
+        <p:nvSpPr>
+          <p:cNvPr id="6" name="Espaço Reservado para Número de Slide 5">
+            <a:extLst>
+              <a:ext uri="{FF2B5EF4-FFF2-40B4-BE49-F238E27FC236}">
+                <a16:creationId xmlns:a16="http://schemas.microsoft.com/office/drawing/2014/main" id="{8883A2C0-B521-6A26-937C-5AA581D07BB9}"/>
+              </a:ext>
+            </a:extLst>
+          </p:cNvPr>
+          <p:cNvSpPr>
+            <a:spLocks noGrp="1"/>
+          </p:cNvSpPr>
+          <p:nvPr>
+            <p:ph type="sldNum" sz="quarter" idx="12"/>
+          </p:nvPr>
+        </p:nvSpPr>
+        <p:spPr>
+          <a:xfrm>
+            <a:off x="11429999" y="6356350"/>
+            <a:ext cx="521207" cy="365125"/>
+          </a:xfrm>
+        </p:spPr>
+        <p:txBody>
+          <a:bodyPr anchor="ctr">
+            <a:normAutofit/>
+          </a:bodyPr>
+          <a:lstStyle/>
+          <a:p>
+            <a:pPr>
+              <a:spcAft>
+                <a:spcPts val="600"/>
+              </a:spcAft>
+            </a:pPr>
+            <a:fld id="{C68AC1EC-23E2-4F0E-A5A4-674EC8DB954E}" type="slidenum">
+              <a:rPr lang="en-US" smtClean="0"/>
+              <a:pPr>
+                <a:spcAft>
+                  <a:spcPts val="600"/>
+                </a:spcAft>
+              </a:pPr>
+              <a:t>17</a:t>
             </a:fld>
             <a:endParaRPr lang="en-US"/>
           </a:p>
@@ -7739,7 +8071,7 @@
 </p:sld>
 </file>
 
-<file path=ppt/slides/slide17.xml><?xml version="1.0" encoding="utf-8"?>
+<file path=ppt/slides/slide18.xml><?xml version="1.0" encoding="utf-8"?>
 <p:sld xmlns:a="http://schemas.openxmlformats.org/drawingml/2006/main" xmlns:r="http://schemas.openxmlformats.org/officeDocument/2006/relationships" xmlns:p="http://schemas.openxmlformats.org/presentationml/2006/main">
   <p:cSld>
     <p:spTree>
@@ -8126,7 +8458,7 @@
           <a:p>
             <a:fld id="{C68AC1EC-23E2-4F0E-A5A4-674EC8DB954E}" type="slidenum">
               <a:rPr lang="en-US" smtClean="0"/>
-              <a:t>17</a:t>
+              <a:t>18</a:t>
             </a:fld>
             <a:endParaRPr lang="en-US"/>
           </a:p>
@@ -8145,7 +8477,7 @@
 </p:sld>
 </file>
 
-<file path=ppt/slides/slide18.xml><?xml version="1.0" encoding="utf-8"?>
+<file path=ppt/slides/slide19.xml><?xml version="1.0" encoding="utf-8"?>
 <p:sld xmlns:a="http://schemas.openxmlformats.org/drawingml/2006/main" xmlns:r="http://schemas.openxmlformats.org/officeDocument/2006/relationships" xmlns:p="http://schemas.openxmlformats.org/presentationml/2006/main">
   <p:cSld>
     <p:spTree>
@@ -8343,7 +8675,7 @@
           <a:p>
             <a:fld id="{C68AC1EC-23E2-4F0E-A5A4-674EC8DB954E}" type="slidenum">
               <a:rPr lang="en-US" smtClean="0"/>
-              <a:t>18</a:t>
+              <a:t>19</a:t>
             </a:fld>
             <a:endParaRPr lang="en-US"/>
           </a:p>
@@ -8415,7 +8747,294 @@
 </p:sld>
 </file>
 
-<file path=ppt/slides/slide19.xml><?xml version="1.0" encoding="utf-8"?>
+<file path=ppt/slides/slide2.xml><?xml version="1.0" encoding="utf-8"?>
+<p:sld xmlns:a="http://schemas.openxmlformats.org/drawingml/2006/main" xmlns:r="http://schemas.openxmlformats.org/officeDocument/2006/relationships" xmlns:p="http://schemas.openxmlformats.org/presentationml/2006/main">
+  <p:cSld>
+    <p:spTree>
+      <p:nvGrpSpPr>
+        <p:cNvPr id="1" name=""/>
+        <p:cNvGrpSpPr/>
+        <p:nvPr/>
+      </p:nvGrpSpPr>
+      <p:grpSpPr>
+        <a:xfrm>
+          <a:off x="0" y="0"/>
+          <a:ext cx="0" cy="0"/>
+          <a:chOff x="0" y="0"/>
+          <a:chExt cx="0" cy="0"/>
+        </a:xfrm>
+      </p:grpSpPr>
+      <p:sp>
+        <p:nvSpPr>
+          <p:cNvPr id="2" name="Título 1">
+            <a:extLst>
+              <a:ext uri="{FF2B5EF4-FFF2-40B4-BE49-F238E27FC236}">
+                <a16:creationId xmlns:a16="http://schemas.microsoft.com/office/drawing/2014/main" id="{5B18BC5C-418B-9723-B5E9-1EE52F22D23B}"/>
+              </a:ext>
+            </a:extLst>
+          </p:cNvPr>
+          <p:cNvSpPr>
+            <a:spLocks noGrp="1"/>
+          </p:cNvSpPr>
+          <p:nvPr>
+            <p:ph type="title"/>
+          </p:nvPr>
+        </p:nvSpPr>
+        <p:spPr>
+          <a:xfrm>
+            <a:off x="1155700" y="1252368"/>
+            <a:ext cx="5842000" cy="1097132"/>
+          </a:xfrm>
+        </p:spPr>
+        <p:txBody>
+          <a:bodyPr anchor="t">
+            <a:normAutofit fontScale="90000"/>
+          </a:bodyPr>
+          <a:lstStyle/>
+          <a:p>
+            <a:r>
+              <a:rPr lang="pt-BR" sz="3100" b="1" dirty="0"/>
+              <a:t>APRESENTAÇÃO DO SOFTWARE</a:t>
+            </a:r>
+            <a:br>
+              <a:rPr lang="pt-BR" dirty="0">
+                <a:effectLst/>
+              </a:rPr>
+            </a:br>
+            <a:endParaRPr lang="pt-BR" dirty="0"/>
+          </a:p>
+        </p:txBody>
+      </p:sp>
+      <p:pic>
+        <p:nvPicPr>
+          <p:cNvPr id="1026" name="Picture 2" descr="Diagrama&#10;&#10;Descrição gerada automaticamente">
+            <a:extLst>
+              <a:ext uri="{FF2B5EF4-FFF2-40B4-BE49-F238E27FC236}">
+                <a16:creationId xmlns:a16="http://schemas.microsoft.com/office/drawing/2014/main" id="{4F75B088-CAE1-5196-A146-20F86E979396}"/>
+              </a:ext>
+            </a:extLst>
+          </p:cNvPr>
+          <p:cNvPicPr>
+            <a:picLocks noChangeAspect="1" noChangeArrowheads="1"/>
+          </p:cNvPicPr>
+          <p:nvPr/>
+        </p:nvPicPr>
+        <p:blipFill>
+          <a:blip r:embed="rId2">
+            <a:extLst>
+              <a:ext uri="{28A0092B-C50C-407E-A947-70E740481C1C}">
+                <a14:useLocalDpi xmlns:a14="http://schemas.microsoft.com/office/drawing/2010/main" val="0"/>
+              </a:ext>
+            </a:extLst>
+          </a:blip>
+          <a:stretch>
+            <a:fillRect/>
+          </a:stretch>
+        </p:blipFill>
+        <p:spPr bwMode="auto">
+          <a:xfrm>
+            <a:off x="6633286" y="383458"/>
+            <a:ext cx="5121180" cy="5972891"/>
+          </a:xfrm>
+          <a:prstGeom prst="rect">
+            <a:avLst/>
+          </a:prstGeom>
+          <a:solidFill>
+            <a:srgbClr val="FFFFFF"/>
+          </a:solidFill>
+        </p:spPr>
+      </p:pic>
+      <p:sp>
+        <p:nvSpPr>
+          <p:cNvPr id="3" name="Espaço Reservado para Conteúdo 2">
+            <a:extLst>
+              <a:ext uri="{FF2B5EF4-FFF2-40B4-BE49-F238E27FC236}">
+                <a16:creationId xmlns:a16="http://schemas.microsoft.com/office/drawing/2014/main" id="{CFEA0649-8914-9CCB-0D86-13DB4CFD912E}"/>
+              </a:ext>
+            </a:extLst>
+          </p:cNvPr>
+          <p:cNvSpPr>
+            <a:spLocks noGrp="1"/>
+          </p:cNvSpPr>
+          <p:nvPr>
+            <p:ph type="body" sz="half" idx="2"/>
+          </p:nvPr>
+        </p:nvSpPr>
+        <p:spPr>
+          <a:xfrm>
+            <a:off x="839788" y="2123768"/>
+            <a:ext cx="5664251" cy="2684206"/>
+          </a:xfrm>
+        </p:spPr>
+        <p:txBody>
+          <a:bodyPr anchor="b">
+            <a:normAutofit/>
+          </a:bodyPr>
+          <a:lstStyle/>
+          <a:p>
+            <a:pPr marL="285750" indent="-285750" algn="just">
+              <a:buFont typeface="Arial" panose="020B0604020202020204" pitchFamily="34" charset="0"/>
+              <a:buChar char="•"/>
+            </a:pPr>
+            <a:r>
+              <a:rPr lang="pt-BR" dirty="0">
+                <a:effectLst/>
+              </a:rPr>
+              <a:t>O objetivo é controlar o cadastro de usuários, alunos e funcionários, bem como efetuar a gestão dos serviços oferecidos na forma de planos.</a:t>
+            </a:r>
+          </a:p>
+          <a:p>
+            <a:pPr marL="285750" indent="-285750" algn="just">
+              <a:buFont typeface="Arial" panose="020B0604020202020204" pitchFamily="34" charset="0"/>
+              <a:buChar char="•"/>
+            </a:pPr>
+            <a:r>
+              <a:rPr lang="pt-BR" dirty="0">
+                <a:effectLst/>
+              </a:rPr>
+              <a:t>Através de uma interface </a:t>
+            </a:r>
+            <a:r>
+              <a:rPr lang="pt-BR" dirty="0"/>
+              <a:t>simples</a:t>
+            </a:r>
+            <a:r>
+              <a:rPr lang="pt-BR" dirty="0">
+                <a:effectLst/>
+              </a:rPr>
+              <a:t> ele centraliza tarefas de controle de acesso, cadastro e segurança de maneira objetiva, tornando-se uma ferramenta ideal para o controle dos ativos de sua academia.</a:t>
+            </a:r>
+          </a:p>
+          <a:p>
+            <a:endParaRPr lang="pt-BR" sz="1500" dirty="0"/>
+          </a:p>
+        </p:txBody>
+      </p:sp>
+      <p:sp>
+        <p:nvSpPr>
+          <p:cNvPr id="4" name="Espaço Reservado para Data 3">
+            <a:extLst>
+              <a:ext uri="{FF2B5EF4-FFF2-40B4-BE49-F238E27FC236}">
+                <a16:creationId xmlns:a16="http://schemas.microsoft.com/office/drawing/2014/main" id="{D02EA9A5-FFAA-5034-0C87-55E0F42207C8}"/>
+              </a:ext>
+            </a:extLst>
+          </p:cNvPr>
+          <p:cNvSpPr>
+            <a:spLocks noGrp="1"/>
+          </p:cNvSpPr>
+          <p:nvPr>
+            <p:ph type="dt" sz="half" idx="10"/>
+          </p:nvPr>
+        </p:nvSpPr>
+        <p:spPr>
+          <a:xfrm>
+            <a:off x="6633286" y="6356350"/>
+            <a:ext cx="2982976" cy="365125"/>
+          </a:xfrm>
+        </p:spPr>
+        <p:txBody>
+          <a:bodyPr anchor="ctr">
+            <a:normAutofit/>
+          </a:bodyPr>
+          <a:lstStyle/>
+          <a:p>
+            <a:pPr>
+              <a:spcAft>
+                <a:spcPts val="600"/>
+              </a:spcAft>
+            </a:pPr>
+            <a:r>
+              <a:rPr lang="en-US" b="1" dirty="0" err="1"/>
+              <a:t>Figura</a:t>
+            </a:r>
+            <a:r>
+              <a:rPr lang="en-US" b="1" dirty="0"/>
+              <a:t> 1- </a:t>
+            </a:r>
+            <a:r>
+              <a:rPr lang="en-US" b="1" dirty="0" err="1"/>
+              <a:t>modelo</a:t>
+            </a:r>
+            <a:r>
+              <a:rPr lang="en-US" b="1" dirty="0"/>
+              <a:t> </a:t>
+            </a:r>
+            <a:r>
+              <a:rPr lang="en-US" b="1" dirty="0" err="1"/>
+              <a:t>caso</a:t>
+            </a:r>
+            <a:r>
+              <a:rPr lang="en-US" b="1" dirty="0"/>
+              <a:t> de </a:t>
+            </a:r>
+            <a:r>
+              <a:rPr lang="en-US" b="1" dirty="0" err="1"/>
+              <a:t>uso</a:t>
+            </a:r>
+            <a:endParaRPr lang="en-US" b="1" dirty="0"/>
+          </a:p>
+        </p:txBody>
+      </p:sp>
+      <p:sp>
+        <p:nvSpPr>
+          <p:cNvPr id="6" name="Espaço Reservado para Número de Slide 5">
+            <a:extLst>
+              <a:ext uri="{FF2B5EF4-FFF2-40B4-BE49-F238E27FC236}">
+                <a16:creationId xmlns:a16="http://schemas.microsoft.com/office/drawing/2014/main" id="{893BDAB9-7523-5E53-2381-25946788E257}"/>
+              </a:ext>
+            </a:extLst>
+          </p:cNvPr>
+          <p:cNvSpPr>
+            <a:spLocks noGrp="1"/>
+          </p:cNvSpPr>
+          <p:nvPr>
+            <p:ph type="sldNum" sz="quarter" idx="12"/>
+          </p:nvPr>
+        </p:nvSpPr>
+        <p:spPr>
+          <a:xfrm>
+            <a:off x="11429999" y="6356350"/>
+            <a:ext cx="521207" cy="365125"/>
+          </a:xfrm>
+        </p:spPr>
+        <p:txBody>
+          <a:bodyPr anchor="ctr">
+            <a:normAutofit/>
+          </a:bodyPr>
+          <a:lstStyle/>
+          <a:p>
+            <a:pPr>
+              <a:spcAft>
+                <a:spcPts val="600"/>
+              </a:spcAft>
+            </a:pPr>
+            <a:fld id="{C68AC1EC-23E2-4F0E-A5A4-674EC8DB954E}" type="slidenum">
+              <a:rPr lang="en-US" smtClean="0"/>
+              <a:pPr>
+                <a:spcAft>
+                  <a:spcPts val="600"/>
+                </a:spcAft>
+              </a:pPr>
+              <a:t>2</a:t>
+            </a:fld>
+            <a:endParaRPr lang="en-US" dirty="0"/>
+          </a:p>
+        </p:txBody>
+      </p:sp>
+    </p:spTree>
+    <p:extLst>
+      <p:ext uri="{BB962C8B-B14F-4D97-AF65-F5344CB8AC3E}">
+        <p14:creationId xmlns:p14="http://schemas.microsoft.com/office/powerpoint/2010/main" val="2534805862"/>
+      </p:ext>
+    </p:extLst>
+  </p:cSld>
+  <p:clrMapOvr>
+    <a:masterClrMapping/>
+  </p:clrMapOvr>
+</p:sld>
+</file>
+
+<file path=ppt/slides/slide20.xml><?xml version="1.0" encoding="utf-8"?>
 <p:sld xmlns:a="http://schemas.openxmlformats.org/drawingml/2006/main" xmlns:r="http://schemas.openxmlformats.org/officeDocument/2006/relationships" xmlns:p="http://schemas.openxmlformats.org/presentationml/2006/main">
   <p:cSld>
     <p:bg>
@@ -8707,293 +9326,6 @@
     <p:extLst>
       <p:ext uri="{BB962C8B-B14F-4D97-AF65-F5344CB8AC3E}">
         <p14:creationId xmlns:p14="http://schemas.microsoft.com/office/powerpoint/2010/main" val="1256796102"/>
-      </p:ext>
-    </p:extLst>
-  </p:cSld>
-  <p:clrMapOvr>
-    <a:masterClrMapping/>
-  </p:clrMapOvr>
-</p:sld>
-</file>
-
-<file path=ppt/slides/slide2.xml><?xml version="1.0" encoding="utf-8"?>
-<p:sld xmlns:a="http://schemas.openxmlformats.org/drawingml/2006/main" xmlns:r="http://schemas.openxmlformats.org/officeDocument/2006/relationships" xmlns:p="http://schemas.openxmlformats.org/presentationml/2006/main">
-  <p:cSld>
-    <p:spTree>
-      <p:nvGrpSpPr>
-        <p:cNvPr id="1" name=""/>
-        <p:cNvGrpSpPr/>
-        <p:nvPr/>
-      </p:nvGrpSpPr>
-      <p:grpSpPr>
-        <a:xfrm>
-          <a:off x="0" y="0"/>
-          <a:ext cx="0" cy="0"/>
-          <a:chOff x="0" y="0"/>
-          <a:chExt cx="0" cy="0"/>
-        </a:xfrm>
-      </p:grpSpPr>
-      <p:sp>
-        <p:nvSpPr>
-          <p:cNvPr id="2" name="Título 1">
-            <a:extLst>
-              <a:ext uri="{FF2B5EF4-FFF2-40B4-BE49-F238E27FC236}">
-                <a16:creationId xmlns:a16="http://schemas.microsoft.com/office/drawing/2014/main" id="{5B18BC5C-418B-9723-B5E9-1EE52F22D23B}"/>
-              </a:ext>
-            </a:extLst>
-          </p:cNvPr>
-          <p:cNvSpPr>
-            <a:spLocks noGrp="1"/>
-          </p:cNvSpPr>
-          <p:nvPr>
-            <p:ph type="title"/>
-          </p:nvPr>
-        </p:nvSpPr>
-        <p:spPr>
-          <a:xfrm>
-            <a:off x="1155700" y="1252368"/>
-            <a:ext cx="5842000" cy="1097132"/>
-          </a:xfrm>
-        </p:spPr>
-        <p:txBody>
-          <a:bodyPr anchor="t">
-            <a:normAutofit fontScale="90000"/>
-          </a:bodyPr>
-          <a:lstStyle/>
-          <a:p>
-            <a:r>
-              <a:rPr lang="pt-BR" sz="3100" b="1" dirty="0"/>
-              <a:t>APRESENTAÇÃO DO SOFTWARE</a:t>
-            </a:r>
-            <a:br>
-              <a:rPr lang="pt-BR" dirty="0">
-                <a:effectLst/>
-              </a:rPr>
-            </a:br>
-            <a:endParaRPr lang="pt-BR" dirty="0"/>
-          </a:p>
-        </p:txBody>
-      </p:sp>
-      <p:pic>
-        <p:nvPicPr>
-          <p:cNvPr id="1026" name="Picture 2" descr="Diagrama&#10;&#10;Descrição gerada automaticamente">
-            <a:extLst>
-              <a:ext uri="{FF2B5EF4-FFF2-40B4-BE49-F238E27FC236}">
-                <a16:creationId xmlns:a16="http://schemas.microsoft.com/office/drawing/2014/main" id="{4F75B088-CAE1-5196-A146-20F86E979396}"/>
-              </a:ext>
-            </a:extLst>
-          </p:cNvPr>
-          <p:cNvPicPr>
-            <a:picLocks noChangeAspect="1" noChangeArrowheads="1"/>
-          </p:cNvPicPr>
-          <p:nvPr/>
-        </p:nvPicPr>
-        <p:blipFill>
-          <a:blip r:embed="rId2">
-            <a:extLst>
-              <a:ext uri="{28A0092B-C50C-407E-A947-70E740481C1C}">
-                <a14:useLocalDpi xmlns:a14="http://schemas.microsoft.com/office/drawing/2010/main" val="0"/>
-              </a:ext>
-            </a:extLst>
-          </a:blip>
-          <a:stretch>
-            <a:fillRect/>
-          </a:stretch>
-        </p:blipFill>
-        <p:spPr bwMode="auto">
-          <a:xfrm>
-            <a:off x="6633286" y="383458"/>
-            <a:ext cx="5121180" cy="5972891"/>
-          </a:xfrm>
-          <a:prstGeom prst="rect">
-            <a:avLst/>
-          </a:prstGeom>
-          <a:solidFill>
-            <a:srgbClr val="FFFFFF"/>
-          </a:solidFill>
-        </p:spPr>
-      </p:pic>
-      <p:sp>
-        <p:nvSpPr>
-          <p:cNvPr id="3" name="Espaço Reservado para Conteúdo 2">
-            <a:extLst>
-              <a:ext uri="{FF2B5EF4-FFF2-40B4-BE49-F238E27FC236}">
-                <a16:creationId xmlns:a16="http://schemas.microsoft.com/office/drawing/2014/main" id="{CFEA0649-8914-9CCB-0D86-13DB4CFD912E}"/>
-              </a:ext>
-            </a:extLst>
-          </p:cNvPr>
-          <p:cNvSpPr>
-            <a:spLocks noGrp="1"/>
-          </p:cNvSpPr>
-          <p:nvPr>
-            <p:ph type="body" sz="half" idx="2"/>
-          </p:nvPr>
-        </p:nvSpPr>
-        <p:spPr>
-          <a:xfrm>
-            <a:off x="839788" y="2123768"/>
-            <a:ext cx="5664251" cy="2684206"/>
-          </a:xfrm>
-        </p:spPr>
-        <p:txBody>
-          <a:bodyPr anchor="b">
-            <a:normAutofit/>
-          </a:bodyPr>
-          <a:lstStyle/>
-          <a:p>
-            <a:pPr marL="285750" indent="-285750" algn="just">
-              <a:buFont typeface="Arial" panose="020B0604020202020204" pitchFamily="34" charset="0"/>
-              <a:buChar char="•"/>
-            </a:pPr>
-            <a:r>
-              <a:rPr lang="pt-BR" dirty="0">
-                <a:effectLst/>
-              </a:rPr>
-              <a:t>O objetivo é controlar o cadastro de usuários, alunos e funcionários, bem como efetuar a gestão dos serviços oferecidos na forma de planos.</a:t>
-            </a:r>
-          </a:p>
-          <a:p>
-            <a:pPr marL="285750" indent="-285750" algn="just">
-              <a:buFont typeface="Arial" panose="020B0604020202020204" pitchFamily="34" charset="0"/>
-              <a:buChar char="•"/>
-            </a:pPr>
-            <a:r>
-              <a:rPr lang="pt-BR" dirty="0">
-                <a:effectLst/>
-              </a:rPr>
-              <a:t>Através de uma interface </a:t>
-            </a:r>
-            <a:r>
-              <a:rPr lang="pt-BR" dirty="0"/>
-              <a:t>simples</a:t>
-            </a:r>
-            <a:r>
-              <a:rPr lang="pt-BR" dirty="0">
-                <a:effectLst/>
-              </a:rPr>
-              <a:t> ele centraliza tarefas de controle de acesso, cadastro e segurança de maneira objetiva, tornando-se uma ferramenta ideal para o controle dos ativos de sua academia.</a:t>
-            </a:r>
-          </a:p>
-          <a:p>
-            <a:endParaRPr lang="pt-BR" sz="1500" dirty="0"/>
-          </a:p>
-        </p:txBody>
-      </p:sp>
-      <p:sp>
-        <p:nvSpPr>
-          <p:cNvPr id="4" name="Espaço Reservado para Data 3">
-            <a:extLst>
-              <a:ext uri="{FF2B5EF4-FFF2-40B4-BE49-F238E27FC236}">
-                <a16:creationId xmlns:a16="http://schemas.microsoft.com/office/drawing/2014/main" id="{D02EA9A5-FFAA-5034-0C87-55E0F42207C8}"/>
-              </a:ext>
-            </a:extLst>
-          </p:cNvPr>
-          <p:cNvSpPr>
-            <a:spLocks noGrp="1"/>
-          </p:cNvSpPr>
-          <p:nvPr>
-            <p:ph type="dt" sz="half" idx="10"/>
-          </p:nvPr>
-        </p:nvSpPr>
-        <p:spPr>
-          <a:xfrm>
-            <a:off x="6633286" y="6356350"/>
-            <a:ext cx="2982976" cy="365125"/>
-          </a:xfrm>
-        </p:spPr>
-        <p:txBody>
-          <a:bodyPr anchor="ctr">
-            <a:normAutofit/>
-          </a:bodyPr>
-          <a:lstStyle/>
-          <a:p>
-            <a:pPr>
-              <a:spcAft>
-                <a:spcPts val="600"/>
-              </a:spcAft>
-            </a:pPr>
-            <a:r>
-              <a:rPr lang="en-US" b="1" dirty="0" err="1"/>
-              <a:t>Figura</a:t>
-            </a:r>
-            <a:r>
-              <a:rPr lang="en-US" b="1" dirty="0"/>
-              <a:t> 1- </a:t>
-            </a:r>
-            <a:r>
-              <a:rPr lang="en-US" b="1" dirty="0" err="1"/>
-              <a:t>modelo</a:t>
-            </a:r>
-            <a:r>
-              <a:rPr lang="en-US" b="1" dirty="0"/>
-              <a:t> </a:t>
-            </a:r>
-            <a:r>
-              <a:rPr lang="en-US" b="1" dirty="0" err="1"/>
-              <a:t>caso</a:t>
-            </a:r>
-            <a:r>
-              <a:rPr lang="en-US" b="1" dirty="0"/>
-              <a:t> de </a:t>
-            </a:r>
-            <a:r>
-              <a:rPr lang="en-US" b="1" dirty="0" err="1"/>
-              <a:t>uso</a:t>
-            </a:r>
-            <a:endParaRPr lang="en-US" b="1" dirty="0"/>
-          </a:p>
-        </p:txBody>
-      </p:sp>
-      <p:sp>
-        <p:nvSpPr>
-          <p:cNvPr id="6" name="Espaço Reservado para Número de Slide 5">
-            <a:extLst>
-              <a:ext uri="{FF2B5EF4-FFF2-40B4-BE49-F238E27FC236}">
-                <a16:creationId xmlns:a16="http://schemas.microsoft.com/office/drawing/2014/main" id="{893BDAB9-7523-5E53-2381-25946788E257}"/>
-              </a:ext>
-            </a:extLst>
-          </p:cNvPr>
-          <p:cNvSpPr>
-            <a:spLocks noGrp="1"/>
-          </p:cNvSpPr>
-          <p:nvPr>
-            <p:ph type="sldNum" sz="quarter" idx="12"/>
-          </p:nvPr>
-        </p:nvSpPr>
-        <p:spPr>
-          <a:xfrm>
-            <a:off x="11429999" y="6356350"/>
-            <a:ext cx="521207" cy="365125"/>
-          </a:xfrm>
-        </p:spPr>
-        <p:txBody>
-          <a:bodyPr anchor="ctr">
-            <a:normAutofit/>
-          </a:bodyPr>
-          <a:lstStyle/>
-          <a:p>
-            <a:pPr>
-              <a:spcAft>
-                <a:spcPts val="600"/>
-              </a:spcAft>
-            </a:pPr>
-            <a:fld id="{C68AC1EC-23E2-4F0E-A5A4-674EC8DB954E}" type="slidenum">
-              <a:rPr lang="en-US" smtClean="0"/>
-              <a:pPr>
-                <a:spcAft>
-                  <a:spcPts val="600"/>
-                </a:spcAft>
-              </a:pPr>
-              <a:t>2</a:t>
-            </a:fld>
-            <a:endParaRPr lang="en-US" dirty="0"/>
-          </a:p>
-        </p:txBody>
-      </p:sp>
-    </p:spTree>
-    <p:extLst>
-      <p:ext uri="{BB962C8B-B14F-4D97-AF65-F5344CB8AC3E}">
-        <p14:creationId xmlns:p14="http://schemas.microsoft.com/office/powerpoint/2010/main" val="2534805862"/>
       </p:ext>
     </p:extLst>
   </p:cSld>

</xml_diff>

<commit_message>
- Grafico Alunos matriculados por mes dentro do ano escolhido
</commit_message>
<xml_diff>
--- a/Documentos/Apresentação -Gestão de Academia.pptx
+++ b/Documentos/Apresentação -Gestão de Academia.pptx
@@ -5,7 +5,7 @@
     <p:sldMasterId id="2147483660" r:id="rId1"/>
   </p:sldMasterIdLst>
   <p:notesMasterIdLst>
-    <p:notesMasterId r:id="rId22"/>
+    <p:notesMasterId r:id="rId23"/>
   </p:notesMasterIdLst>
   <p:sldIdLst>
     <p:sldId id="256" r:id="rId2"/>
@@ -25,9 +25,10 @@
     <p:sldId id="276" r:id="rId16"/>
     <p:sldId id="283" r:id="rId17"/>
     <p:sldId id="277" r:id="rId18"/>
-    <p:sldId id="260" r:id="rId19"/>
-    <p:sldId id="278" r:id="rId20"/>
-    <p:sldId id="279" r:id="rId21"/>
+    <p:sldId id="284" r:id="rId19"/>
+    <p:sldId id="260" r:id="rId20"/>
+    <p:sldId id="278" r:id="rId21"/>
+    <p:sldId id="279" r:id="rId22"/>
   </p:sldIdLst>
   <p:sldSz cx="12192000" cy="6858000"/>
   <p:notesSz cx="6858000" cy="9144000"/>
@@ -642,6 +643,90 @@
     <p:extLst>
       <p:ext uri="{BB962C8B-B14F-4D97-AF65-F5344CB8AC3E}">
         <p14:creationId xmlns:p14="http://schemas.microsoft.com/office/powerpoint/2010/main" val="1940073983"/>
+      </p:ext>
+    </p:extLst>
+  </p:cSld>
+  <p:clrMapOvr>
+    <a:masterClrMapping/>
+  </p:clrMapOvr>
+</p:notes>
+</file>
+
+<file path=ppt/notesSlides/notesSlide11.xml><?xml version="1.0" encoding="utf-8"?>
+<p:notes xmlns:a="http://schemas.openxmlformats.org/drawingml/2006/main" xmlns:r="http://schemas.openxmlformats.org/officeDocument/2006/relationships" xmlns:p="http://schemas.openxmlformats.org/presentationml/2006/main">
+  <p:cSld>
+    <p:spTree>
+      <p:nvGrpSpPr>
+        <p:cNvPr id="1" name=""/>
+        <p:cNvGrpSpPr/>
+        <p:nvPr/>
+      </p:nvGrpSpPr>
+      <p:grpSpPr>
+        <a:xfrm>
+          <a:off x="0" y="0"/>
+          <a:ext cx="0" cy="0"/>
+          <a:chOff x="0" y="0"/>
+          <a:chExt cx="0" cy="0"/>
+        </a:xfrm>
+      </p:grpSpPr>
+      <p:sp>
+        <p:nvSpPr>
+          <p:cNvPr id="2" name="Espaço Reservado para Imagem de Slide 1"/>
+          <p:cNvSpPr>
+            <a:spLocks noGrp="1" noRot="1" noChangeAspect="1"/>
+          </p:cNvSpPr>
+          <p:nvPr>
+            <p:ph type="sldImg"/>
+          </p:nvPr>
+        </p:nvSpPr>
+        <p:spPr/>
+      </p:sp>
+      <p:sp>
+        <p:nvSpPr>
+          <p:cNvPr id="3" name="Espaço Reservado para Anotações 2"/>
+          <p:cNvSpPr>
+            <a:spLocks noGrp="1"/>
+          </p:cNvSpPr>
+          <p:nvPr>
+            <p:ph type="body" idx="1"/>
+          </p:nvPr>
+        </p:nvSpPr>
+        <p:spPr/>
+        <p:txBody>
+          <a:bodyPr/>
+          <a:lstStyle/>
+          <a:p>
+            <a:endParaRPr lang="pt-BR" dirty="0"/>
+          </a:p>
+        </p:txBody>
+      </p:sp>
+      <p:sp>
+        <p:nvSpPr>
+          <p:cNvPr id="4" name="Espaço Reservado para Número de Slide 3"/>
+          <p:cNvSpPr>
+            <a:spLocks noGrp="1"/>
+          </p:cNvSpPr>
+          <p:nvPr>
+            <p:ph type="sldNum" sz="quarter" idx="5"/>
+          </p:nvPr>
+        </p:nvSpPr>
+        <p:spPr/>
+        <p:txBody>
+          <a:bodyPr/>
+          <a:lstStyle/>
+          <a:p>
+            <a:fld id="{3116101D-3B63-9249-8DE5-B89A0CA224DC}" type="slidenum">
+              <a:rPr lang="pt-BR" smtClean="0"/>
+              <a:t>18</a:t>
+            </a:fld>
+            <a:endParaRPr lang="pt-BR"/>
+          </a:p>
+        </p:txBody>
+      </p:sp>
+    </p:spTree>
+    <p:extLst>
+      <p:ext uri="{BB962C8B-B14F-4D97-AF65-F5344CB8AC3E}">
+        <p14:creationId xmlns:p14="http://schemas.microsoft.com/office/powerpoint/2010/main" val="2374300323"/>
       </p:ext>
     </p:extLst>
   </p:cSld>
@@ -8093,7 +8178,7 @@
           <p:cNvPr id="2" name="Título 1">
             <a:extLst>
               <a:ext uri="{FF2B5EF4-FFF2-40B4-BE49-F238E27FC236}">
-                <a16:creationId xmlns:a16="http://schemas.microsoft.com/office/drawing/2014/main" id="{67505AC7-381E-215D-DE89-A29A52A396C3}"/>
+                <a16:creationId xmlns:a16="http://schemas.microsoft.com/office/drawing/2014/main" id="{15EF1D01-9E3D-2ED0-8287-1747C1A04F75}"/>
               </a:ext>
             </a:extLst>
           </p:cNvPr>
@@ -8102,49 +8187,58 @@
           </p:cNvSpPr>
           <p:nvPr>
             <p:ph type="title"/>
-          </p:nvPr>
-        </p:nvSpPr>
-        <p:spPr/>
-        <p:txBody>
-          <a:bodyPr/>
-          <a:lstStyle/>
-          <a:p>
-            <a:r>
-              <a:rPr lang="pt-BR" b="1" dirty="0"/>
-              <a:t>ESPECIFICAÇÕES TÉCNICAS</a:t>
-            </a:r>
-            <a:br>
-              <a:rPr lang="pt-BR" b="1" dirty="0"/>
-            </a:br>
-            <a:endParaRPr lang="pt-BR" b="1" dirty="0"/>
-          </a:p>
-        </p:txBody>
-      </p:sp>
-      <p:sp>
-        <p:nvSpPr>
-          <p:cNvPr id="3" name="Espaço Reservado para Conteúdo 2">
-            <a:extLst>
-              <a:ext uri="{FF2B5EF4-FFF2-40B4-BE49-F238E27FC236}">
-                <a16:creationId xmlns:a16="http://schemas.microsoft.com/office/drawing/2014/main" id="{42456B08-C54C-1760-7377-187C86252AED}"/>
-              </a:ext>
-            </a:extLst>
-          </p:cNvPr>
-          <p:cNvSpPr>
-            <a:spLocks noGrp="1"/>
-          </p:cNvSpPr>
-          <p:nvPr>
-            <p:ph idx="1"/>
           </p:nvPr>
         </p:nvSpPr>
         <p:spPr>
           <a:xfrm>
-            <a:off x="877824" y="1854173"/>
-            <a:ext cx="10442448" cy="3903819"/>
+            <a:off x="871108" y="588245"/>
+            <a:ext cx="10449784" cy="1265928"/>
           </a:xfrm>
         </p:spPr>
         <p:txBody>
+          <a:bodyPr anchor="b">
+            <a:normAutofit/>
+          </a:bodyPr>
+          <a:lstStyle/>
+          <a:p>
+            <a:r>
+              <a:rPr lang="pt-BR" b="1"/>
+              <a:t>RELATORIO – Gráfico Alunos Matriculados</a:t>
+            </a:r>
+            <a:br>
+              <a:rPr lang="pt-BR">
+                <a:effectLst/>
+              </a:rPr>
+            </a:br>
+            <a:endParaRPr lang="pt-BR"/>
+          </a:p>
+        </p:txBody>
+      </p:sp>
+      <p:sp>
+        <p:nvSpPr>
+          <p:cNvPr id="3" name="Espaço Reservado para Conteúdo 2">
+            <a:extLst>
+              <a:ext uri="{FF2B5EF4-FFF2-40B4-BE49-F238E27FC236}">
+                <a16:creationId xmlns:a16="http://schemas.microsoft.com/office/drawing/2014/main" id="{A9035203-65BD-C080-C444-2588C6EF99A2}"/>
+              </a:ext>
+            </a:extLst>
+          </p:cNvPr>
+          <p:cNvSpPr>
+            <a:spLocks noGrp="1"/>
+          </p:cNvSpPr>
+          <p:nvPr>
+            <p:ph sz="half" idx="1"/>
+          </p:nvPr>
+        </p:nvSpPr>
+        <p:spPr>
+          <a:xfrm>
+            <a:off x="877826" y="2159175"/>
+            <a:ext cx="3313174" cy="4017787"/>
+          </a:xfrm>
+        </p:spPr>
+        <p:txBody>
           <a:bodyPr>
-            <a:normAutofit fontScale="92500" lnSpcReduction="10000"/>
+            <a:normAutofit/>
           </a:bodyPr>
           <a:lstStyle/>
           <a:p>
@@ -8157,307 +8251,171 @@
               </a:spcAft>
             </a:pPr>
             <a:r>
-              <a:rPr lang="pt-BR" sz="1800">
-                <a:solidFill>
-                  <a:srgbClr val="444444"/>
-                </a:solidFill>
+              <a:rPr lang="pt-BR" dirty="0">
                 <a:effectLst/>
-                <a:latin typeface="Open Sans" panose="020B0606030504020204" pitchFamily="34" charset="0"/>
-                <a:ea typeface="Times New Roman" panose="02020603050405020304" pitchFamily="18" charset="0"/>
               </a:rPr>
-              <a:t>Banco de Dados: padrão do sistema em </a:t>
-            </a:r>
-            <a:r>
-              <a:rPr lang="pt-BR" sz="1800" err="1">
-                <a:solidFill>
-                  <a:srgbClr val="444444"/>
-                </a:solidFill>
+              <a:t>Gráfico </a:t>
+            </a:r>
+            <a:r>
+              <a:rPr lang="pt-BR" dirty="0"/>
+              <a:t>Alunos Matriculados</a:t>
+            </a:r>
+            <a:r>
+              <a:rPr lang="pt-BR" dirty="0">
                 <a:effectLst/>
-                <a:latin typeface="Open Sans" panose="020B0606030504020204" pitchFamily="34" charset="0"/>
-                <a:ea typeface="Times New Roman" panose="02020603050405020304" pitchFamily="18" charset="0"/>
               </a:rPr>
-              <a:t>SQLite</a:t>
-            </a:r>
-            <a:r>
-              <a:rPr lang="pt-BR" sz="1800">
-                <a:solidFill>
-                  <a:srgbClr val="444444"/>
-                </a:solidFill>
-                <a:effectLst/>
-                <a:latin typeface="Open Sans" panose="020B0606030504020204" pitchFamily="34" charset="0"/>
-                <a:ea typeface="Times New Roman" panose="02020603050405020304" pitchFamily="18" charset="0"/>
-              </a:rPr>
-              <a:t>, podendo no entanto, ser utilizado com a maioria dos bancos de dados atualmente disponíveis (Oracle, Sybase, </a:t>
-            </a:r>
-            <a:r>
-              <a:rPr lang="pt-BR" sz="1800" err="1">
-                <a:solidFill>
-                  <a:srgbClr val="444444"/>
-                </a:solidFill>
-                <a:effectLst/>
-                <a:latin typeface="Open Sans" panose="020B0606030504020204" pitchFamily="34" charset="0"/>
-                <a:ea typeface="Times New Roman" panose="02020603050405020304" pitchFamily="18" charset="0"/>
-              </a:rPr>
-              <a:t>Mysql</a:t>
-            </a:r>
-            <a:r>
-              <a:rPr lang="pt-BR" sz="1800">
-                <a:solidFill>
-                  <a:srgbClr val="444444"/>
-                </a:solidFill>
-                <a:effectLst/>
-                <a:latin typeface="Open Sans" panose="020B0606030504020204" pitchFamily="34" charset="0"/>
-                <a:ea typeface="Times New Roman" panose="02020603050405020304" pitchFamily="18" charset="0"/>
-              </a:rPr>
-              <a:t>, </a:t>
-            </a:r>
-            <a:r>
-              <a:rPr lang="pt-BR" sz="1800" err="1">
-                <a:solidFill>
-                  <a:srgbClr val="444444"/>
-                </a:solidFill>
-                <a:effectLst/>
-                <a:latin typeface="Open Sans" panose="020B0606030504020204" pitchFamily="34" charset="0"/>
-                <a:ea typeface="Times New Roman" panose="02020603050405020304" pitchFamily="18" charset="0"/>
-              </a:rPr>
-              <a:t>Firebird</a:t>
-            </a:r>
-            <a:r>
-              <a:rPr lang="pt-BR" sz="1800">
-                <a:solidFill>
-                  <a:srgbClr val="444444"/>
-                </a:solidFill>
-                <a:effectLst/>
-                <a:latin typeface="Open Sans" panose="020B0606030504020204" pitchFamily="34" charset="0"/>
-                <a:ea typeface="Times New Roman" panose="02020603050405020304" pitchFamily="18" charset="0"/>
-              </a:rPr>
-              <a:t>, PostgreSQL);</a:t>
-            </a:r>
-          </a:p>
-          <a:p>
-            <a:pPr algn="just">
-              <a:spcBef>
-                <a:spcPts val="1125"/>
-              </a:spcBef>
+              <a:t>: Permite a visualização da quantidade de alunos matriculados por mês</a:t>
+            </a:r>
+            <a:r>
+              <a:rPr lang="pt-BR" dirty="0"/>
+              <a:t>, definindo o ano a ser plotado.</a:t>
+            </a:r>
+            <a:endParaRPr lang="pt-BR" dirty="0">
+              <a:effectLst/>
+            </a:endParaRPr>
+          </a:p>
+        </p:txBody>
+      </p:sp>
+      <p:pic>
+        <p:nvPicPr>
+          <p:cNvPr id="15" name="Imagem 14" descr="Gráfico, Gráfico de barras&#10;&#10;Descrição gerada automaticamente">
+            <a:extLst>
+              <a:ext uri="{FF2B5EF4-FFF2-40B4-BE49-F238E27FC236}">
+                <a16:creationId xmlns:a16="http://schemas.microsoft.com/office/drawing/2014/main" id="{F7BEBD5A-FFC8-C209-605B-E6CCE31E6913}"/>
+              </a:ext>
+            </a:extLst>
+          </p:cNvPr>
+          <p:cNvPicPr>
+            <a:picLocks noChangeAspect="1"/>
+          </p:cNvPicPr>
+          <p:nvPr/>
+        </p:nvPicPr>
+        <p:blipFill>
+          <a:blip r:embed="rId3"/>
+          <a:stretch>
+            <a:fillRect/>
+          </a:stretch>
+        </p:blipFill>
+        <p:spPr>
+          <a:xfrm>
+            <a:off x="4279900" y="1651000"/>
+            <a:ext cx="7034277" cy="4525962"/>
+          </a:xfrm>
+          <a:prstGeom prst="rect">
+            <a:avLst/>
+          </a:prstGeom>
+          <a:noFill/>
+        </p:spPr>
+      </p:pic>
+      <p:sp>
+        <p:nvSpPr>
+          <p:cNvPr id="4" name="Espaço Reservado para Data 3">
+            <a:extLst>
+              <a:ext uri="{FF2B5EF4-FFF2-40B4-BE49-F238E27FC236}">
+                <a16:creationId xmlns:a16="http://schemas.microsoft.com/office/drawing/2014/main" id="{B5CD56CE-6344-B9BE-87D6-EFE91A4AD13F}"/>
+              </a:ext>
+            </a:extLst>
+          </p:cNvPr>
+          <p:cNvSpPr>
+            <a:spLocks noGrp="1"/>
+          </p:cNvSpPr>
+          <p:nvPr>
+            <p:ph type="dt" sz="half" idx="10"/>
+          </p:nvPr>
+        </p:nvSpPr>
+        <p:spPr>
+          <a:xfrm>
+            <a:off x="4279900" y="6176962"/>
+            <a:ext cx="5218176" cy="365125"/>
+          </a:xfrm>
+        </p:spPr>
+        <p:txBody>
+          <a:bodyPr anchor="ctr">
+            <a:normAutofit/>
+          </a:bodyPr>
+          <a:lstStyle/>
+          <a:p>
+            <a:pPr>
               <a:spcAft>
-                <a:spcPts val="1125"/>
+                <a:spcPts val="600"/>
               </a:spcAft>
             </a:pPr>
             <a:r>
-              <a:rPr lang="pt-BR" sz="1800">
-                <a:solidFill>
-                  <a:srgbClr val="444444"/>
-                </a:solidFill>
-                <a:effectLst/>
-                <a:latin typeface="Open Sans" panose="020B0606030504020204" pitchFamily="34" charset="0"/>
-                <a:ea typeface="Times New Roman" panose="02020603050405020304" pitchFamily="18" charset="0"/>
-              </a:rPr>
-              <a:t>Linguagem de programação: Python</a:t>
-            </a:r>
-          </a:p>
-          <a:p>
-            <a:pPr algn="just">
-              <a:spcBef>
-                <a:spcPts val="1125"/>
-              </a:spcBef>
+              <a:rPr lang="en-US" b="1" dirty="0"/>
+              <a:t>FigurA18 – </a:t>
+            </a:r>
+            <a:r>
+              <a:rPr lang="en-US" b="1" dirty="0" err="1"/>
+              <a:t>tela</a:t>
+            </a:r>
+            <a:r>
+              <a:rPr lang="en-US" b="1" dirty="0"/>
+              <a:t> de RELATORIO </a:t>
+            </a:r>
+            <a:r>
+              <a:rPr lang="en-US" b="1" dirty="0" err="1"/>
+              <a:t>alunos</a:t>
+            </a:r>
+            <a:r>
+              <a:rPr lang="en-US" b="1" dirty="0"/>
+              <a:t> </a:t>
+            </a:r>
+            <a:r>
+              <a:rPr lang="en-US" b="1" dirty="0" err="1"/>
+              <a:t>matriculados</a:t>
+            </a:r>
+            <a:r>
+              <a:rPr lang="en-US" b="1" dirty="0"/>
+              <a:t> </a:t>
+            </a:r>
+            <a:r>
+              <a:rPr lang="en-US" b="1" dirty="0" err="1"/>
+              <a:t>mes</a:t>
+            </a:r>
+            <a:endParaRPr lang="en-US" b="1" dirty="0"/>
+          </a:p>
+        </p:txBody>
+      </p:sp>
+      <p:sp>
+        <p:nvSpPr>
+          <p:cNvPr id="6" name="Espaço Reservado para Número de Slide 5">
+            <a:extLst>
+              <a:ext uri="{FF2B5EF4-FFF2-40B4-BE49-F238E27FC236}">
+                <a16:creationId xmlns:a16="http://schemas.microsoft.com/office/drawing/2014/main" id="{17C1FDB0-E8D7-EED5-08D1-BA4692417350}"/>
+              </a:ext>
+            </a:extLst>
+          </p:cNvPr>
+          <p:cNvSpPr>
+            <a:spLocks noGrp="1"/>
+          </p:cNvSpPr>
+          <p:nvPr>
+            <p:ph type="sldNum" sz="quarter" idx="12"/>
+          </p:nvPr>
+        </p:nvSpPr>
+        <p:spPr>
+          <a:xfrm>
+            <a:off x="11429999" y="6356350"/>
+            <a:ext cx="521207" cy="365125"/>
+          </a:xfrm>
+        </p:spPr>
+        <p:txBody>
+          <a:bodyPr anchor="ctr">
+            <a:normAutofit/>
+          </a:bodyPr>
+          <a:lstStyle/>
+          <a:p>
+            <a:pPr>
               <a:spcAft>
-                <a:spcPts val="1125"/>
+                <a:spcPts val="600"/>
               </a:spcAft>
             </a:pPr>
-            <a:r>
-              <a:rPr lang="pt-BR" sz="1800">
-                <a:solidFill>
-                  <a:srgbClr val="444444"/>
-                </a:solidFill>
-                <a:effectLst/>
-                <a:latin typeface="Open Sans" panose="020B0606030504020204" pitchFamily="34" charset="0"/>
-                <a:ea typeface="Times New Roman" panose="02020603050405020304" pitchFamily="18" charset="0"/>
-              </a:rPr>
-              <a:t>IDE: </a:t>
-            </a:r>
-            <a:r>
-              <a:rPr lang="pt-BR" sz="1800" err="1">
-                <a:solidFill>
-                  <a:srgbClr val="444444"/>
-                </a:solidFill>
-                <a:effectLst/>
-                <a:latin typeface="Open Sans" panose="020B0606030504020204" pitchFamily="34" charset="0"/>
-                <a:ea typeface="Times New Roman" panose="02020603050405020304" pitchFamily="18" charset="0"/>
-              </a:rPr>
-              <a:t>PyCharm</a:t>
-            </a:r>
-            <a:r>
-              <a:rPr lang="pt-BR" sz="1800">
-                <a:solidFill>
-                  <a:srgbClr val="444444"/>
-                </a:solidFill>
-                <a:effectLst/>
-                <a:latin typeface="Open Sans" panose="020B0606030504020204" pitchFamily="34" charset="0"/>
-                <a:ea typeface="Times New Roman" panose="02020603050405020304" pitchFamily="18" charset="0"/>
-              </a:rPr>
-              <a:t> CE</a:t>
-            </a:r>
-          </a:p>
-          <a:p>
-            <a:pPr algn="just">
-              <a:spcBef>
-                <a:spcPts val="1125"/>
-              </a:spcBef>
-              <a:spcAft>
-                <a:spcPts val="1125"/>
-              </a:spcAft>
-            </a:pPr>
-            <a:r>
-              <a:rPr lang="pt-BR" sz="1800">
-                <a:solidFill>
-                  <a:srgbClr val="444444"/>
-                </a:solidFill>
-                <a:effectLst/>
-                <a:latin typeface="Open Sans" panose="020B0606030504020204" pitchFamily="34" charset="0"/>
-                <a:ea typeface="Times New Roman" panose="02020603050405020304" pitchFamily="18" charset="0"/>
-              </a:rPr>
-              <a:t>Computador requerido: Processador com 1 </a:t>
-            </a:r>
-            <a:r>
-              <a:rPr lang="pt-BR" sz="1800" err="1">
-                <a:solidFill>
-                  <a:srgbClr val="444444"/>
-                </a:solidFill>
-                <a:effectLst/>
-                <a:latin typeface="Open Sans" panose="020B0606030504020204" pitchFamily="34" charset="0"/>
-                <a:ea typeface="Times New Roman" panose="02020603050405020304" pitchFamily="18" charset="0"/>
-              </a:rPr>
-              <a:t>Ghz</a:t>
-            </a:r>
-            <a:r>
-              <a:rPr lang="pt-BR" sz="1800">
-                <a:solidFill>
-                  <a:srgbClr val="444444"/>
-                </a:solidFill>
-                <a:effectLst/>
-                <a:latin typeface="Open Sans" panose="020B0606030504020204" pitchFamily="34" charset="0"/>
-                <a:ea typeface="Times New Roman" panose="02020603050405020304" pitchFamily="18" charset="0"/>
-              </a:rPr>
-              <a:t>, memória de 512Mb, espaço em disco de no mínimo 1 Gb, resolução 1024x768 (nesta configuração uso máximo de 3 equipamentos de controle de acesso);</a:t>
-            </a:r>
-          </a:p>
-          <a:p>
-            <a:pPr algn="just">
-              <a:spcBef>
-                <a:spcPts val="1125"/>
-              </a:spcBef>
-              <a:spcAft>
-                <a:spcPts val="1125"/>
-              </a:spcAft>
-            </a:pPr>
-            <a:r>
-              <a:rPr lang="pt-BR" sz="1800">
-                <a:solidFill>
-                  <a:srgbClr val="444444"/>
-                </a:solidFill>
-                <a:effectLst/>
-                <a:latin typeface="Open Sans" panose="020B0606030504020204" pitchFamily="34" charset="0"/>
-                <a:ea typeface="Times New Roman" panose="02020603050405020304" pitchFamily="18" charset="0"/>
-              </a:rPr>
-              <a:t>Computador sugerido: </a:t>
-            </a:r>
-            <a:r>
-              <a:rPr lang="pt-BR" sz="1800" err="1">
-                <a:solidFill>
-                  <a:srgbClr val="444444"/>
-                </a:solidFill>
-                <a:effectLst/>
-                <a:latin typeface="Open Sans" panose="020B0606030504020204" pitchFamily="34" charset="0"/>
-                <a:ea typeface="Times New Roman" panose="02020603050405020304" pitchFamily="18" charset="0"/>
-              </a:rPr>
-              <a:t>Multi-processador</a:t>
-            </a:r>
-            <a:r>
-              <a:rPr lang="pt-BR" sz="1800">
-                <a:solidFill>
-                  <a:srgbClr val="444444"/>
-                </a:solidFill>
-                <a:effectLst/>
-                <a:latin typeface="Open Sans" panose="020B0606030504020204" pitchFamily="34" charset="0"/>
-                <a:ea typeface="Times New Roman" panose="02020603050405020304" pitchFamily="18" charset="0"/>
-              </a:rPr>
-              <a:t> acima de 3 </a:t>
-            </a:r>
-            <a:r>
-              <a:rPr lang="pt-BR" sz="1800" err="1">
-                <a:solidFill>
-                  <a:srgbClr val="444444"/>
-                </a:solidFill>
-                <a:effectLst/>
-                <a:latin typeface="Open Sans" panose="020B0606030504020204" pitchFamily="34" charset="0"/>
-                <a:ea typeface="Times New Roman" panose="02020603050405020304" pitchFamily="18" charset="0"/>
-              </a:rPr>
-              <a:t>Ghz</a:t>
-            </a:r>
-            <a:r>
-              <a:rPr lang="pt-BR" sz="1800">
-                <a:solidFill>
-                  <a:srgbClr val="444444"/>
-                </a:solidFill>
-                <a:effectLst/>
-                <a:latin typeface="Open Sans" panose="020B0606030504020204" pitchFamily="34" charset="0"/>
-                <a:ea typeface="Times New Roman" panose="02020603050405020304" pitchFamily="18" charset="0"/>
-              </a:rPr>
-              <a:t> (</a:t>
-            </a:r>
-            <a:r>
-              <a:rPr lang="pt-BR" sz="1800" err="1">
-                <a:solidFill>
-                  <a:srgbClr val="444444"/>
-                </a:solidFill>
-                <a:effectLst/>
-                <a:latin typeface="Open Sans" panose="020B0606030504020204" pitchFamily="34" charset="0"/>
-                <a:ea typeface="Times New Roman" panose="02020603050405020304" pitchFamily="18" charset="0"/>
-              </a:rPr>
-              <a:t>multi-core</a:t>
-            </a:r>
-            <a:r>
-              <a:rPr lang="pt-BR" sz="1800">
-                <a:solidFill>
-                  <a:srgbClr val="444444"/>
-                </a:solidFill>
-                <a:effectLst/>
-                <a:latin typeface="Open Sans" panose="020B0606030504020204" pitchFamily="34" charset="0"/>
-                <a:ea typeface="Times New Roman" panose="02020603050405020304" pitchFamily="18" charset="0"/>
-              </a:rPr>
-              <a:t> ou vários processadores), memória de 4 Gb, espaço em disco de, no mínimo 10 Gb, resolução 1024x768;</a:t>
-            </a:r>
-            <a:endParaRPr lang="pt-BR" sz="1800">
-              <a:effectLst/>
-              <a:latin typeface="Times New Roman" panose="02020603050405020304" pitchFamily="18" charset="0"/>
-              <a:ea typeface="Times New Roman" panose="02020603050405020304" pitchFamily="18" charset="0"/>
-            </a:endParaRPr>
-          </a:p>
-        </p:txBody>
-      </p:sp>
-      <p:sp>
-        <p:nvSpPr>
-          <p:cNvPr id="6" name="Espaço Reservado para Número de Slide 5">
-            <a:extLst>
-              <a:ext uri="{FF2B5EF4-FFF2-40B4-BE49-F238E27FC236}">
-                <a16:creationId xmlns:a16="http://schemas.microsoft.com/office/drawing/2014/main" id="{08B0DBC5-EA0D-F917-B4DD-EF346E432987}"/>
-              </a:ext>
-            </a:extLst>
-          </p:cNvPr>
-          <p:cNvSpPr>
-            <a:spLocks noGrp="1"/>
-          </p:cNvSpPr>
-          <p:nvPr>
-            <p:ph type="sldNum" sz="quarter" idx="12"/>
-          </p:nvPr>
-        </p:nvSpPr>
-        <p:spPr/>
-        <p:txBody>
-          <a:bodyPr/>
-          <a:lstStyle/>
-          <a:p>
             <a:fld id="{C68AC1EC-23E2-4F0E-A5A4-674EC8DB954E}" type="slidenum">
               <a:rPr lang="en-US" smtClean="0"/>
+              <a:pPr>
+                <a:spcAft>
+                  <a:spcPts val="600"/>
+                </a:spcAft>
+              </a:pPr>
               <a:t>18</a:t>
             </a:fld>
             <a:endParaRPr lang="en-US"/>
@@ -8467,7 +8425,7 @@
     </p:spTree>
     <p:extLst>
       <p:ext uri="{BB962C8B-B14F-4D97-AF65-F5344CB8AC3E}">
-        <p14:creationId xmlns:p14="http://schemas.microsoft.com/office/powerpoint/2010/main" val="1045391905"/>
+        <p14:creationId xmlns:p14="http://schemas.microsoft.com/office/powerpoint/2010/main" val="1675736896"/>
       </p:ext>
     </p:extLst>
   </p:cSld>
@@ -8517,6 +8475,699 @@
           <a:p>
             <a:r>
               <a:rPr lang="pt-BR" b="1" dirty="0"/>
+              <a:t>ESPECIFICAÇÕES TÉCNICAS</a:t>
+            </a:r>
+            <a:br>
+              <a:rPr lang="pt-BR" b="1" dirty="0"/>
+            </a:br>
+            <a:endParaRPr lang="pt-BR" b="1" dirty="0"/>
+          </a:p>
+        </p:txBody>
+      </p:sp>
+      <p:sp>
+        <p:nvSpPr>
+          <p:cNvPr id="3" name="Espaço Reservado para Conteúdo 2">
+            <a:extLst>
+              <a:ext uri="{FF2B5EF4-FFF2-40B4-BE49-F238E27FC236}">
+                <a16:creationId xmlns:a16="http://schemas.microsoft.com/office/drawing/2014/main" id="{42456B08-C54C-1760-7377-187C86252AED}"/>
+              </a:ext>
+            </a:extLst>
+          </p:cNvPr>
+          <p:cNvSpPr>
+            <a:spLocks noGrp="1"/>
+          </p:cNvSpPr>
+          <p:nvPr>
+            <p:ph idx="1"/>
+          </p:nvPr>
+        </p:nvSpPr>
+        <p:spPr>
+          <a:xfrm>
+            <a:off x="877824" y="1854173"/>
+            <a:ext cx="10442448" cy="3903819"/>
+          </a:xfrm>
+        </p:spPr>
+        <p:txBody>
+          <a:bodyPr>
+            <a:normAutofit fontScale="92500" lnSpcReduction="10000"/>
+          </a:bodyPr>
+          <a:lstStyle/>
+          <a:p>
+            <a:pPr algn="just">
+              <a:spcBef>
+                <a:spcPts val="1125"/>
+              </a:spcBef>
+              <a:spcAft>
+                <a:spcPts val="1125"/>
+              </a:spcAft>
+            </a:pPr>
+            <a:r>
+              <a:rPr lang="pt-BR" sz="1800">
+                <a:solidFill>
+                  <a:srgbClr val="444444"/>
+                </a:solidFill>
+                <a:effectLst/>
+                <a:latin typeface="Open Sans" panose="020B0606030504020204" pitchFamily="34" charset="0"/>
+                <a:ea typeface="Times New Roman" panose="02020603050405020304" pitchFamily="18" charset="0"/>
+              </a:rPr>
+              <a:t>Banco de Dados: padrão do sistema em </a:t>
+            </a:r>
+            <a:r>
+              <a:rPr lang="pt-BR" sz="1800" err="1">
+                <a:solidFill>
+                  <a:srgbClr val="444444"/>
+                </a:solidFill>
+                <a:effectLst/>
+                <a:latin typeface="Open Sans" panose="020B0606030504020204" pitchFamily="34" charset="0"/>
+                <a:ea typeface="Times New Roman" panose="02020603050405020304" pitchFamily="18" charset="0"/>
+              </a:rPr>
+              <a:t>SQLite</a:t>
+            </a:r>
+            <a:r>
+              <a:rPr lang="pt-BR" sz="1800">
+                <a:solidFill>
+                  <a:srgbClr val="444444"/>
+                </a:solidFill>
+                <a:effectLst/>
+                <a:latin typeface="Open Sans" panose="020B0606030504020204" pitchFamily="34" charset="0"/>
+                <a:ea typeface="Times New Roman" panose="02020603050405020304" pitchFamily="18" charset="0"/>
+              </a:rPr>
+              <a:t>, podendo no entanto, ser utilizado com a maioria dos bancos de dados atualmente disponíveis (Oracle, Sybase, </a:t>
+            </a:r>
+            <a:r>
+              <a:rPr lang="pt-BR" sz="1800" err="1">
+                <a:solidFill>
+                  <a:srgbClr val="444444"/>
+                </a:solidFill>
+                <a:effectLst/>
+                <a:latin typeface="Open Sans" panose="020B0606030504020204" pitchFamily="34" charset="0"/>
+                <a:ea typeface="Times New Roman" panose="02020603050405020304" pitchFamily="18" charset="0"/>
+              </a:rPr>
+              <a:t>Mysql</a:t>
+            </a:r>
+            <a:r>
+              <a:rPr lang="pt-BR" sz="1800">
+                <a:solidFill>
+                  <a:srgbClr val="444444"/>
+                </a:solidFill>
+                <a:effectLst/>
+                <a:latin typeface="Open Sans" panose="020B0606030504020204" pitchFamily="34" charset="0"/>
+                <a:ea typeface="Times New Roman" panose="02020603050405020304" pitchFamily="18" charset="0"/>
+              </a:rPr>
+              <a:t>, </a:t>
+            </a:r>
+            <a:r>
+              <a:rPr lang="pt-BR" sz="1800" err="1">
+                <a:solidFill>
+                  <a:srgbClr val="444444"/>
+                </a:solidFill>
+                <a:effectLst/>
+                <a:latin typeface="Open Sans" panose="020B0606030504020204" pitchFamily="34" charset="0"/>
+                <a:ea typeface="Times New Roman" panose="02020603050405020304" pitchFamily="18" charset="0"/>
+              </a:rPr>
+              <a:t>Firebird</a:t>
+            </a:r>
+            <a:r>
+              <a:rPr lang="pt-BR" sz="1800">
+                <a:solidFill>
+                  <a:srgbClr val="444444"/>
+                </a:solidFill>
+                <a:effectLst/>
+                <a:latin typeface="Open Sans" panose="020B0606030504020204" pitchFamily="34" charset="0"/>
+                <a:ea typeface="Times New Roman" panose="02020603050405020304" pitchFamily="18" charset="0"/>
+              </a:rPr>
+              <a:t>, PostgreSQL);</a:t>
+            </a:r>
+          </a:p>
+          <a:p>
+            <a:pPr algn="just">
+              <a:spcBef>
+                <a:spcPts val="1125"/>
+              </a:spcBef>
+              <a:spcAft>
+                <a:spcPts val="1125"/>
+              </a:spcAft>
+            </a:pPr>
+            <a:r>
+              <a:rPr lang="pt-BR" sz="1800">
+                <a:solidFill>
+                  <a:srgbClr val="444444"/>
+                </a:solidFill>
+                <a:effectLst/>
+                <a:latin typeface="Open Sans" panose="020B0606030504020204" pitchFamily="34" charset="0"/>
+                <a:ea typeface="Times New Roman" panose="02020603050405020304" pitchFamily="18" charset="0"/>
+              </a:rPr>
+              <a:t>Linguagem de programação: Python</a:t>
+            </a:r>
+          </a:p>
+          <a:p>
+            <a:pPr algn="just">
+              <a:spcBef>
+                <a:spcPts val="1125"/>
+              </a:spcBef>
+              <a:spcAft>
+                <a:spcPts val="1125"/>
+              </a:spcAft>
+            </a:pPr>
+            <a:r>
+              <a:rPr lang="pt-BR" sz="1800">
+                <a:solidFill>
+                  <a:srgbClr val="444444"/>
+                </a:solidFill>
+                <a:effectLst/>
+                <a:latin typeface="Open Sans" panose="020B0606030504020204" pitchFamily="34" charset="0"/>
+                <a:ea typeface="Times New Roman" panose="02020603050405020304" pitchFamily="18" charset="0"/>
+              </a:rPr>
+              <a:t>IDE: </a:t>
+            </a:r>
+            <a:r>
+              <a:rPr lang="pt-BR" sz="1800" err="1">
+                <a:solidFill>
+                  <a:srgbClr val="444444"/>
+                </a:solidFill>
+                <a:effectLst/>
+                <a:latin typeface="Open Sans" panose="020B0606030504020204" pitchFamily="34" charset="0"/>
+                <a:ea typeface="Times New Roman" panose="02020603050405020304" pitchFamily="18" charset="0"/>
+              </a:rPr>
+              <a:t>PyCharm</a:t>
+            </a:r>
+            <a:r>
+              <a:rPr lang="pt-BR" sz="1800">
+                <a:solidFill>
+                  <a:srgbClr val="444444"/>
+                </a:solidFill>
+                <a:effectLst/>
+                <a:latin typeface="Open Sans" panose="020B0606030504020204" pitchFamily="34" charset="0"/>
+                <a:ea typeface="Times New Roman" panose="02020603050405020304" pitchFamily="18" charset="0"/>
+              </a:rPr>
+              <a:t> CE</a:t>
+            </a:r>
+          </a:p>
+          <a:p>
+            <a:pPr algn="just">
+              <a:spcBef>
+                <a:spcPts val="1125"/>
+              </a:spcBef>
+              <a:spcAft>
+                <a:spcPts val="1125"/>
+              </a:spcAft>
+            </a:pPr>
+            <a:r>
+              <a:rPr lang="pt-BR" sz="1800">
+                <a:solidFill>
+                  <a:srgbClr val="444444"/>
+                </a:solidFill>
+                <a:effectLst/>
+                <a:latin typeface="Open Sans" panose="020B0606030504020204" pitchFamily="34" charset="0"/>
+                <a:ea typeface="Times New Roman" panose="02020603050405020304" pitchFamily="18" charset="0"/>
+              </a:rPr>
+              <a:t>Computador requerido: Processador com 1 </a:t>
+            </a:r>
+            <a:r>
+              <a:rPr lang="pt-BR" sz="1800" err="1">
+                <a:solidFill>
+                  <a:srgbClr val="444444"/>
+                </a:solidFill>
+                <a:effectLst/>
+                <a:latin typeface="Open Sans" panose="020B0606030504020204" pitchFamily="34" charset="0"/>
+                <a:ea typeface="Times New Roman" panose="02020603050405020304" pitchFamily="18" charset="0"/>
+              </a:rPr>
+              <a:t>Ghz</a:t>
+            </a:r>
+            <a:r>
+              <a:rPr lang="pt-BR" sz="1800">
+                <a:solidFill>
+                  <a:srgbClr val="444444"/>
+                </a:solidFill>
+                <a:effectLst/>
+                <a:latin typeface="Open Sans" panose="020B0606030504020204" pitchFamily="34" charset="0"/>
+                <a:ea typeface="Times New Roman" panose="02020603050405020304" pitchFamily="18" charset="0"/>
+              </a:rPr>
+              <a:t>, memória de 512Mb, espaço em disco de no mínimo 1 Gb, resolução 1024x768 (nesta configuração uso máximo de 3 equipamentos de controle de acesso);</a:t>
+            </a:r>
+          </a:p>
+          <a:p>
+            <a:pPr algn="just">
+              <a:spcBef>
+                <a:spcPts val="1125"/>
+              </a:spcBef>
+              <a:spcAft>
+                <a:spcPts val="1125"/>
+              </a:spcAft>
+            </a:pPr>
+            <a:r>
+              <a:rPr lang="pt-BR" sz="1800">
+                <a:solidFill>
+                  <a:srgbClr val="444444"/>
+                </a:solidFill>
+                <a:effectLst/>
+                <a:latin typeface="Open Sans" panose="020B0606030504020204" pitchFamily="34" charset="0"/>
+                <a:ea typeface="Times New Roman" panose="02020603050405020304" pitchFamily="18" charset="0"/>
+              </a:rPr>
+              <a:t>Computador sugerido: </a:t>
+            </a:r>
+            <a:r>
+              <a:rPr lang="pt-BR" sz="1800" err="1">
+                <a:solidFill>
+                  <a:srgbClr val="444444"/>
+                </a:solidFill>
+                <a:effectLst/>
+                <a:latin typeface="Open Sans" panose="020B0606030504020204" pitchFamily="34" charset="0"/>
+                <a:ea typeface="Times New Roman" panose="02020603050405020304" pitchFamily="18" charset="0"/>
+              </a:rPr>
+              <a:t>Multi-processador</a:t>
+            </a:r>
+            <a:r>
+              <a:rPr lang="pt-BR" sz="1800">
+                <a:solidFill>
+                  <a:srgbClr val="444444"/>
+                </a:solidFill>
+                <a:effectLst/>
+                <a:latin typeface="Open Sans" panose="020B0606030504020204" pitchFamily="34" charset="0"/>
+                <a:ea typeface="Times New Roman" panose="02020603050405020304" pitchFamily="18" charset="0"/>
+              </a:rPr>
+              <a:t> acima de 3 </a:t>
+            </a:r>
+            <a:r>
+              <a:rPr lang="pt-BR" sz="1800" err="1">
+                <a:solidFill>
+                  <a:srgbClr val="444444"/>
+                </a:solidFill>
+                <a:effectLst/>
+                <a:latin typeface="Open Sans" panose="020B0606030504020204" pitchFamily="34" charset="0"/>
+                <a:ea typeface="Times New Roman" panose="02020603050405020304" pitchFamily="18" charset="0"/>
+              </a:rPr>
+              <a:t>Ghz</a:t>
+            </a:r>
+            <a:r>
+              <a:rPr lang="pt-BR" sz="1800">
+                <a:solidFill>
+                  <a:srgbClr val="444444"/>
+                </a:solidFill>
+                <a:effectLst/>
+                <a:latin typeface="Open Sans" panose="020B0606030504020204" pitchFamily="34" charset="0"/>
+                <a:ea typeface="Times New Roman" panose="02020603050405020304" pitchFamily="18" charset="0"/>
+              </a:rPr>
+              <a:t> (</a:t>
+            </a:r>
+            <a:r>
+              <a:rPr lang="pt-BR" sz="1800" err="1">
+                <a:solidFill>
+                  <a:srgbClr val="444444"/>
+                </a:solidFill>
+                <a:effectLst/>
+                <a:latin typeface="Open Sans" panose="020B0606030504020204" pitchFamily="34" charset="0"/>
+                <a:ea typeface="Times New Roman" panose="02020603050405020304" pitchFamily="18" charset="0"/>
+              </a:rPr>
+              <a:t>multi-core</a:t>
+            </a:r>
+            <a:r>
+              <a:rPr lang="pt-BR" sz="1800">
+                <a:solidFill>
+                  <a:srgbClr val="444444"/>
+                </a:solidFill>
+                <a:effectLst/>
+                <a:latin typeface="Open Sans" panose="020B0606030504020204" pitchFamily="34" charset="0"/>
+                <a:ea typeface="Times New Roman" panose="02020603050405020304" pitchFamily="18" charset="0"/>
+              </a:rPr>
+              <a:t> ou vários processadores), memória de 4 Gb, espaço em disco de, no mínimo 10 Gb, resolução 1024x768;</a:t>
+            </a:r>
+            <a:endParaRPr lang="pt-BR" sz="1800">
+              <a:effectLst/>
+              <a:latin typeface="Times New Roman" panose="02020603050405020304" pitchFamily="18" charset="0"/>
+              <a:ea typeface="Times New Roman" panose="02020603050405020304" pitchFamily="18" charset="0"/>
+            </a:endParaRPr>
+          </a:p>
+        </p:txBody>
+      </p:sp>
+      <p:sp>
+        <p:nvSpPr>
+          <p:cNvPr id="6" name="Espaço Reservado para Número de Slide 5">
+            <a:extLst>
+              <a:ext uri="{FF2B5EF4-FFF2-40B4-BE49-F238E27FC236}">
+                <a16:creationId xmlns:a16="http://schemas.microsoft.com/office/drawing/2014/main" id="{08B0DBC5-EA0D-F917-B4DD-EF346E432987}"/>
+              </a:ext>
+            </a:extLst>
+          </p:cNvPr>
+          <p:cNvSpPr>
+            <a:spLocks noGrp="1"/>
+          </p:cNvSpPr>
+          <p:nvPr>
+            <p:ph type="sldNum" sz="quarter" idx="12"/>
+          </p:nvPr>
+        </p:nvSpPr>
+        <p:spPr/>
+        <p:txBody>
+          <a:bodyPr/>
+          <a:lstStyle/>
+          <a:p>
+            <a:fld id="{C68AC1EC-23E2-4F0E-A5A4-674EC8DB954E}" type="slidenum">
+              <a:rPr lang="en-US" smtClean="0"/>
+              <a:t>19</a:t>
+            </a:fld>
+            <a:endParaRPr lang="en-US"/>
+          </a:p>
+        </p:txBody>
+      </p:sp>
+    </p:spTree>
+    <p:extLst>
+      <p:ext uri="{BB962C8B-B14F-4D97-AF65-F5344CB8AC3E}">
+        <p14:creationId xmlns:p14="http://schemas.microsoft.com/office/powerpoint/2010/main" val="1045391905"/>
+      </p:ext>
+    </p:extLst>
+  </p:cSld>
+  <p:clrMapOvr>
+    <a:masterClrMapping/>
+  </p:clrMapOvr>
+</p:sld>
+</file>
+
+<file path=ppt/slides/slide2.xml><?xml version="1.0" encoding="utf-8"?>
+<p:sld xmlns:a="http://schemas.openxmlformats.org/drawingml/2006/main" xmlns:r="http://schemas.openxmlformats.org/officeDocument/2006/relationships" xmlns:p="http://schemas.openxmlformats.org/presentationml/2006/main">
+  <p:cSld>
+    <p:spTree>
+      <p:nvGrpSpPr>
+        <p:cNvPr id="1" name=""/>
+        <p:cNvGrpSpPr/>
+        <p:nvPr/>
+      </p:nvGrpSpPr>
+      <p:grpSpPr>
+        <a:xfrm>
+          <a:off x="0" y="0"/>
+          <a:ext cx="0" cy="0"/>
+          <a:chOff x="0" y="0"/>
+          <a:chExt cx="0" cy="0"/>
+        </a:xfrm>
+      </p:grpSpPr>
+      <p:sp>
+        <p:nvSpPr>
+          <p:cNvPr id="2" name="Título 1">
+            <a:extLst>
+              <a:ext uri="{FF2B5EF4-FFF2-40B4-BE49-F238E27FC236}">
+                <a16:creationId xmlns:a16="http://schemas.microsoft.com/office/drawing/2014/main" id="{5B18BC5C-418B-9723-B5E9-1EE52F22D23B}"/>
+              </a:ext>
+            </a:extLst>
+          </p:cNvPr>
+          <p:cNvSpPr>
+            <a:spLocks noGrp="1"/>
+          </p:cNvSpPr>
+          <p:nvPr>
+            <p:ph type="title"/>
+          </p:nvPr>
+        </p:nvSpPr>
+        <p:spPr>
+          <a:xfrm>
+            <a:off x="1155700" y="1252368"/>
+            <a:ext cx="5842000" cy="1097132"/>
+          </a:xfrm>
+        </p:spPr>
+        <p:txBody>
+          <a:bodyPr anchor="t">
+            <a:normAutofit fontScale="90000"/>
+          </a:bodyPr>
+          <a:lstStyle/>
+          <a:p>
+            <a:r>
+              <a:rPr lang="pt-BR" sz="3100" b="1" dirty="0"/>
+              <a:t>APRESENTAÇÃO DO SOFTWARE</a:t>
+            </a:r>
+            <a:br>
+              <a:rPr lang="pt-BR" dirty="0">
+                <a:effectLst/>
+              </a:rPr>
+            </a:br>
+            <a:endParaRPr lang="pt-BR" dirty="0"/>
+          </a:p>
+        </p:txBody>
+      </p:sp>
+      <p:pic>
+        <p:nvPicPr>
+          <p:cNvPr id="1026" name="Picture 2" descr="Diagrama&#10;&#10;Descrição gerada automaticamente">
+            <a:extLst>
+              <a:ext uri="{FF2B5EF4-FFF2-40B4-BE49-F238E27FC236}">
+                <a16:creationId xmlns:a16="http://schemas.microsoft.com/office/drawing/2014/main" id="{4F75B088-CAE1-5196-A146-20F86E979396}"/>
+              </a:ext>
+            </a:extLst>
+          </p:cNvPr>
+          <p:cNvPicPr>
+            <a:picLocks noChangeAspect="1" noChangeArrowheads="1"/>
+          </p:cNvPicPr>
+          <p:nvPr/>
+        </p:nvPicPr>
+        <p:blipFill>
+          <a:blip r:embed="rId2">
+            <a:extLst>
+              <a:ext uri="{28A0092B-C50C-407E-A947-70E740481C1C}">
+                <a14:useLocalDpi xmlns:a14="http://schemas.microsoft.com/office/drawing/2010/main" val="0"/>
+              </a:ext>
+            </a:extLst>
+          </a:blip>
+          <a:stretch>
+            <a:fillRect/>
+          </a:stretch>
+        </p:blipFill>
+        <p:spPr bwMode="auto">
+          <a:xfrm>
+            <a:off x="6633286" y="383458"/>
+            <a:ext cx="5121180" cy="5972891"/>
+          </a:xfrm>
+          <a:prstGeom prst="rect">
+            <a:avLst/>
+          </a:prstGeom>
+          <a:solidFill>
+            <a:srgbClr val="FFFFFF"/>
+          </a:solidFill>
+        </p:spPr>
+      </p:pic>
+      <p:sp>
+        <p:nvSpPr>
+          <p:cNvPr id="3" name="Espaço Reservado para Conteúdo 2">
+            <a:extLst>
+              <a:ext uri="{FF2B5EF4-FFF2-40B4-BE49-F238E27FC236}">
+                <a16:creationId xmlns:a16="http://schemas.microsoft.com/office/drawing/2014/main" id="{CFEA0649-8914-9CCB-0D86-13DB4CFD912E}"/>
+              </a:ext>
+            </a:extLst>
+          </p:cNvPr>
+          <p:cNvSpPr>
+            <a:spLocks noGrp="1"/>
+          </p:cNvSpPr>
+          <p:nvPr>
+            <p:ph type="body" sz="half" idx="2"/>
+          </p:nvPr>
+        </p:nvSpPr>
+        <p:spPr>
+          <a:xfrm>
+            <a:off x="839788" y="2123768"/>
+            <a:ext cx="5664251" cy="2684206"/>
+          </a:xfrm>
+        </p:spPr>
+        <p:txBody>
+          <a:bodyPr anchor="b">
+            <a:normAutofit/>
+          </a:bodyPr>
+          <a:lstStyle/>
+          <a:p>
+            <a:pPr marL="285750" indent="-285750" algn="just">
+              <a:buFont typeface="Arial" panose="020B0604020202020204" pitchFamily="34" charset="0"/>
+              <a:buChar char="•"/>
+            </a:pPr>
+            <a:r>
+              <a:rPr lang="pt-BR" dirty="0">
+                <a:effectLst/>
+              </a:rPr>
+              <a:t>O objetivo é controlar o cadastro de usuários, alunos e funcionários, bem como efetuar a gestão dos serviços oferecidos na forma de planos.</a:t>
+            </a:r>
+          </a:p>
+          <a:p>
+            <a:pPr marL="285750" indent="-285750" algn="just">
+              <a:buFont typeface="Arial" panose="020B0604020202020204" pitchFamily="34" charset="0"/>
+              <a:buChar char="•"/>
+            </a:pPr>
+            <a:r>
+              <a:rPr lang="pt-BR" dirty="0">
+                <a:effectLst/>
+              </a:rPr>
+              <a:t>Através de uma interface </a:t>
+            </a:r>
+            <a:r>
+              <a:rPr lang="pt-BR" dirty="0"/>
+              <a:t>simples</a:t>
+            </a:r>
+            <a:r>
+              <a:rPr lang="pt-BR" dirty="0">
+                <a:effectLst/>
+              </a:rPr>
+              <a:t> ele centraliza tarefas de controle de acesso, cadastro e segurança de maneira objetiva, tornando-se uma ferramenta ideal para o controle dos ativos de sua academia.</a:t>
+            </a:r>
+          </a:p>
+          <a:p>
+            <a:endParaRPr lang="pt-BR" sz="1500" dirty="0"/>
+          </a:p>
+        </p:txBody>
+      </p:sp>
+      <p:sp>
+        <p:nvSpPr>
+          <p:cNvPr id="4" name="Espaço Reservado para Data 3">
+            <a:extLst>
+              <a:ext uri="{FF2B5EF4-FFF2-40B4-BE49-F238E27FC236}">
+                <a16:creationId xmlns:a16="http://schemas.microsoft.com/office/drawing/2014/main" id="{D02EA9A5-FFAA-5034-0C87-55E0F42207C8}"/>
+              </a:ext>
+            </a:extLst>
+          </p:cNvPr>
+          <p:cNvSpPr>
+            <a:spLocks noGrp="1"/>
+          </p:cNvSpPr>
+          <p:nvPr>
+            <p:ph type="dt" sz="half" idx="10"/>
+          </p:nvPr>
+        </p:nvSpPr>
+        <p:spPr>
+          <a:xfrm>
+            <a:off x="6633286" y="6356350"/>
+            <a:ext cx="2982976" cy="365125"/>
+          </a:xfrm>
+        </p:spPr>
+        <p:txBody>
+          <a:bodyPr anchor="ctr">
+            <a:normAutofit/>
+          </a:bodyPr>
+          <a:lstStyle/>
+          <a:p>
+            <a:pPr>
+              <a:spcAft>
+                <a:spcPts val="600"/>
+              </a:spcAft>
+            </a:pPr>
+            <a:r>
+              <a:rPr lang="en-US" b="1" dirty="0" err="1"/>
+              <a:t>Figura</a:t>
+            </a:r>
+            <a:r>
+              <a:rPr lang="en-US" b="1" dirty="0"/>
+              <a:t> 1- </a:t>
+            </a:r>
+            <a:r>
+              <a:rPr lang="en-US" b="1" dirty="0" err="1"/>
+              <a:t>modelo</a:t>
+            </a:r>
+            <a:r>
+              <a:rPr lang="en-US" b="1" dirty="0"/>
+              <a:t> </a:t>
+            </a:r>
+            <a:r>
+              <a:rPr lang="en-US" b="1" dirty="0" err="1"/>
+              <a:t>caso</a:t>
+            </a:r>
+            <a:r>
+              <a:rPr lang="en-US" b="1" dirty="0"/>
+              <a:t> de </a:t>
+            </a:r>
+            <a:r>
+              <a:rPr lang="en-US" b="1" dirty="0" err="1"/>
+              <a:t>uso</a:t>
+            </a:r>
+            <a:endParaRPr lang="en-US" b="1" dirty="0"/>
+          </a:p>
+        </p:txBody>
+      </p:sp>
+      <p:sp>
+        <p:nvSpPr>
+          <p:cNvPr id="6" name="Espaço Reservado para Número de Slide 5">
+            <a:extLst>
+              <a:ext uri="{FF2B5EF4-FFF2-40B4-BE49-F238E27FC236}">
+                <a16:creationId xmlns:a16="http://schemas.microsoft.com/office/drawing/2014/main" id="{893BDAB9-7523-5E53-2381-25946788E257}"/>
+              </a:ext>
+            </a:extLst>
+          </p:cNvPr>
+          <p:cNvSpPr>
+            <a:spLocks noGrp="1"/>
+          </p:cNvSpPr>
+          <p:nvPr>
+            <p:ph type="sldNum" sz="quarter" idx="12"/>
+          </p:nvPr>
+        </p:nvSpPr>
+        <p:spPr>
+          <a:xfrm>
+            <a:off x="11429999" y="6356350"/>
+            <a:ext cx="521207" cy="365125"/>
+          </a:xfrm>
+        </p:spPr>
+        <p:txBody>
+          <a:bodyPr anchor="ctr">
+            <a:normAutofit/>
+          </a:bodyPr>
+          <a:lstStyle/>
+          <a:p>
+            <a:pPr>
+              <a:spcAft>
+                <a:spcPts val="600"/>
+              </a:spcAft>
+            </a:pPr>
+            <a:fld id="{C68AC1EC-23E2-4F0E-A5A4-674EC8DB954E}" type="slidenum">
+              <a:rPr lang="en-US" smtClean="0"/>
+              <a:pPr>
+                <a:spcAft>
+                  <a:spcPts val="600"/>
+                </a:spcAft>
+              </a:pPr>
+              <a:t>2</a:t>
+            </a:fld>
+            <a:endParaRPr lang="en-US" dirty="0"/>
+          </a:p>
+        </p:txBody>
+      </p:sp>
+    </p:spTree>
+    <p:extLst>
+      <p:ext uri="{BB962C8B-B14F-4D97-AF65-F5344CB8AC3E}">
+        <p14:creationId xmlns:p14="http://schemas.microsoft.com/office/powerpoint/2010/main" val="2534805862"/>
+      </p:ext>
+    </p:extLst>
+  </p:cSld>
+  <p:clrMapOvr>
+    <a:masterClrMapping/>
+  </p:clrMapOvr>
+</p:sld>
+</file>
+
+<file path=ppt/slides/slide20.xml><?xml version="1.0" encoding="utf-8"?>
+<p:sld xmlns:a="http://schemas.openxmlformats.org/drawingml/2006/main" xmlns:r="http://schemas.openxmlformats.org/officeDocument/2006/relationships" xmlns:p="http://schemas.openxmlformats.org/presentationml/2006/main">
+  <p:cSld>
+    <p:spTree>
+      <p:nvGrpSpPr>
+        <p:cNvPr id="1" name=""/>
+        <p:cNvGrpSpPr/>
+        <p:nvPr/>
+      </p:nvGrpSpPr>
+      <p:grpSpPr>
+        <a:xfrm>
+          <a:off x="0" y="0"/>
+          <a:ext cx="0" cy="0"/>
+          <a:chOff x="0" y="0"/>
+          <a:chExt cx="0" cy="0"/>
+        </a:xfrm>
+      </p:grpSpPr>
+      <p:sp>
+        <p:nvSpPr>
+          <p:cNvPr id="2" name="Título 1">
+            <a:extLst>
+              <a:ext uri="{FF2B5EF4-FFF2-40B4-BE49-F238E27FC236}">
+                <a16:creationId xmlns:a16="http://schemas.microsoft.com/office/drawing/2014/main" id="{67505AC7-381E-215D-DE89-A29A52A396C3}"/>
+              </a:ext>
+            </a:extLst>
+          </p:cNvPr>
+          <p:cNvSpPr>
+            <a:spLocks noGrp="1"/>
+          </p:cNvSpPr>
+          <p:nvPr>
+            <p:ph type="title"/>
+          </p:nvPr>
+        </p:nvSpPr>
+        <p:spPr/>
+        <p:txBody>
+          <a:bodyPr/>
+          <a:lstStyle/>
+          <a:p>
+            <a:r>
+              <a:rPr lang="pt-BR" b="1" dirty="0"/>
               <a:t>MELHORIAS PARA O PROXIMO MODULO</a:t>
             </a:r>
             <a:br>
@@ -8596,6 +9247,32 @@
               </a:rPr>
               <a:t>Verificação no banco se o registro já existe;</a:t>
             </a:r>
+          </a:p>
+          <a:p>
+            <a:pPr marL="342900" indent="-342900" algn="just">
+              <a:spcBef>
+                <a:spcPts val="1125"/>
+              </a:spcBef>
+              <a:spcAft>
+                <a:spcPts val="1125"/>
+              </a:spcAft>
+              <a:buFont typeface="+mj-lt"/>
+              <a:buAutoNum type="arabicPeriod"/>
+            </a:pPr>
+            <a:r>
+              <a:rPr lang="pt-BR" sz="2000" dirty="0">
+                <a:solidFill>
+                  <a:schemeClr val="tx1"/>
+                </a:solidFill>
+              </a:rPr>
+              <a:t>Criar função esconder senha digitada;</a:t>
+            </a:r>
+            <a:endParaRPr lang="pt-BR" sz="2000" dirty="0">
+              <a:solidFill>
+                <a:schemeClr val="tx1"/>
+              </a:solidFill>
+              <a:effectLst/>
+            </a:endParaRPr>
           </a:p>
           <a:p>
             <a:pPr marL="342900" indent="-342900" algn="just">
@@ -8675,7 +9352,7 @@
           <a:p>
             <a:fld id="{C68AC1EC-23E2-4F0E-A5A4-674EC8DB954E}" type="slidenum">
               <a:rPr lang="en-US" smtClean="0"/>
-              <a:t>19</a:t>
+              <a:t>20</a:t>
             </a:fld>
             <a:endParaRPr lang="en-US"/>
           </a:p>
@@ -8747,294 +9424,7 @@
 </p:sld>
 </file>
 
-<file path=ppt/slides/slide2.xml><?xml version="1.0" encoding="utf-8"?>
-<p:sld xmlns:a="http://schemas.openxmlformats.org/drawingml/2006/main" xmlns:r="http://schemas.openxmlformats.org/officeDocument/2006/relationships" xmlns:p="http://schemas.openxmlformats.org/presentationml/2006/main">
-  <p:cSld>
-    <p:spTree>
-      <p:nvGrpSpPr>
-        <p:cNvPr id="1" name=""/>
-        <p:cNvGrpSpPr/>
-        <p:nvPr/>
-      </p:nvGrpSpPr>
-      <p:grpSpPr>
-        <a:xfrm>
-          <a:off x="0" y="0"/>
-          <a:ext cx="0" cy="0"/>
-          <a:chOff x="0" y="0"/>
-          <a:chExt cx="0" cy="0"/>
-        </a:xfrm>
-      </p:grpSpPr>
-      <p:sp>
-        <p:nvSpPr>
-          <p:cNvPr id="2" name="Título 1">
-            <a:extLst>
-              <a:ext uri="{FF2B5EF4-FFF2-40B4-BE49-F238E27FC236}">
-                <a16:creationId xmlns:a16="http://schemas.microsoft.com/office/drawing/2014/main" id="{5B18BC5C-418B-9723-B5E9-1EE52F22D23B}"/>
-              </a:ext>
-            </a:extLst>
-          </p:cNvPr>
-          <p:cNvSpPr>
-            <a:spLocks noGrp="1"/>
-          </p:cNvSpPr>
-          <p:nvPr>
-            <p:ph type="title"/>
-          </p:nvPr>
-        </p:nvSpPr>
-        <p:spPr>
-          <a:xfrm>
-            <a:off x="1155700" y="1252368"/>
-            <a:ext cx="5842000" cy="1097132"/>
-          </a:xfrm>
-        </p:spPr>
-        <p:txBody>
-          <a:bodyPr anchor="t">
-            <a:normAutofit fontScale="90000"/>
-          </a:bodyPr>
-          <a:lstStyle/>
-          <a:p>
-            <a:r>
-              <a:rPr lang="pt-BR" sz="3100" b="1" dirty="0"/>
-              <a:t>APRESENTAÇÃO DO SOFTWARE</a:t>
-            </a:r>
-            <a:br>
-              <a:rPr lang="pt-BR" dirty="0">
-                <a:effectLst/>
-              </a:rPr>
-            </a:br>
-            <a:endParaRPr lang="pt-BR" dirty="0"/>
-          </a:p>
-        </p:txBody>
-      </p:sp>
-      <p:pic>
-        <p:nvPicPr>
-          <p:cNvPr id="1026" name="Picture 2" descr="Diagrama&#10;&#10;Descrição gerada automaticamente">
-            <a:extLst>
-              <a:ext uri="{FF2B5EF4-FFF2-40B4-BE49-F238E27FC236}">
-                <a16:creationId xmlns:a16="http://schemas.microsoft.com/office/drawing/2014/main" id="{4F75B088-CAE1-5196-A146-20F86E979396}"/>
-              </a:ext>
-            </a:extLst>
-          </p:cNvPr>
-          <p:cNvPicPr>
-            <a:picLocks noChangeAspect="1" noChangeArrowheads="1"/>
-          </p:cNvPicPr>
-          <p:nvPr/>
-        </p:nvPicPr>
-        <p:blipFill>
-          <a:blip r:embed="rId2">
-            <a:extLst>
-              <a:ext uri="{28A0092B-C50C-407E-A947-70E740481C1C}">
-                <a14:useLocalDpi xmlns:a14="http://schemas.microsoft.com/office/drawing/2010/main" val="0"/>
-              </a:ext>
-            </a:extLst>
-          </a:blip>
-          <a:stretch>
-            <a:fillRect/>
-          </a:stretch>
-        </p:blipFill>
-        <p:spPr bwMode="auto">
-          <a:xfrm>
-            <a:off x="6633286" y="383458"/>
-            <a:ext cx="5121180" cy="5972891"/>
-          </a:xfrm>
-          <a:prstGeom prst="rect">
-            <a:avLst/>
-          </a:prstGeom>
-          <a:solidFill>
-            <a:srgbClr val="FFFFFF"/>
-          </a:solidFill>
-        </p:spPr>
-      </p:pic>
-      <p:sp>
-        <p:nvSpPr>
-          <p:cNvPr id="3" name="Espaço Reservado para Conteúdo 2">
-            <a:extLst>
-              <a:ext uri="{FF2B5EF4-FFF2-40B4-BE49-F238E27FC236}">
-                <a16:creationId xmlns:a16="http://schemas.microsoft.com/office/drawing/2014/main" id="{CFEA0649-8914-9CCB-0D86-13DB4CFD912E}"/>
-              </a:ext>
-            </a:extLst>
-          </p:cNvPr>
-          <p:cNvSpPr>
-            <a:spLocks noGrp="1"/>
-          </p:cNvSpPr>
-          <p:nvPr>
-            <p:ph type="body" sz="half" idx="2"/>
-          </p:nvPr>
-        </p:nvSpPr>
-        <p:spPr>
-          <a:xfrm>
-            <a:off x="839788" y="2123768"/>
-            <a:ext cx="5664251" cy="2684206"/>
-          </a:xfrm>
-        </p:spPr>
-        <p:txBody>
-          <a:bodyPr anchor="b">
-            <a:normAutofit/>
-          </a:bodyPr>
-          <a:lstStyle/>
-          <a:p>
-            <a:pPr marL="285750" indent="-285750" algn="just">
-              <a:buFont typeface="Arial" panose="020B0604020202020204" pitchFamily="34" charset="0"/>
-              <a:buChar char="•"/>
-            </a:pPr>
-            <a:r>
-              <a:rPr lang="pt-BR" dirty="0">
-                <a:effectLst/>
-              </a:rPr>
-              <a:t>O objetivo é controlar o cadastro de usuários, alunos e funcionários, bem como efetuar a gestão dos serviços oferecidos na forma de planos.</a:t>
-            </a:r>
-          </a:p>
-          <a:p>
-            <a:pPr marL="285750" indent="-285750" algn="just">
-              <a:buFont typeface="Arial" panose="020B0604020202020204" pitchFamily="34" charset="0"/>
-              <a:buChar char="•"/>
-            </a:pPr>
-            <a:r>
-              <a:rPr lang="pt-BR" dirty="0">
-                <a:effectLst/>
-              </a:rPr>
-              <a:t>Através de uma interface </a:t>
-            </a:r>
-            <a:r>
-              <a:rPr lang="pt-BR" dirty="0"/>
-              <a:t>simples</a:t>
-            </a:r>
-            <a:r>
-              <a:rPr lang="pt-BR" dirty="0">
-                <a:effectLst/>
-              </a:rPr>
-              <a:t> ele centraliza tarefas de controle de acesso, cadastro e segurança de maneira objetiva, tornando-se uma ferramenta ideal para o controle dos ativos de sua academia.</a:t>
-            </a:r>
-          </a:p>
-          <a:p>
-            <a:endParaRPr lang="pt-BR" sz="1500" dirty="0"/>
-          </a:p>
-        </p:txBody>
-      </p:sp>
-      <p:sp>
-        <p:nvSpPr>
-          <p:cNvPr id="4" name="Espaço Reservado para Data 3">
-            <a:extLst>
-              <a:ext uri="{FF2B5EF4-FFF2-40B4-BE49-F238E27FC236}">
-                <a16:creationId xmlns:a16="http://schemas.microsoft.com/office/drawing/2014/main" id="{D02EA9A5-FFAA-5034-0C87-55E0F42207C8}"/>
-              </a:ext>
-            </a:extLst>
-          </p:cNvPr>
-          <p:cNvSpPr>
-            <a:spLocks noGrp="1"/>
-          </p:cNvSpPr>
-          <p:nvPr>
-            <p:ph type="dt" sz="half" idx="10"/>
-          </p:nvPr>
-        </p:nvSpPr>
-        <p:spPr>
-          <a:xfrm>
-            <a:off x="6633286" y="6356350"/>
-            <a:ext cx="2982976" cy="365125"/>
-          </a:xfrm>
-        </p:spPr>
-        <p:txBody>
-          <a:bodyPr anchor="ctr">
-            <a:normAutofit/>
-          </a:bodyPr>
-          <a:lstStyle/>
-          <a:p>
-            <a:pPr>
-              <a:spcAft>
-                <a:spcPts val="600"/>
-              </a:spcAft>
-            </a:pPr>
-            <a:r>
-              <a:rPr lang="en-US" b="1" dirty="0" err="1"/>
-              <a:t>Figura</a:t>
-            </a:r>
-            <a:r>
-              <a:rPr lang="en-US" b="1" dirty="0"/>
-              <a:t> 1- </a:t>
-            </a:r>
-            <a:r>
-              <a:rPr lang="en-US" b="1" dirty="0" err="1"/>
-              <a:t>modelo</a:t>
-            </a:r>
-            <a:r>
-              <a:rPr lang="en-US" b="1" dirty="0"/>
-              <a:t> </a:t>
-            </a:r>
-            <a:r>
-              <a:rPr lang="en-US" b="1" dirty="0" err="1"/>
-              <a:t>caso</a:t>
-            </a:r>
-            <a:r>
-              <a:rPr lang="en-US" b="1" dirty="0"/>
-              <a:t> de </a:t>
-            </a:r>
-            <a:r>
-              <a:rPr lang="en-US" b="1" dirty="0" err="1"/>
-              <a:t>uso</a:t>
-            </a:r>
-            <a:endParaRPr lang="en-US" b="1" dirty="0"/>
-          </a:p>
-        </p:txBody>
-      </p:sp>
-      <p:sp>
-        <p:nvSpPr>
-          <p:cNvPr id="6" name="Espaço Reservado para Número de Slide 5">
-            <a:extLst>
-              <a:ext uri="{FF2B5EF4-FFF2-40B4-BE49-F238E27FC236}">
-                <a16:creationId xmlns:a16="http://schemas.microsoft.com/office/drawing/2014/main" id="{893BDAB9-7523-5E53-2381-25946788E257}"/>
-              </a:ext>
-            </a:extLst>
-          </p:cNvPr>
-          <p:cNvSpPr>
-            <a:spLocks noGrp="1"/>
-          </p:cNvSpPr>
-          <p:nvPr>
-            <p:ph type="sldNum" sz="quarter" idx="12"/>
-          </p:nvPr>
-        </p:nvSpPr>
-        <p:spPr>
-          <a:xfrm>
-            <a:off x="11429999" y="6356350"/>
-            <a:ext cx="521207" cy="365125"/>
-          </a:xfrm>
-        </p:spPr>
-        <p:txBody>
-          <a:bodyPr anchor="ctr">
-            <a:normAutofit/>
-          </a:bodyPr>
-          <a:lstStyle/>
-          <a:p>
-            <a:pPr>
-              <a:spcAft>
-                <a:spcPts val="600"/>
-              </a:spcAft>
-            </a:pPr>
-            <a:fld id="{C68AC1EC-23E2-4F0E-A5A4-674EC8DB954E}" type="slidenum">
-              <a:rPr lang="en-US" smtClean="0"/>
-              <a:pPr>
-                <a:spcAft>
-                  <a:spcPts val="600"/>
-                </a:spcAft>
-              </a:pPr>
-              <a:t>2</a:t>
-            </a:fld>
-            <a:endParaRPr lang="en-US" dirty="0"/>
-          </a:p>
-        </p:txBody>
-      </p:sp>
-    </p:spTree>
-    <p:extLst>
-      <p:ext uri="{BB962C8B-B14F-4D97-AF65-F5344CB8AC3E}">
-        <p14:creationId xmlns:p14="http://schemas.microsoft.com/office/powerpoint/2010/main" val="2534805862"/>
-      </p:ext>
-    </p:extLst>
-  </p:cSld>
-  <p:clrMapOvr>
-    <a:masterClrMapping/>
-  </p:clrMapOvr>
-</p:sld>
-</file>
-
-<file path=ppt/slides/slide20.xml><?xml version="1.0" encoding="utf-8"?>
+<file path=ppt/slides/slide21.xml><?xml version="1.0" encoding="utf-8"?>
 <p:sld xmlns:a="http://schemas.openxmlformats.org/drawingml/2006/main" xmlns:r="http://schemas.openxmlformats.org/officeDocument/2006/relationships" xmlns:p="http://schemas.openxmlformats.org/presentationml/2006/main">
   <p:cSld>
     <p:bg>

</xml_diff>

<commit_message>
- Atualização da Apresentação -Gestão de Academia.pptx
</commit_message>
<xml_diff>
--- a/Documentos/Apresentação -Gestão de Academia.pptx
+++ b/Documentos/Apresentação -Gestão de Academia.pptx
@@ -5,7 +5,7 @@
     <p:sldMasterId id="2147483660" r:id="rId1"/>
   </p:sldMasterIdLst>
   <p:notesMasterIdLst>
-    <p:notesMasterId r:id="rId25"/>
+    <p:notesMasterId r:id="rId26"/>
   </p:notesMasterIdLst>
   <p:sldIdLst>
     <p:sldId id="256" r:id="rId2"/>
@@ -14,23 +14,24 @@
     <p:sldId id="286" r:id="rId5"/>
     <p:sldId id="285" r:id="rId6"/>
     <p:sldId id="281" r:id="rId7"/>
-    <p:sldId id="282" r:id="rId8"/>
-    <p:sldId id="258" r:id="rId9"/>
-    <p:sldId id="268" r:id="rId10"/>
-    <p:sldId id="269" r:id="rId11"/>
-    <p:sldId id="270" r:id="rId12"/>
-    <p:sldId id="271" r:id="rId13"/>
-    <p:sldId id="272" r:id="rId14"/>
-    <p:sldId id="273" r:id="rId15"/>
-    <p:sldId id="274" r:id="rId16"/>
-    <p:sldId id="275" r:id="rId17"/>
-    <p:sldId id="276" r:id="rId18"/>
-    <p:sldId id="283" r:id="rId19"/>
-    <p:sldId id="277" r:id="rId20"/>
-    <p:sldId id="284" r:id="rId21"/>
-    <p:sldId id="260" r:id="rId22"/>
-    <p:sldId id="278" r:id="rId23"/>
-    <p:sldId id="279" r:id="rId24"/>
+    <p:sldId id="287" r:id="rId8"/>
+    <p:sldId id="282" r:id="rId9"/>
+    <p:sldId id="258" r:id="rId10"/>
+    <p:sldId id="268" r:id="rId11"/>
+    <p:sldId id="269" r:id="rId12"/>
+    <p:sldId id="270" r:id="rId13"/>
+    <p:sldId id="271" r:id="rId14"/>
+    <p:sldId id="272" r:id="rId15"/>
+    <p:sldId id="273" r:id="rId16"/>
+    <p:sldId id="274" r:id="rId17"/>
+    <p:sldId id="275" r:id="rId18"/>
+    <p:sldId id="276" r:id="rId19"/>
+    <p:sldId id="283" r:id="rId20"/>
+    <p:sldId id="277" r:id="rId21"/>
+    <p:sldId id="284" r:id="rId22"/>
+    <p:sldId id="260" r:id="rId23"/>
+    <p:sldId id="278" r:id="rId24"/>
+    <p:sldId id="279" r:id="rId25"/>
   </p:sldIdLst>
   <p:sldSz cx="12192000" cy="6858000"/>
   <p:notesSz cx="6858000" cy="9144000"/>
@@ -551,7 +552,7 @@
           <a:p>
             <a:fld id="{3116101D-3B63-9249-8DE5-B89A0CA224DC}" type="slidenum">
               <a:rPr lang="pt-BR" smtClean="0"/>
-              <a:t>10</a:t>
+              <a:t>11</a:t>
             </a:fld>
             <a:endParaRPr lang="pt-BR"/>
           </a:p>
@@ -635,7 +636,7 @@
           <a:p>
             <a:fld id="{3116101D-3B63-9249-8DE5-B89A0CA224DC}" type="slidenum">
               <a:rPr lang="pt-BR" smtClean="0"/>
-              <a:t>19</a:t>
+              <a:t>20</a:t>
             </a:fld>
             <a:endParaRPr lang="pt-BR"/>
           </a:p>
@@ -719,7 +720,7 @@
           <a:p>
             <a:fld id="{3116101D-3B63-9249-8DE5-B89A0CA224DC}" type="slidenum">
               <a:rPr lang="pt-BR" smtClean="0"/>
-              <a:t>20</a:t>
+              <a:t>21</a:t>
             </a:fld>
             <a:endParaRPr lang="pt-BR"/>
           </a:p>
@@ -803,7 +804,7 @@
           <a:p>
             <a:fld id="{3116101D-3B63-9249-8DE5-B89A0CA224DC}" type="slidenum">
               <a:rPr lang="pt-BR" smtClean="0"/>
-              <a:t>11</a:t>
+              <a:t>12</a:t>
             </a:fld>
             <a:endParaRPr lang="pt-BR"/>
           </a:p>
@@ -887,7 +888,7 @@
           <a:p>
             <a:fld id="{3116101D-3B63-9249-8DE5-B89A0CA224DC}" type="slidenum">
               <a:rPr lang="pt-BR" smtClean="0"/>
-              <a:t>12</a:t>
+              <a:t>13</a:t>
             </a:fld>
             <a:endParaRPr lang="pt-BR"/>
           </a:p>
@@ -971,7 +972,7 @@
           <a:p>
             <a:fld id="{3116101D-3B63-9249-8DE5-B89A0CA224DC}" type="slidenum">
               <a:rPr lang="pt-BR" smtClean="0"/>
-              <a:t>13</a:t>
+              <a:t>14</a:t>
             </a:fld>
             <a:endParaRPr lang="pt-BR"/>
           </a:p>
@@ -1055,7 +1056,7 @@
           <a:p>
             <a:fld id="{3116101D-3B63-9249-8DE5-B89A0CA224DC}" type="slidenum">
               <a:rPr lang="pt-BR" smtClean="0"/>
-              <a:t>14</a:t>
+              <a:t>15</a:t>
             </a:fld>
             <a:endParaRPr lang="pt-BR"/>
           </a:p>
@@ -1139,7 +1140,7 @@
           <a:p>
             <a:fld id="{3116101D-3B63-9249-8DE5-B89A0CA224DC}" type="slidenum">
               <a:rPr lang="pt-BR" smtClean="0"/>
-              <a:t>15</a:t>
+              <a:t>16</a:t>
             </a:fld>
             <a:endParaRPr lang="pt-BR"/>
           </a:p>
@@ -1223,7 +1224,7 @@
           <a:p>
             <a:fld id="{3116101D-3B63-9249-8DE5-B89A0CA224DC}" type="slidenum">
               <a:rPr lang="pt-BR" smtClean="0"/>
-              <a:t>16</a:t>
+              <a:t>17</a:t>
             </a:fld>
             <a:endParaRPr lang="pt-BR"/>
           </a:p>
@@ -1307,7 +1308,7 @@
           <a:p>
             <a:fld id="{3116101D-3B63-9249-8DE5-B89A0CA224DC}" type="slidenum">
               <a:rPr lang="pt-BR" smtClean="0"/>
-              <a:t>17</a:t>
+              <a:t>18</a:t>
             </a:fld>
             <a:endParaRPr lang="pt-BR"/>
           </a:p>
@@ -1391,7 +1392,7 @@
           <a:p>
             <a:fld id="{3116101D-3B63-9249-8DE5-B89A0CA224DC}" type="slidenum">
               <a:rPr lang="pt-BR" smtClean="0"/>
-              <a:t>18</a:t>
+              <a:t>19</a:t>
             </a:fld>
             <a:endParaRPr lang="pt-BR"/>
           </a:p>
@@ -4942,6 +4943,963 @@
           <a:p>
             <a:r>
               <a:rPr lang="pt-BR" sz="2800" b="1" dirty="0"/>
+              <a:t>CADASTRO DE USUARIOS</a:t>
+            </a:r>
+            <a:br>
+              <a:rPr lang="pt-BR" sz="1800" dirty="0">
+                <a:effectLst/>
+                <a:latin typeface="Times New Roman" panose="02020603050405020304" pitchFamily="18" charset="0"/>
+                <a:ea typeface="Times New Roman" panose="02020603050405020304" pitchFamily="18" charset="0"/>
+              </a:rPr>
+            </a:br>
+            <a:endParaRPr lang="pt-BR" dirty="0"/>
+          </a:p>
+        </p:txBody>
+      </p:sp>
+      <p:sp>
+        <p:nvSpPr>
+          <p:cNvPr id="3" name="Espaço Reservado para Conteúdo 2">
+            <a:extLst>
+              <a:ext uri="{FF2B5EF4-FFF2-40B4-BE49-F238E27FC236}">
+                <a16:creationId xmlns:a16="http://schemas.microsoft.com/office/drawing/2014/main" id="{42456B08-C54C-1760-7377-187C86252AED}"/>
+              </a:ext>
+            </a:extLst>
+          </p:cNvPr>
+          <p:cNvSpPr>
+            <a:spLocks noGrp="1"/>
+          </p:cNvSpPr>
+          <p:nvPr>
+            <p:ph idx="1"/>
+          </p:nvPr>
+        </p:nvSpPr>
+        <p:spPr>
+          <a:xfrm>
+            <a:off x="877824" y="1659302"/>
+            <a:ext cx="10442448" cy="1265928"/>
+          </a:xfrm>
+        </p:spPr>
+        <p:txBody>
+          <a:bodyPr/>
+          <a:lstStyle/>
+          <a:p>
+            <a:pPr algn="just">
+              <a:lnSpc>
+                <a:spcPct val="100000"/>
+              </a:lnSpc>
+              <a:spcBef>
+                <a:spcPts val="1125"/>
+              </a:spcBef>
+              <a:spcAft>
+                <a:spcPts val="1125"/>
+              </a:spcAft>
+            </a:pPr>
+            <a:r>
+              <a:rPr lang="pt-BR" sz="1800" dirty="0">
+                <a:solidFill>
+                  <a:srgbClr val="444444"/>
+                </a:solidFill>
+                <a:effectLst/>
+                <a:latin typeface="Open Sans" panose="020B0606030504020204" pitchFamily="34" charset="0"/>
+                <a:ea typeface="Times New Roman" panose="02020603050405020304" pitchFamily="18" charset="0"/>
+              </a:rPr>
+              <a:t>Cadastro de Usuários: permite cadastrar novos usuários para acesso ao sistema.</a:t>
+            </a:r>
+          </a:p>
+          <a:p>
+            <a:pPr algn="just">
+              <a:lnSpc>
+                <a:spcPct val="100000"/>
+              </a:lnSpc>
+              <a:spcBef>
+                <a:spcPts val="1125"/>
+              </a:spcBef>
+              <a:spcAft>
+                <a:spcPts val="1125"/>
+              </a:spcAft>
+            </a:pPr>
+            <a:r>
+              <a:rPr lang="pt-BR" sz="1800" dirty="0">
+                <a:solidFill>
+                  <a:srgbClr val="444444"/>
+                </a:solidFill>
+                <a:effectLst/>
+                <a:latin typeface="Open Sans" panose="020B0606030504020204" pitchFamily="34" charset="0"/>
+                <a:ea typeface="Times New Roman" panose="02020603050405020304" pitchFamily="18" charset="0"/>
+              </a:rPr>
+              <a:t>Registra informações básicas para acessar o sistema:</a:t>
+            </a:r>
+          </a:p>
+          <a:p>
+            <a:pPr algn="just">
+              <a:spcBef>
+                <a:spcPts val="1125"/>
+              </a:spcBef>
+              <a:spcAft>
+                <a:spcPts val="1125"/>
+              </a:spcAft>
+            </a:pPr>
+            <a:endParaRPr lang="pt-BR" sz="1800" dirty="0">
+              <a:effectLst/>
+              <a:latin typeface="Times New Roman" panose="02020603050405020304" pitchFamily="18" charset="0"/>
+              <a:ea typeface="Times New Roman" panose="02020603050405020304" pitchFamily="18" charset="0"/>
+            </a:endParaRPr>
+          </a:p>
+          <a:p>
+            <a:endParaRPr lang="pt-BR" dirty="0"/>
+          </a:p>
+        </p:txBody>
+      </p:sp>
+      <p:sp>
+        <p:nvSpPr>
+          <p:cNvPr id="4" name="Espaço Reservado para Data 3">
+            <a:extLst>
+              <a:ext uri="{FF2B5EF4-FFF2-40B4-BE49-F238E27FC236}">
+                <a16:creationId xmlns:a16="http://schemas.microsoft.com/office/drawing/2014/main" id="{3A397401-3F94-58C5-2A84-4B1AF3986A69}"/>
+              </a:ext>
+            </a:extLst>
+          </p:cNvPr>
+          <p:cNvSpPr>
+            <a:spLocks noGrp="1"/>
+          </p:cNvSpPr>
+          <p:nvPr>
+            <p:ph type="dt" sz="half" idx="10"/>
+          </p:nvPr>
+        </p:nvSpPr>
+        <p:spPr>
+          <a:xfrm>
+            <a:off x="871107" y="6312807"/>
+            <a:ext cx="3926179" cy="365125"/>
+          </a:xfrm>
+        </p:spPr>
+        <p:txBody>
+          <a:bodyPr/>
+          <a:lstStyle/>
+          <a:p>
+            <a:r>
+              <a:rPr lang="en-US" b="1" dirty="0"/>
+              <a:t>Figura4 – </a:t>
+            </a:r>
+            <a:r>
+              <a:rPr lang="en-US" b="1" dirty="0" err="1"/>
+              <a:t>tela</a:t>
+            </a:r>
+            <a:r>
+              <a:rPr lang="en-US" b="1" dirty="0"/>
+              <a:t> de </a:t>
+            </a:r>
+            <a:r>
+              <a:rPr lang="en-US" b="1" dirty="0" err="1"/>
+              <a:t>cadastro</a:t>
+            </a:r>
+            <a:r>
+              <a:rPr lang="en-US" b="1" dirty="0"/>
+              <a:t> de </a:t>
+            </a:r>
+            <a:r>
+              <a:rPr lang="en-US" b="1" dirty="0" err="1"/>
+              <a:t>alunos</a:t>
+            </a:r>
+            <a:endParaRPr lang="en-US" b="1" dirty="0"/>
+          </a:p>
+        </p:txBody>
+      </p:sp>
+      <p:sp>
+        <p:nvSpPr>
+          <p:cNvPr id="6" name="Espaço Reservado para Número de Slide 5">
+            <a:extLst>
+              <a:ext uri="{FF2B5EF4-FFF2-40B4-BE49-F238E27FC236}">
+                <a16:creationId xmlns:a16="http://schemas.microsoft.com/office/drawing/2014/main" id="{08B0DBC5-EA0D-F917-B4DD-EF346E432987}"/>
+              </a:ext>
+            </a:extLst>
+          </p:cNvPr>
+          <p:cNvSpPr>
+            <a:spLocks noGrp="1"/>
+          </p:cNvSpPr>
+          <p:nvPr>
+            <p:ph type="sldNum" sz="quarter" idx="12"/>
+          </p:nvPr>
+        </p:nvSpPr>
+        <p:spPr/>
+        <p:txBody>
+          <a:bodyPr/>
+          <a:lstStyle/>
+          <a:p>
+            <a:fld id="{C68AC1EC-23E2-4F0E-A5A4-674EC8DB954E}" type="slidenum">
+              <a:rPr lang="en-US" smtClean="0"/>
+              <a:t>10</a:t>
+            </a:fld>
+            <a:endParaRPr lang="en-US" dirty="0"/>
+          </a:p>
+        </p:txBody>
+      </p:sp>
+      <p:graphicFrame>
+        <p:nvGraphicFramePr>
+          <p:cNvPr id="9" name="Tabela 8">
+            <a:extLst>
+              <a:ext uri="{FF2B5EF4-FFF2-40B4-BE49-F238E27FC236}">
+                <a16:creationId xmlns:a16="http://schemas.microsoft.com/office/drawing/2014/main" id="{DE376607-CE3A-336A-1759-EEDBB639BFBF}"/>
+              </a:ext>
+            </a:extLst>
+          </p:cNvPr>
+          <p:cNvGraphicFramePr>
+            <a:graphicFrameLocks noGrp="1"/>
+          </p:cNvGraphicFramePr>
+          <p:nvPr>
+            <p:extLst>
+              <p:ext uri="{D42A27DB-BD31-4B8C-83A1-F6EECF244321}">
+                <p14:modId xmlns:p14="http://schemas.microsoft.com/office/powerpoint/2010/main" val="3165817392"/>
+              </p:ext>
+            </p:extLst>
+          </p:nvPr>
+        </p:nvGraphicFramePr>
+        <p:xfrm>
+          <a:off x="6824870" y="2611215"/>
+          <a:ext cx="4452511" cy="3679557"/>
+        </p:xfrm>
+        <a:graphic>
+          <a:graphicData uri="http://schemas.openxmlformats.org/drawingml/2006/table">
+            <a:tbl>
+              <a:tblPr>
+                <a:tableStyleId>{5C22544A-7EE6-4342-B048-85BDC9FD1C3A}</a:tableStyleId>
+              </a:tblPr>
+              <a:tblGrid>
+                <a:gridCol w="2067237">
+                  <a:extLst>
+                    <a:ext uri="{9D8B030D-6E8A-4147-A177-3AD203B41FA5}">
+                      <a16:colId xmlns:a16="http://schemas.microsoft.com/office/drawing/2014/main" val="4263610643"/>
+                    </a:ext>
+                  </a:extLst>
+                </a:gridCol>
+                <a:gridCol w="2385274">
+                  <a:extLst>
+                    <a:ext uri="{9D8B030D-6E8A-4147-A177-3AD203B41FA5}">
+                      <a16:colId xmlns:a16="http://schemas.microsoft.com/office/drawing/2014/main" val="232851033"/>
+                    </a:ext>
+                  </a:extLst>
+                </a:gridCol>
+              </a:tblGrid>
+              <a:tr h="328867">
+                <a:tc rowSpan="11">
+                  <a:txBody>
+                    <a:bodyPr/>
+                    <a:lstStyle/>
+                    <a:p>
+                      <a:pPr algn="ctr" fontAlgn="ctr"/>
+                      <a:r>
+                        <a:rPr lang="pt-BR" sz="1600" u="none" strike="noStrike" dirty="0" err="1">
+                          <a:effectLst/>
+                        </a:rPr>
+                        <a:t>tb_usuario</a:t>
+                      </a:r>
+                      <a:endParaRPr lang="pt-BR" sz="1600" b="1" i="0" u="none" strike="noStrike" dirty="0">
+                        <a:solidFill>
+                          <a:srgbClr val="000000"/>
+                        </a:solidFill>
+                        <a:effectLst/>
+                        <a:latin typeface="Calibri" panose="020F0502020204030204" pitchFamily="34" charset="0"/>
+                      </a:endParaRPr>
+                    </a:p>
+                  </a:txBody>
+                  <a:tcPr marL="9525" marR="9525" marT="9525" marB="0" anchor="ctr"/>
+                </a:tc>
+                <a:tc>
+                  <a:txBody>
+                    <a:bodyPr/>
+                    <a:lstStyle/>
+                    <a:p>
+                      <a:pPr algn="l" fontAlgn="b"/>
+                      <a:r>
+                        <a:rPr lang="pt-BR" sz="1600" u="none" strike="noStrike">
+                          <a:effectLst/>
+                        </a:rPr>
+                        <a:t>id</a:t>
+                      </a:r>
+                      <a:endParaRPr lang="pt-BR" sz="1600" b="0" i="0" u="none" strike="noStrike">
+                        <a:solidFill>
+                          <a:srgbClr val="000000"/>
+                        </a:solidFill>
+                        <a:effectLst/>
+                        <a:latin typeface="Calibri" panose="020F0502020204030204" pitchFamily="34" charset="0"/>
+                      </a:endParaRPr>
+                    </a:p>
+                  </a:txBody>
+                  <a:tcPr marL="9525" marR="9525" marT="9525" marB="0" anchor="b"/>
+                </a:tc>
+                <a:extLst>
+                  <a:ext uri="{0D108BD9-81ED-4DB2-BD59-A6C34878D82A}">
+                    <a16:rowId xmlns:a16="http://schemas.microsoft.com/office/drawing/2014/main" val="1963379903"/>
+                  </a:ext>
+                </a:extLst>
+              </a:tr>
+              <a:tr h="335069">
+                <a:tc vMerge="1">
+                  <a:txBody>
+                    <a:bodyPr/>
+                    <a:lstStyle/>
+                    <a:p>
+                      <a:endParaRPr lang="pt-BR"/>
+                    </a:p>
+                  </a:txBody>
+                  <a:tcPr/>
+                </a:tc>
+                <a:tc>
+                  <a:txBody>
+                    <a:bodyPr/>
+                    <a:lstStyle/>
+                    <a:p>
+                      <a:pPr algn="l" fontAlgn="b"/>
+                      <a:r>
+                        <a:rPr lang="pt-BR" sz="1600" u="none" strike="noStrike">
+                          <a:effectLst/>
+                        </a:rPr>
+                        <a:t>matricula</a:t>
+                      </a:r>
+                      <a:endParaRPr lang="pt-BR" sz="1600" b="0" i="0" u="none" strike="noStrike">
+                        <a:solidFill>
+                          <a:srgbClr val="000000"/>
+                        </a:solidFill>
+                        <a:effectLst/>
+                        <a:latin typeface="Calibri" panose="020F0502020204030204" pitchFamily="34" charset="0"/>
+                      </a:endParaRPr>
+                    </a:p>
+                  </a:txBody>
+                  <a:tcPr marL="9525" marR="9525" marT="9525" marB="0" anchor="b"/>
+                </a:tc>
+                <a:extLst>
+                  <a:ext uri="{0D108BD9-81ED-4DB2-BD59-A6C34878D82A}">
+                    <a16:rowId xmlns:a16="http://schemas.microsoft.com/office/drawing/2014/main" val="2756212425"/>
+                  </a:ext>
+                </a:extLst>
+              </a:tr>
+              <a:tr h="335069">
+                <a:tc vMerge="1">
+                  <a:txBody>
+                    <a:bodyPr/>
+                    <a:lstStyle/>
+                    <a:p>
+                      <a:endParaRPr lang="pt-BR"/>
+                    </a:p>
+                  </a:txBody>
+                  <a:tcPr/>
+                </a:tc>
+                <a:tc>
+                  <a:txBody>
+                    <a:bodyPr/>
+                    <a:lstStyle/>
+                    <a:p>
+                      <a:pPr algn="l" fontAlgn="b"/>
+                      <a:r>
+                        <a:rPr lang="pt-BR" sz="1600" u="none" strike="noStrike" err="1">
+                          <a:effectLst/>
+                        </a:rPr>
+                        <a:t>usuario</a:t>
+                      </a:r>
+                      <a:endParaRPr lang="pt-BR" sz="1600" b="0" i="0" u="none" strike="noStrike">
+                        <a:solidFill>
+                          <a:srgbClr val="000000"/>
+                        </a:solidFill>
+                        <a:effectLst/>
+                        <a:latin typeface="Calibri" panose="020F0502020204030204" pitchFamily="34" charset="0"/>
+                      </a:endParaRPr>
+                    </a:p>
+                  </a:txBody>
+                  <a:tcPr marL="9525" marR="9525" marT="9525" marB="0" anchor="b"/>
+                </a:tc>
+                <a:extLst>
+                  <a:ext uri="{0D108BD9-81ED-4DB2-BD59-A6C34878D82A}">
+                    <a16:rowId xmlns:a16="http://schemas.microsoft.com/office/drawing/2014/main" val="3549588028"/>
+                  </a:ext>
+                </a:extLst>
+              </a:tr>
+              <a:tr h="335069">
+                <a:tc vMerge="1">
+                  <a:txBody>
+                    <a:bodyPr/>
+                    <a:lstStyle/>
+                    <a:p>
+                      <a:endParaRPr lang="pt-BR"/>
+                    </a:p>
+                  </a:txBody>
+                  <a:tcPr/>
+                </a:tc>
+                <a:tc>
+                  <a:txBody>
+                    <a:bodyPr/>
+                    <a:lstStyle/>
+                    <a:p>
+                      <a:pPr algn="l" fontAlgn="b"/>
+                      <a:r>
+                        <a:rPr lang="pt-BR" sz="1600" u="none" strike="noStrike">
+                          <a:effectLst/>
+                        </a:rPr>
+                        <a:t>senha</a:t>
+                      </a:r>
+                      <a:endParaRPr lang="pt-BR" sz="1600" b="0" i="0" u="none" strike="noStrike">
+                        <a:solidFill>
+                          <a:srgbClr val="000000"/>
+                        </a:solidFill>
+                        <a:effectLst/>
+                        <a:latin typeface="Calibri" panose="020F0502020204030204" pitchFamily="34" charset="0"/>
+                      </a:endParaRPr>
+                    </a:p>
+                  </a:txBody>
+                  <a:tcPr marL="9525" marR="9525" marT="9525" marB="0" anchor="b"/>
+                </a:tc>
+                <a:extLst>
+                  <a:ext uri="{0D108BD9-81ED-4DB2-BD59-A6C34878D82A}">
+                    <a16:rowId xmlns:a16="http://schemas.microsoft.com/office/drawing/2014/main" val="325737574"/>
+                  </a:ext>
+                </a:extLst>
+              </a:tr>
+              <a:tr h="335069">
+                <a:tc vMerge="1">
+                  <a:txBody>
+                    <a:bodyPr/>
+                    <a:lstStyle/>
+                    <a:p>
+                      <a:endParaRPr lang="pt-BR"/>
+                    </a:p>
+                  </a:txBody>
+                  <a:tcPr/>
+                </a:tc>
+                <a:tc>
+                  <a:txBody>
+                    <a:bodyPr/>
+                    <a:lstStyle/>
+                    <a:p>
+                      <a:pPr algn="l" fontAlgn="b"/>
+                      <a:r>
+                        <a:rPr lang="pt-BR" sz="1600" u="none" strike="noStrike" dirty="0">
+                          <a:effectLst/>
+                        </a:rPr>
+                        <a:t>nome</a:t>
+                      </a:r>
+                      <a:endParaRPr lang="pt-BR" sz="1600" b="0" i="0" u="none" strike="noStrike" dirty="0">
+                        <a:solidFill>
+                          <a:srgbClr val="000000"/>
+                        </a:solidFill>
+                        <a:effectLst/>
+                        <a:latin typeface="Calibri" panose="020F0502020204030204" pitchFamily="34" charset="0"/>
+                      </a:endParaRPr>
+                    </a:p>
+                  </a:txBody>
+                  <a:tcPr marL="9525" marR="9525" marT="9525" marB="0" anchor="b"/>
+                </a:tc>
+                <a:extLst>
+                  <a:ext uri="{0D108BD9-81ED-4DB2-BD59-A6C34878D82A}">
+                    <a16:rowId xmlns:a16="http://schemas.microsoft.com/office/drawing/2014/main" val="1672054426"/>
+                  </a:ext>
+                </a:extLst>
+              </a:tr>
+              <a:tr h="335069">
+                <a:tc vMerge="1">
+                  <a:txBody>
+                    <a:bodyPr/>
+                    <a:lstStyle/>
+                    <a:p>
+                      <a:endParaRPr lang="pt-BR"/>
+                    </a:p>
+                  </a:txBody>
+                  <a:tcPr/>
+                </a:tc>
+                <a:tc>
+                  <a:txBody>
+                    <a:bodyPr/>
+                    <a:lstStyle/>
+                    <a:p>
+                      <a:pPr algn="l" fontAlgn="b"/>
+                      <a:r>
+                        <a:rPr lang="pt-BR" sz="1600" u="none" strike="noStrike" err="1">
+                          <a:effectLst/>
+                        </a:rPr>
+                        <a:t>email</a:t>
+                      </a:r>
+                      <a:endParaRPr lang="pt-BR" sz="1600" b="0" i="0" u="none" strike="noStrike">
+                        <a:solidFill>
+                          <a:srgbClr val="000000"/>
+                        </a:solidFill>
+                        <a:effectLst/>
+                        <a:latin typeface="Calibri" panose="020F0502020204030204" pitchFamily="34" charset="0"/>
+                      </a:endParaRPr>
+                    </a:p>
+                  </a:txBody>
+                  <a:tcPr marL="9525" marR="9525" marT="9525" marB="0" anchor="b"/>
+                </a:tc>
+                <a:extLst>
+                  <a:ext uri="{0D108BD9-81ED-4DB2-BD59-A6C34878D82A}">
+                    <a16:rowId xmlns:a16="http://schemas.microsoft.com/office/drawing/2014/main" val="2426191845"/>
+                  </a:ext>
+                </a:extLst>
+              </a:tr>
+              <a:tr h="335069">
+                <a:tc vMerge="1">
+                  <a:txBody>
+                    <a:bodyPr/>
+                    <a:lstStyle/>
+                    <a:p>
+                      <a:endParaRPr lang="pt-BR"/>
+                    </a:p>
+                  </a:txBody>
+                  <a:tcPr/>
+                </a:tc>
+                <a:tc>
+                  <a:txBody>
+                    <a:bodyPr/>
+                    <a:lstStyle/>
+                    <a:p>
+                      <a:pPr algn="l" fontAlgn="b"/>
+                      <a:r>
+                        <a:rPr lang="pt-BR" sz="1600" u="none" strike="noStrike" err="1">
+                          <a:effectLst/>
+                        </a:rPr>
+                        <a:t>tipo_documento</a:t>
+                      </a:r>
+                      <a:endParaRPr lang="pt-BR" sz="1600" b="0" i="0" u="none" strike="noStrike">
+                        <a:solidFill>
+                          <a:srgbClr val="000000"/>
+                        </a:solidFill>
+                        <a:effectLst/>
+                        <a:latin typeface="Calibri" panose="020F0502020204030204" pitchFamily="34" charset="0"/>
+                      </a:endParaRPr>
+                    </a:p>
+                  </a:txBody>
+                  <a:tcPr marL="9525" marR="9525" marT="9525" marB="0" anchor="b"/>
+                </a:tc>
+                <a:extLst>
+                  <a:ext uri="{0D108BD9-81ED-4DB2-BD59-A6C34878D82A}">
+                    <a16:rowId xmlns:a16="http://schemas.microsoft.com/office/drawing/2014/main" val="3151027583"/>
+                  </a:ext>
+                </a:extLst>
+              </a:tr>
+              <a:tr h="335069">
+                <a:tc vMerge="1">
+                  <a:txBody>
+                    <a:bodyPr/>
+                    <a:lstStyle/>
+                    <a:p>
+                      <a:endParaRPr lang="pt-BR"/>
+                    </a:p>
+                  </a:txBody>
+                  <a:tcPr/>
+                </a:tc>
+                <a:tc>
+                  <a:txBody>
+                    <a:bodyPr/>
+                    <a:lstStyle/>
+                    <a:p>
+                      <a:pPr algn="l" fontAlgn="b"/>
+                      <a:r>
+                        <a:rPr lang="pt-BR" sz="1600" u="none" strike="noStrike" err="1">
+                          <a:effectLst/>
+                        </a:rPr>
+                        <a:t>num_documento</a:t>
+                      </a:r>
+                      <a:endParaRPr lang="pt-BR" sz="1600" b="0" i="0" u="none" strike="noStrike">
+                        <a:solidFill>
+                          <a:srgbClr val="000000"/>
+                        </a:solidFill>
+                        <a:effectLst/>
+                        <a:latin typeface="Calibri" panose="020F0502020204030204" pitchFamily="34" charset="0"/>
+                      </a:endParaRPr>
+                    </a:p>
+                  </a:txBody>
+                  <a:tcPr marL="9525" marR="9525" marT="9525" marB="0" anchor="b"/>
+                </a:tc>
+                <a:extLst>
+                  <a:ext uri="{0D108BD9-81ED-4DB2-BD59-A6C34878D82A}">
+                    <a16:rowId xmlns:a16="http://schemas.microsoft.com/office/drawing/2014/main" val="223369351"/>
+                  </a:ext>
+                </a:extLst>
+              </a:tr>
+              <a:tr h="335069">
+                <a:tc vMerge="1">
+                  <a:txBody>
+                    <a:bodyPr/>
+                    <a:lstStyle/>
+                    <a:p>
+                      <a:endParaRPr lang="pt-BR"/>
+                    </a:p>
+                  </a:txBody>
+                  <a:tcPr/>
+                </a:tc>
+                <a:tc>
+                  <a:txBody>
+                    <a:bodyPr/>
+                    <a:lstStyle/>
+                    <a:p>
+                      <a:pPr algn="l" fontAlgn="b"/>
+                      <a:r>
+                        <a:rPr lang="pt-BR" sz="1600" u="none" strike="noStrike">
+                          <a:effectLst/>
+                        </a:rPr>
+                        <a:t>status</a:t>
+                      </a:r>
+                      <a:endParaRPr lang="pt-BR" sz="1600" b="0" i="0" u="none" strike="noStrike">
+                        <a:solidFill>
+                          <a:srgbClr val="000000"/>
+                        </a:solidFill>
+                        <a:effectLst/>
+                        <a:latin typeface="Calibri" panose="020F0502020204030204" pitchFamily="34" charset="0"/>
+                      </a:endParaRPr>
+                    </a:p>
+                  </a:txBody>
+                  <a:tcPr marL="9525" marR="9525" marT="9525" marB="0" anchor="b"/>
+                </a:tc>
+                <a:extLst>
+                  <a:ext uri="{0D108BD9-81ED-4DB2-BD59-A6C34878D82A}">
+                    <a16:rowId xmlns:a16="http://schemas.microsoft.com/office/drawing/2014/main" val="2656179854"/>
+                  </a:ext>
+                </a:extLst>
+              </a:tr>
+              <a:tr h="335069">
+                <a:tc vMerge="1">
+                  <a:txBody>
+                    <a:bodyPr/>
+                    <a:lstStyle/>
+                    <a:p>
+                      <a:endParaRPr lang="pt-BR"/>
+                    </a:p>
+                  </a:txBody>
+                  <a:tcPr/>
+                </a:tc>
+                <a:tc>
+                  <a:txBody>
+                    <a:bodyPr/>
+                    <a:lstStyle/>
+                    <a:p>
+                      <a:pPr algn="l" fontAlgn="b"/>
+                      <a:r>
+                        <a:rPr lang="pt-BR" sz="1600" u="none" strike="noStrike" err="1">
+                          <a:effectLst/>
+                        </a:rPr>
+                        <a:t>dt_nascimento</a:t>
+                      </a:r>
+                      <a:endParaRPr lang="pt-BR" sz="1600" b="0" i="0" u="none" strike="noStrike">
+                        <a:solidFill>
+                          <a:srgbClr val="000000"/>
+                        </a:solidFill>
+                        <a:effectLst/>
+                        <a:latin typeface="Calibri" panose="020F0502020204030204" pitchFamily="34" charset="0"/>
+                      </a:endParaRPr>
+                    </a:p>
+                  </a:txBody>
+                  <a:tcPr marL="9525" marR="9525" marT="9525" marB="0" anchor="b"/>
+                </a:tc>
+                <a:extLst>
+                  <a:ext uri="{0D108BD9-81ED-4DB2-BD59-A6C34878D82A}">
+                    <a16:rowId xmlns:a16="http://schemas.microsoft.com/office/drawing/2014/main" val="3116824569"/>
+                  </a:ext>
+                </a:extLst>
+              </a:tr>
+              <a:tr h="335069">
+                <a:tc vMerge="1">
+                  <a:txBody>
+                    <a:bodyPr/>
+                    <a:lstStyle/>
+                    <a:p>
+                      <a:endParaRPr lang="pt-BR"/>
+                    </a:p>
+                  </a:txBody>
+                  <a:tcPr/>
+                </a:tc>
+                <a:tc>
+                  <a:txBody>
+                    <a:bodyPr/>
+                    <a:lstStyle/>
+                    <a:p>
+                      <a:pPr algn="l" fontAlgn="b"/>
+                      <a:r>
+                        <a:rPr lang="pt-BR" sz="1600" u="none" strike="noStrike" dirty="0">
+                          <a:effectLst/>
+                        </a:rPr>
+                        <a:t>dt_cadastro</a:t>
+                      </a:r>
+                      <a:endParaRPr lang="pt-BR" sz="1600" b="0" i="0" u="none" strike="noStrike" dirty="0">
+                        <a:solidFill>
+                          <a:srgbClr val="000000"/>
+                        </a:solidFill>
+                        <a:effectLst/>
+                        <a:latin typeface="Calibri" panose="020F0502020204030204" pitchFamily="34" charset="0"/>
+                      </a:endParaRPr>
+                    </a:p>
+                  </a:txBody>
+                  <a:tcPr marL="9525" marR="9525" marT="9525" marB="0" anchor="b"/>
+                </a:tc>
+                <a:extLst>
+                  <a:ext uri="{0D108BD9-81ED-4DB2-BD59-A6C34878D82A}">
+                    <a16:rowId xmlns:a16="http://schemas.microsoft.com/office/drawing/2014/main" val="722801819"/>
+                  </a:ext>
+                </a:extLst>
+              </a:tr>
+            </a:tbl>
+          </a:graphicData>
+        </a:graphic>
+      </p:graphicFrame>
+      <p:sp>
+        <p:nvSpPr>
+          <p:cNvPr id="11" name="Espaço Reservado para Data 3">
+            <a:extLst>
+              <a:ext uri="{FF2B5EF4-FFF2-40B4-BE49-F238E27FC236}">
+                <a16:creationId xmlns:a16="http://schemas.microsoft.com/office/drawing/2014/main" id="{C7289784-9CA9-4016-567C-91CFA843CE11}"/>
+              </a:ext>
+            </a:extLst>
+          </p:cNvPr>
+          <p:cNvSpPr txBox="1">
+            <a:spLocks/>
+          </p:cNvSpPr>
+          <p:nvPr/>
+        </p:nvSpPr>
+        <p:spPr>
+          <a:xfrm>
+            <a:off x="6824870" y="6312807"/>
+            <a:ext cx="2743200" cy="365125"/>
+          </a:xfrm>
+          <a:prstGeom prst="rect">
+            <a:avLst/>
+          </a:prstGeom>
+        </p:spPr>
+        <p:txBody>
+          <a:bodyPr vert="horz" lIns="91440" tIns="45720" rIns="91440" bIns="45720" rtlCol="0" anchor="ctr"/>
+          <a:lstStyle>
+            <a:defPPr>
+              <a:defRPr lang="pt-BR"/>
+            </a:defPPr>
+            <a:lvl1pPr marL="0" algn="l" defTabSz="914400" rtl="0" eaLnBrk="1" latinLnBrk="0" hangingPunct="1">
+              <a:defRPr sz="800" kern="1200" cap="all" spc="300" baseline="0">
+                <a:solidFill>
+                  <a:schemeClr val="tx2"/>
+                </a:solidFill>
+                <a:latin typeface="+mn-lt"/>
+                <a:ea typeface="+mn-ea"/>
+                <a:cs typeface="+mn-cs"/>
+              </a:defRPr>
+            </a:lvl1pPr>
+            <a:lvl2pPr marL="457200" algn="l" defTabSz="914400" rtl="0" eaLnBrk="1" latinLnBrk="0" hangingPunct="1">
+              <a:defRPr sz="1800" kern="1200">
+                <a:solidFill>
+                  <a:schemeClr val="tx1"/>
+                </a:solidFill>
+                <a:latin typeface="+mn-lt"/>
+                <a:ea typeface="+mn-ea"/>
+                <a:cs typeface="+mn-cs"/>
+              </a:defRPr>
+            </a:lvl2pPr>
+            <a:lvl3pPr marL="914400" algn="l" defTabSz="914400" rtl="0" eaLnBrk="1" latinLnBrk="0" hangingPunct="1">
+              <a:defRPr sz="1800" kern="1200">
+                <a:solidFill>
+                  <a:schemeClr val="tx1"/>
+                </a:solidFill>
+                <a:latin typeface="+mn-lt"/>
+                <a:ea typeface="+mn-ea"/>
+                <a:cs typeface="+mn-cs"/>
+              </a:defRPr>
+            </a:lvl3pPr>
+            <a:lvl4pPr marL="1371600" algn="l" defTabSz="914400" rtl="0" eaLnBrk="1" latinLnBrk="0" hangingPunct="1">
+              <a:defRPr sz="1800" kern="1200">
+                <a:solidFill>
+                  <a:schemeClr val="tx1"/>
+                </a:solidFill>
+                <a:latin typeface="+mn-lt"/>
+                <a:ea typeface="+mn-ea"/>
+                <a:cs typeface="+mn-cs"/>
+              </a:defRPr>
+            </a:lvl4pPr>
+            <a:lvl5pPr marL="1828800" algn="l" defTabSz="914400" rtl="0" eaLnBrk="1" latinLnBrk="0" hangingPunct="1">
+              <a:defRPr sz="1800" kern="1200">
+                <a:solidFill>
+                  <a:schemeClr val="tx1"/>
+                </a:solidFill>
+                <a:latin typeface="+mn-lt"/>
+                <a:ea typeface="+mn-ea"/>
+                <a:cs typeface="+mn-cs"/>
+              </a:defRPr>
+            </a:lvl5pPr>
+            <a:lvl6pPr marL="2286000" algn="l" defTabSz="914400" rtl="0" eaLnBrk="1" latinLnBrk="0" hangingPunct="1">
+              <a:defRPr sz="1800" kern="1200">
+                <a:solidFill>
+                  <a:schemeClr val="tx1"/>
+                </a:solidFill>
+                <a:latin typeface="+mn-lt"/>
+                <a:ea typeface="+mn-ea"/>
+                <a:cs typeface="+mn-cs"/>
+              </a:defRPr>
+            </a:lvl6pPr>
+            <a:lvl7pPr marL="2743200" algn="l" defTabSz="914400" rtl="0" eaLnBrk="1" latinLnBrk="0" hangingPunct="1">
+              <a:defRPr sz="1800" kern="1200">
+                <a:solidFill>
+                  <a:schemeClr val="tx1"/>
+                </a:solidFill>
+                <a:latin typeface="+mn-lt"/>
+                <a:ea typeface="+mn-ea"/>
+                <a:cs typeface="+mn-cs"/>
+              </a:defRPr>
+            </a:lvl7pPr>
+            <a:lvl8pPr marL="3200400" algn="l" defTabSz="914400" rtl="0" eaLnBrk="1" latinLnBrk="0" hangingPunct="1">
+              <a:defRPr sz="1800" kern="1200">
+                <a:solidFill>
+                  <a:schemeClr val="tx1"/>
+                </a:solidFill>
+                <a:latin typeface="+mn-lt"/>
+                <a:ea typeface="+mn-ea"/>
+                <a:cs typeface="+mn-cs"/>
+              </a:defRPr>
+            </a:lvl8pPr>
+            <a:lvl9pPr marL="3657600" algn="l" defTabSz="914400" rtl="0" eaLnBrk="1" latinLnBrk="0" hangingPunct="1">
+              <a:defRPr sz="1800" kern="1200">
+                <a:solidFill>
+                  <a:schemeClr val="tx1"/>
+                </a:solidFill>
+                <a:latin typeface="+mn-lt"/>
+                <a:ea typeface="+mn-ea"/>
+                <a:cs typeface="+mn-cs"/>
+              </a:defRPr>
+            </a:lvl9pPr>
+          </a:lstStyle>
+          <a:p>
+            <a:r>
+              <a:rPr lang="en-US" b="1" dirty="0"/>
+              <a:t>Figura3 – </a:t>
+            </a:r>
+            <a:r>
+              <a:rPr lang="en-US" b="1" dirty="0" err="1"/>
+              <a:t>tabela</a:t>
+            </a:r>
+            <a:r>
+              <a:rPr lang="en-US" b="1" dirty="0"/>
+              <a:t> do banco</a:t>
+            </a:r>
+          </a:p>
+        </p:txBody>
+      </p:sp>
+      <p:pic>
+        <p:nvPicPr>
+          <p:cNvPr id="7" name="Imagem 6" descr="Interface gráfica do usuário, Texto, Aplicativo&#10;&#10;Descrição gerada automaticamente">
+            <a:extLst>
+              <a:ext uri="{FF2B5EF4-FFF2-40B4-BE49-F238E27FC236}">
+                <a16:creationId xmlns:a16="http://schemas.microsoft.com/office/drawing/2014/main" id="{C8C0844E-1CEF-6B0C-C1A3-2C051746DE94}"/>
+              </a:ext>
+            </a:extLst>
+          </p:cNvPr>
+          <p:cNvPicPr>
+            <a:picLocks noChangeAspect="1"/>
+          </p:cNvPicPr>
+          <p:nvPr/>
+        </p:nvPicPr>
+        <p:blipFill>
+          <a:blip r:embed="rId2"/>
+          <a:stretch>
+            <a:fillRect/>
+          </a:stretch>
+        </p:blipFill>
+        <p:spPr>
+          <a:xfrm>
+            <a:off x="929801" y="2611215"/>
+            <a:ext cx="4257290" cy="3745135"/>
+          </a:xfrm>
+          <a:prstGeom prst="rect">
+            <a:avLst/>
+          </a:prstGeom>
+        </p:spPr>
+      </p:pic>
+      <p:sp>
+        <p:nvSpPr>
+          <p:cNvPr id="8" name="Seta para a Direita 7">
+            <a:extLst>
+              <a:ext uri="{FF2B5EF4-FFF2-40B4-BE49-F238E27FC236}">
+                <a16:creationId xmlns:a16="http://schemas.microsoft.com/office/drawing/2014/main" id="{3A3092D9-C0EE-15C5-5BE9-69C137E10E29}"/>
+              </a:ext>
+            </a:extLst>
+          </p:cNvPr>
+          <p:cNvSpPr/>
+          <p:nvPr/>
+        </p:nvSpPr>
+        <p:spPr>
+          <a:xfrm>
+            <a:off x="5433391" y="4267200"/>
+            <a:ext cx="1099931" cy="503583"/>
+          </a:xfrm>
+          <a:prstGeom prst="rightArrow">
+            <a:avLst/>
+          </a:prstGeom>
+        </p:spPr>
+        <p:style>
+          <a:lnRef idx="2">
+            <a:schemeClr val="dk1">
+              <a:shade val="15000"/>
+            </a:schemeClr>
+          </a:lnRef>
+          <a:fillRef idx="1">
+            <a:schemeClr val="dk1"/>
+          </a:fillRef>
+          <a:effectRef idx="0">
+            <a:schemeClr val="dk1"/>
+          </a:effectRef>
+          <a:fontRef idx="minor">
+            <a:schemeClr val="lt1"/>
+          </a:fontRef>
+        </p:style>
+        <p:txBody>
+          <a:bodyPr rtlCol="0" anchor="ctr"/>
+          <a:lstStyle/>
+          <a:p>
+            <a:pPr algn="ctr"/>
+            <a:endParaRPr lang="pt-BR"/>
+          </a:p>
+        </p:txBody>
+      </p:sp>
+    </p:spTree>
+    <p:extLst>
+      <p:ext uri="{BB962C8B-B14F-4D97-AF65-F5344CB8AC3E}">
+        <p14:creationId xmlns:p14="http://schemas.microsoft.com/office/powerpoint/2010/main" val="3240958650"/>
+      </p:ext>
+    </p:extLst>
+  </p:cSld>
+  <p:clrMapOvr>
+    <a:masterClrMapping/>
+  </p:clrMapOvr>
+</p:sld>
+</file>
+
+<file path=ppt/slides/slide11.xml><?xml version="1.0" encoding="utf-8"?>
+<p:sld xmlns:a="http://schemas.openxmlformats.org/drawingml/2006/main" xmlns:r="http://schemas.openxmlformats.org/officeDocument/2006/relationships" xmlns:p="http://schemas.openxmlformats.org/presentationml/2006/main">
+  <p:cSld>
+    <p:spTree>
+      <p:nvGrpSpPr>
+        <p:cNvPr id="1" name=""/>
+        <p:cNvGrpSpPr/>
+        <p:nvPr/>
+      </p:nvGrpSpPr>
+      <p:grpSpPr>
+        <a:xfrm>
+          <a:off x="0" y="0"/>
+          <a:ext cx="0" cy="0"/>
+          <a:chOff x="0" y="0"/>
+          <a:chExt cx="0" cy="0"/>
+        </a:xfrm>
+      </p:grpSpPr>
+      <p:sp>
+        <p:nvSpPr>
+          <p:cNvPr id="2" name="Título 1">
+            <a:extLst>
+              <a:ext uri="{FF2B5EF4-FFF2-40B4-BE49-F238E27FC236}">
+                <a16:creationId xmlns:a16="http://schemas.microsoft.com/office/drawing/2014/main" id="{67505AC7-381E-215D-DE89-A29A52A396C3}"/>
+              </a:ext>
+            </a:extLst>
+          </p:cNvPr>
+          <p:cNvSpPr>
+            <a:spLocks noGrp="1"/>
+          </p:cNvSpPr>
+          <p:nvPr>
+            <p:ph type="title"/>
+          </p:nvPr>
+        </p:nvSpPr>
+        <p:spPr/>
+        <p:txBody>
+          <a:bodyPr/>
+          <a:lstStyle/>
+          <a:p>
+            <a:r>
+              <a:rPr lang="pt-BR" sz="2800" b="1" dirty="0"/>
               <a:t>CADASTRO DE ALUNOS</a:t>
             </a:r>
             <a:br>
@@ -5088,7 +6046,7 @@
           <a:p>
             <a:fld id="{C68AC1EC-23E2-4F0E-A5A4-674EC8DB954E}" type="slidenum">
               <a:rPr lang="en-US" smtClean="0"/>
-              <a:t>10</a:t>
+              <a:t>11</a:t>
             </a:fld>
             <a:endParaRPr lang="en-US" dirty="0"/>
           </a:p>
@@ -5786,7 +6744,7 @@
 </p:sld>
 </file>
 
-<file path=ppt/slides/slide11.xml><?xml version="1.0" encoding="utf-8"?>
+<file path=ppt/slides/slide12.xml><?xml version="1.0" encoding="utf-8"?>
 <p:sld xmlns:a="http://schemas.openxmlformats.org/drawingml/2006/main" xmlns:r="http://schemas.openxmlformats.org/officeDocument/2006/relationships" xmlns:p="http://schemas.openxmlformats.org/presentationml/2006/main">
   <p:cSld>
     <p:spTree>
@@ -6009,7 +6967,7 @@
           <a:p>
             <a:fld id="{C68AC1EC-23E2-4F0E-A5A4-674EC8DB954E}" type="slidenum">
               <a:rPr lang="en-US" smtClean="0"/>
-              <a:t>11</a:t>
+              <a:t>12</a:t>
             </a:fld>
             <a:endParaRPr lang="en-US" dirty="0"/>
           </a:p>
@@ -6867,7 +7825,7 @@
 </p:sld>
 </file>
 
-<file path=ppt/slides/slide12.xml><?xml version="1.0" encoding="utf-8"?>
+<file path=ppt/slides/slide13.xml><?xml version="1.0" encoding="utf-8"?>
 <p:sld xmlns:a="http://schemas.openxmlformats.org/drawingml/2006/main" xmlns:r="http://schemas.openxmlformats.org/officeDocument/2006/relationships" xmlns:p="http://schemas.openxmlformats.org/presentationml/2006/main">
   <p:cSld>
     <p:spTree>
@@ -7061,7 +8019,7 @@
           <a:p>
             <a:fld id="{C68AC1EC-23E2-4F0E-A5A4-674EC8DB954E}" type="slidenum">
               <a:rPr lang="en-US" smtClean="0"/>
-              <a:t>12</a:t>
+              <a:t>13</a:t>
             </a:fld>
             <a:endParaRPr lang="en-US" dirty="0"/>
           </a:p>
@@ -7599,7 +8557,7 @@
 </p:sld>
 </file>
 
-<file path=ppt/slides/slide13.xml><?xml version="1.0" encoding="utf-8"?>
+<file path=ppt/slides/slide14.xml><?xml version="1.0" encoding="utf-8"?>
 <p:sld xmlns:a="http://schemas.openxmlformats.org/drawingml/2006/main" xmlns:r="http://schemas.openxmlformats.org/officeDocument/2006/relationships" xmlns:p="http://schemas.openxmlformats.org/presentationml/2006/main">
   <p:cSld>
     <p:spTree>
@@ -7796,7 +8754,7 @@
           <a:p>
             <a:fld id="{C68AC1EC-23E2-4F0E-A5A4-674EC8DB954E}" type="slidenum">
               <a:rPr lang="en-US" smtClean="0"/>
-              <a:t>13</a:t>
+              <a:t>14</a:t>
             </a:fld>
             <a:endParaRPr lang="en-US" dirty="0"/>
           </a:p>
@@ -8494,7 +9452,7 @@
 </p:sld>
 </file>
 
-<file path=ppt/slides/slide14.xml><?xml version="1.0" encoding="utf-8"?>
+<file path=ppt/slides/slide15.xml><?xml version="1.0" encoding="utf-8"?>
 <p:sld xmlns:a="http://schemas.openxmlformats.org/drawingml/2006/main" xmlns:r="http://schemas.openxmlformats.org/officeDocument/2006/relationships" xmlns:p="http://schemas.openxmlformats.org/presentationml/2006/main">
   <p:cSld>
     <p:spTree>
@@ -8749,7 +9707,7 @@
           <a:p>
             <a:fld id="{C68AC1EC-23E2-4F0E-A5A4-674EC8DB954E}" type="slidenum">
               <a:rPr lang="en-US" smtClean="0"/>
-              <a:t>14</a:t>
+              <a:t>15</a:t>
             </a:fld>
             <a:endParaRPr lang="en-US" dirty="0"/>
           </a:p>
@@ -8798,7 +9756,7 @@
 </p:sld>
 </file>
 
-<file path=ppt/slides/slide15.xml><?xml version="1.0" encoding="utf-8"?>
+<file path=ppt/slides/slide16.xml><?xml version="1.0" encoding="utf-8"?>
 <p:sld xmlns:a="http://schemas.openxmlformats.org/drawingml/2006/main" xmlns:r="http://schemas.openxmlformats.org/officeDocument/2006/relationships" xmlns:p="http://schemas.openxmlformats.org/presentationml/2006/main">
   <p:cSld>
     <p:spTree>
@@ -9053,7 +10011,7 @@
           <a:p>
             <a:fld id="{C68AC1EC-23E2-4F0E-A5A4-674EC8DB954E}" type="slidenum">
               <a:rPr lang="en-US" smtClean="0"/>
-              <a:t>15</a:t>
+              <a:t>16</a:t>
             </a:fld>
             <a:endParaRPr lang="en-US" dirty="0"/>
           </a:p>
@@ -9102,7 +10060,7 @@
 </p:sld>
 </file>
 
-<file path=ppt/slides/slide16.xml><?xml version="1.0" encoding="utf-8"?>
+<file path=ppt/slides/slide17.xml><?xml version="1.0" encoding="utf-8"?>
 <p:sld xmlns:a="http://schemas.openxmlformats.org/drawingml/2006/main" xmlns:r="http://schemas.openxmlformats.org/officeDocument/2006/relationships" xmlns:p="http://schemas.openxmlformats.org/presentationml/2006/main">
   <p:cSld>
     <p:spTree>
@@ -9357,7 +10315,7 @@
                   <a:spcPts val="600"/>
                 </a:spcAft>
               </a:pPr>
-              <a:t>16</a:t>
+              <a:t>17</a:t>
             </a:fld>
             <a:endParaRPr lang="en-US"/>
           </a:p>
@@ -9376,7 +10334,7 @@
 </p:sld>
 </file>
 
-<file path=ppt/slides/slide17.xml><?xml version="1.0" encoding="utf-8"?>
+<file path=ppt/slides/slide18.xml><?xml version="1.0" encoding="utf-8"?>
 <p:sld xmlns:a="http://schemas.openxmlformats.org/drawingml/2006/main" xmlns:r="http://schemas.openxmlformats.org/officeDocument/2006/relationships" xmlns:p="http://schemas.openxmlformats.org/presentationml/2006/main">
   <p:cSld>
     <p:spTree>
@@ -9574,7 +10532,7 @@
                   <a:spcPts val="600"/>
                 </a:spcAft>
               </a:pPr>
-              <a:t>17</a:t>
+              <a:t>18</a:t>
             </a:fld>
             <a:endParaRPr lang="en-US"/>
           </a:p>
@@ -9623,7 +10581,7 @@
 </p:sld>
 </file>
 
-<file path=ppt/slides/slide18.xml><?xml version="1.0" encoding="utf-8"?>
+<file path=ppt/slides/slide19.xml><?xml version="1.0" encoding="utf-8"?>
 <p:sld xmlns:a="http://schemas.openxmlformats.org/drawingml/2006/main" xmlns:r="http://schemas.openxmlformats.org/officeDocument/2006/relationships" xmlns:p="http://schemas.openxmlformats.org/presentationml/2006/main">
   <p:cSld>
     <p:spTree>
@@ -9821,7 +10779,7 @@
                   <a:spcPts val="600"/>
                 </a:spcAft>
               </a:pPr>
-              <a:t>18</a:t>
+              <a:t>19</a:t>
             </a:fld>
             <a:endParaRPr lang="en-US"/>
           </a:p>
@@ -9870,7 +10828,7 @@
 </p:sld>
 </file>
 
-<file path=ppt/slides/slide19.xml><?xml version="1.0" encoding="utf-8"?>
+<file path=ppt/slides/slide2.xml><?xml version="1.0" encoding="utf-8"?>
 <p:sld xmlns:a="http://schemas.openxmlformats.org/drawingml/2006/main" xmlns:r="http://schemas.openxmlformats.org/officeDocument/2006/relationships" xmlns:p="http://schemas.openxmlformats.org/presentationml/2006/main">
   <p:cSld>
     <p:spTree>
@@ -9892,7 +10850,7 @@
           <p:cNvPr id="2" name="Título 1">
             <a:extLst>
               <a:ext uri="{FF2B5EF4-FFF2-40B4-BE49-F238E27FC236}">
-                <a16:creationId xmlns:a16="http://schemas.microsoft.com/office/drawing/2014/main" id="{CD65535C-7ACA-7FF9-6F9D-B7FFAF3D1840}"/>
+                <a16:creationId xmlns:a16="http://schemas.microsoft.com/office/drawing/2014/main" id="{5B18BC5C-418B-9723-B5E9-1EE52F22D23B}"/>
               </a:ext>
             </a:extLst>
           </p:cNvPr>
@@ -9905,19 +10863,20 @@
         </p:nvSpPr>
         <p:spPr>
           <a:xfrm>
-            <a:off x="871107" y="588245"/>
-            <a:ext cx="10711293" cy="1265928"/>
+            <a:off x="1155700" y="1252368"/>
+            <a:ext cx="5842000" cy="1097132"/>
           </a:xfrm>
         </p:spPr>
         <p:txBody>
-          <a:bodyPr anchor="b">
-            <a:normAutofit/>
+          <a:bodyPr anchor="t">
+            <a:normAutofit fontScale="90000"/>
           </a:bodyPr>
           <a:lstStyle/>
           <a:p>
-            <a:r>
-              <a:rPr lang="pt-BR" b="1" dirty="0"/>
-              <a:t>RELATORIO – Aniversariantes do mês</a:t>
+            <a:pPr algn="ctr"/>
+            <a:r>
+              <a:rPr lang="pt-BR" sz="3100" b="1" dirty="0"/>
+              <a:t>APRESENTAÇÃO DO SOFTWARE</a:t>
             </a:r>
             <a:br>
               <a:rPr lang="pt-BR" dirty="0">
@@ -9928,48 +10887,108 @@
           </a:p>
         </p:txBody>
       </p:sp>
+      <p:pic>
+        <p:nvPicPr>
+          <p:cNvPr id="1026" name="Picture 2" descr="Diagrama&#10;&#10;Descrição gerada automaticamente">
+            <a:extLst>
+              <a:ext uri="{FF2B5EF4-FFF2-40B4-BE49-F238E27FC236}">
+                <a16:creationId xmlns:a16="http://schemas.microsoft.com/office/drawing/2014/main" id="{4F75B088-CAE1-5196-A146-20F86E979396}"/>
+              </a:ext>
+            </a:extLst>
+          </p:cNvPr>
+          <p:cNvPicPr>
+            <a:picLocks noChangeAspect="1" noChangeArrowheads="1"/>
+          </p:cNvPicPr>
+          <p:nvPr/>
+        </p:nvPicPr>
+        <p:blipFill>
+          <a:blip r:embed="rId2">
+            <a:extLst>
+              <a:ext uri="{28A0092B-C50C-407E-A947-70E740481C1C}">
+                <a14:useLocalDpi xmlns:a14="http://schemas.microsoft.com/office/drawing/2010/main" val="0"/>
+              </a:ext>
+            </a:extLst>
+          </a:blip>
+          <a:stretch>
+            <a:fillRect/>
+          </a:stretch>
+        </p:blipFill>
+        <p:spPr bwMode="auto">
+          <a:xfrm>
+            <a:off x="6633286" y="383458"/>
+            <a:ext cx="5121180" cy="5972891"/>
+          </a:xfrm>
+          <a:prstGeom prst="rect">
+            <a:avLst/>
+          </a:prstGeom>
+          <a:solidFill>
+            <a:srgbClr val="FFFFFF"/>
+          </a:solidFill>
+        </p:spPr>
+      </p:pic>
       <p:sp>
         <p:nvSpPr>
           <p:cNvPr id="3" name="Espaço Reservado para Conteúdo 2">
             <a:extLst>
               <a:ext uri="{FF2B5EF4-FFF2-40B4-BE49-F238E27FC236}">
-                <a16:creationId xmlns:a16="http://schemas.microsoft.com/office/drawing/2014/main" id="{A8175E1B-23A5-A611-B855-D864BE9BDC26}"/>
-              </a:ext>
-            </a:extLst>
-          </p:cNvPr>
-          <p:cNvSpPr>
-            <a:spLocks noGrp="1"/>
-          </p:cNvSpPr>
-          <p:nvPr>
-            <p:ph sz="half" idx="1"/>
+                <a16:creationId xmlns:a16="http://schemas.microsoft.com/office/drawing/2014/main" id="{CFEA0649-8914-9CCB-0D86-13DB4CFD912E}"/>
+              </a:ext>
+            </a:extLst>
+          </p:cNvPr>
+          <p:cNvSpPr>
+            <a:spLocks noGrp="1"/>
+          </p:cNvSpPr>
+          <p:nvPr>
+            <p:ph type="body" sz="half" idx="2"/>
           </p:nvPr>
         </p:nvSpPr>
         <p:spPr>
           <a:xfrm>
-            <a:off x="763525" y="1854173"/>
-            <a:ext cx="3255402" cy="4017787"/>
+            <a:off x="839788" y="2123768"/>
+            <a:ext cx="5664251" cy="2684206"/>
           </a:xfrm>
         </p:spPr>
         <p:txBody>
-          <a:bodyPr>
+          <a:bodyPr anchor="b">
             <a:normAutofit/>
           </a:bodyPr>
           <a:lstStyle/>
           <a:p>
-            <a:pPr>
-              <a:spcBef>
-                <a:spcPts val="1125"/>
-              </a:spcBef>
-              <a:spcAft>
-                <a:spcPts val="1125"/>
-              </a:spcAft>
+            <a:pPr marL="285750" indent="-285750" algn="just">
+              <a:buFont typeface="Arial" panose="020B0604020202020204" pitchFamily="34" charset="0"/>
+              <a:buChar char="•"/>
             </a:pPr>
             <a:r>
               <a:rPr lang="pt-BR" dirty="0">
                 <a:effectLst/>
               </a:rPr>
-              <a:t>Aniversariantes do mês: Permite a visualização da relação de aniversariantes a partir da definição do mês.</a:t>
-            </a:r>
+              <a:t>O objetivo do sistema é efetuar um controle através do cadastro de usuários, alunos e funcionários, bem como efetuar a gestão dos serviços oferecidos na forma de planos.</a:t>
+            </a:r>
+          </a:p>
+          <a:p>
+            <a:pPr marL="285750" indent="-285750" algn="just">
+              <a:buFont typeface="Arial" panose="020B0604020202020204" pitchFamily="34" charset="0"/>
+              <a:buChar char="•"/>
+            </a:pPr>
+            <a:r>
+              <a:rPr lang="pt-BR" dirty="0">
+                <a:effectLst/>
+              </a:rPr>
+              <a:t>Através de uma interface </a:t>
+            </a:r>
+            <a:r>
+              <a:rPr lang="pt-BR" dirty="0"/>
+              <a:t>simples</a:t>
+            </a:r>
+            <a:r>
+              <a:rPr lang="pt-BR" dirty="0">
+                <a:effectLst/>
+              </a:rPr>
+              <a:t> ele centraliza tarefas de controle de acesso, cadastro e segurança de maneira objetiva, tornando-se uma ferramenta ideal para o controle dos ativos de sua academia.</a:t>
+            </a:r>
+          </a:p>
+          <a:p>
+            <a:endParaRPr lang="pt-BR" sz="1500" dirty="0"/>
           </a:p>
         </p:txBody>
       </p:sp>
@@ -9978,7 +10997,7 @@
           <p:cNvPr id="4" name="Espaço Reservado para Data 3">
             <a:extLst>
               <a:ext uri="{FF2B5EF4-FFF2-40B4-BE49-F238E27FC236}">
-                <a16:creationId xmlns:a16="http://schemas.microsoft.com/office/drawing/2014/main" id="{DE64AD48-096C-E7CA-6B00-5EADBEB037B0}"/>
+                <a16:creationId xmlns:a16="http://schemas.microsoft.com/office/drawing/2014/main" id="{D02EA9A5-FFAA-5034-0C87-55E0F42207C8}"/>
               </a:ext>
             </a:extLst>
           </p:cNvPr>
@@ -9991,8 +11010,8 @@
         </p:nvSpPr>
         <p:spPr>
           <a:xfrm>
-            <a:off x="3917581" y="6308355"/>
-            <a:ext cx="6598019" cy="365125"/>
+            <a:off x="6633286" y="6356350"/>
+            <a:ext cx="2982976" cy="365125"/>
           </a:xfrm>
         </p:spPr>
         <p:txBody>
@@ -10007,28 +11026,32 @@
               </a:spcAft>
             </a:pPr>
             <a:r>
+              <a:rPr lang="en-US" b="1" dirty="0" err="1"/>
+              <a:t>Figura</a:t>
+            </a:r>
+            <a:r>
               <a:rPr lang="en-US" b="1" dirty="0"/>
-              <a:t>FigurA17 – </a:t>
+              <a:t> 1- </a:t>
             </a:r>
             <a:r>
               <a:rPr lang="en-US" b="1" dirty="0" err="1"/>
-              <a:t>tela</a:t>
+              <a:t>modelo</a:t>
             </a:r>
             <a:r>
               <a:rPr lang="en-US" b="1" dirty="0"/>
-              <a:t> de RELATORIO DOS </a:t>
+              <a:t> </a:t>
             </a:r>
             <a:r>
               <a:rPr lang="en-US" b="1" dirty="0" err="1"/>
-              <a:t>aniversariantes</a:t>
+              <a:t>caso</a:t>
             </a:r>
             <a:r>
               <a:rPr lang="en-US" b="1" dirty="0"/>
-              <a:t> do </a:t>
+              <a:t> de </a:t>
             </a:r>
             <a:r>
               <a:rPr lang="en-US" b="1" dirty="0" err="1"/>
-              <a:t>mes</a:t>
+              <a:t>uso</a:t>
             </a:r>
             <a:endParaRPr lang="en-US" b="1" dirty="0"/>
           </a:p>
@@ -10039,7 +11062,7 @@
           <p:cNvPr id="6" name="Espaço Reservado para Número de Slide 5">
             <a:extLst>
               <a:ext uri="{FF2B5EF4-FFF2-40B4-BE49-F238E27FC236}">
-                <a16:creationId xmlns:a16="http://schemas.microsoft.com/office/drawing/2014/main" id="{8883A2C0-B521-6A26-937C-5AA581D07BB9}"/>
+                <a16:creationId xmlns:a16="http://schemas.microsoft.com/office/drawing/2014/main" id="{893BDAB9-7523-5E53-2381-25946788E257}"/>
               </a:ext>
             </a:extLst>
           </p:cNvPr>
@@ -10074,7 +11097,230 @@
                   <a:spcPts val="600"/>
                 </a:spcAft>
               </a:pPr>
-              <a:t>19</a:t>
+              <a:t>2</a:t>
+            </a:fld>
+            <a:endParaRPr lang="en-US" dirty="0"/>
+          </a:p>
+        </p:txBody>
+      </p:sp>
+    </p:spTree>
+    <p:extLst>
+      <p:ext uri="{BB962C8B-B14F-4D97-AF65-F5344CB8AC3E}">
+        <p14:creationId xmlns:p14="http://schemas.microsoft.com/office/powerpoint/2010/main" val="2534805862"/>
+      </p:ext>
+    </p:extLst>
+  </p:cSld>
+  <p:clrMapOvr>
+    <a:masterClrMapping/>
+  </p:clrMapOvr>
+</p:sld>
+</file>
+
+<file path=ppt/slides/slide20.xml><?xml version="1.0" encoding="utf-8"?>
+<p:sld xmlns:a="http://schemas.openxmlformats.org/drawingml/2006/main" xmlns:r="http://schemas.openxmlformats.org/officeDocument/2006/relationships" xmlns:p="http://schemas.openxmlformats.org/presentationml/2006/main">
+  <p:cSld>
+    <p:spTree>
+      <p:nvGrpSpPr>
+        <p:cNvPr id="1" name=""/>
+        <p:cNvGrpSpPr/>
+        <p:nvPr/>
+      </p:nvGrpSpPr>
+      <p:grpSpPr>
+        <a:xfrm>
+          <a:off x="0" y="0"/>
+          <a:ext cx="0" cy="0"/>
+          <a:chOff x="0" y="0"/>
+          <a:chExt cx="0" cy="0"/>
+        </a:xfrm>
+      </p:grpSpPr>
+      <p:sp>
+        <p:nvSpPr>
+          <p:cNvPr id="2" name="Título 1">
+            <a:extLst>
+              <a:ext uri="{FF2B5EF4-FFF2-40B4-BE49-F238E27FC236}">
+                <a16:creationId xmlns:a16="http://schemas.microsoft.com/office/drawing/2014/main" id="{CD65535C-7ACA-7FF9-6F9D-B7FFAF3D1840}"/>
+              </a:ext>
+            </a:extLst>
+          </p:cNvPr>
+          <p:cNvSpPr>
+            <a:spLocks noGrp="1"/>
+          </p:cNvSpPr>
+          <p:nvPr>
+            <p:ph type="title"/>
+          </p:nvPr>
+        </p:nvSpPr>
+        <p:spPr>
+          <a:xfrm>
+            <a:off x="871107" y="588245"/>
+            <a:ext cx="10711293" cy="1265928"/>
+          </a:xfrm>
+        </p:spPr>
+        <p:txBody>
+          <a:bodyPr anchor="b">
+            <a:normAutofit/>
+          </a:bodyPr>
+          <a:lstStyle/>
+          <a:p>
+            <a:r>
+              <a:rPr lang="pt-BR" b="1" dirty="0"/>
+              <a:t>RELATORIO – Aniversariantes do mês</a:t>
+            </a:r>
+            <a:br>
+              <a:rPr lang="pt-BR" dirty="0">
+                <a:effectLst/>
+              </a:rPr>
+            </a:br>
+            <a:endParaRPr lang="pt-BR" dirty="0"/>
+          </a:p>
+        </p:txBody>
+      </p:sp>
+      <p:sp>
+        <p:nvSpPr>
+          <p:cNvPr id="3" name="Espaço Reservado para Conteúdo 2">
+            <a:extLst>
+              <a:ext uri="{FF2B5EF4-FFF2-40B4-BE49-F238E27FC236}">
+                <a16:creationId xmlns:a16="http://schemas.microsoft.com/office/drawing/2014/main" id="{A8175E1B-23A5-A611-B855-D864BE9BDC26}"/>
+              </a:ext>
+            </a:extLst>
+          </p:cNvPr>
+          <p:cNvSpPr>
+            <a:spLocks noGrp="1"/>
+          </p:cNvSpPr>
+          <p:nvPr>
+            <p:ph sz="half" idx="1"/>
+          </p:nvPr>
+        </p:nvSpPr>
+        <p:spPr>
+          <a:xfrm>
+            <a:off x="763525" y="1854173"/>
+            <a:ext cx="3255402" cy="4017787"/>
+          </a:xfrm>
+        </p:spPr>
+        <p:txBody>
+          <a:bodyPr>
+            <a:normAutofit/>
+          </a:bodyPr>
+          <a:lstStyle/>
+          <a:p>
+            <a:pPr>
+              <a:spcBef>
+                <a:spcPts val="1125"/>
+              </a:spcBef>
+              <a:spcAft>
+                <a:spcPts val="1125"/>
+              </a:spcAft>
+            </a:pPr>
+            <a:r>
+              <a:rPr lang="pt-BR" dirty="0">
+                <a:effectLst/>
+              </a:rPr>
+              <a:t>Aniversariantes do mês: Permite a visualização da relação de aniversariantes a partir da definição do mês.</a:t>
+            </a:r>
+          </a:p>
+        </p:txBody>
+      </p:sp>
+      <p:sp>
+        <p:nvSpPr>
+          <p:cNvPr id="4" name="Espaço Reservado para Data 3">
+            <a:extLst>
+              <a:ext uri="{FF2B5EF4-FFF2-40B4-BE49-F238E27FC236}">
+                <a16:creationId xmlns:a16="http://schemas.microsoft.com/office/drawing/2014/main" id="{DE64AD48-096C-E7CA-6B00-5EADBEB037B0}"/>
+              </a:ext>
+            </a:extLst>
+          </p:cNvPr>
+          <p:cNvSpPr>
+            <a:spLocks noGrp="1"/>
+          </p:cNvSpPr>
+          <p:nvPr>
+            <p:ph type="dt" sz="half" idx="10"/>
+          </p:nvPr>
+        </p:nvSpPr>
+        <p:spPr>
+          <a:xfrm>
+            <a:off x="3917581" y="6308355"/>
+            <a:ext cx="6598019" cy="365125"/>
+          </a:xfrm>
+        </p:spPr>
+        <p:txBody>
+          <a:bodyPr anchor="ctr">
+            <a:normAutofit/>
+          </a:bodyPr>
+          <a:lstStyle/>
+          <a:p>
+            <a:pPr>
+              <a:spcAft>
+                <a:spcPts val="600"/>
+              </a:spcAft>
+            </a:pPr>
+            <a:r>
+              <a:rPr lang="en-US" b="1" dirty="0"/>
+              <a:t>FigurA17 – </a:t>
+            </a:r>
+            <a:r>
+              <a:rPr lang="en-US" b="1" dirty="0" err="1"/>
+              <a:t>tela</a:t>
+            </a:r>
+            <a:r>
+              <a:rPr lang="en-US" b="1" dirty="0"/>
+              <a:t> de RELATORIO DOS </a:t>
+            </a:r>
+            <a:r>
+              <a:rPr lang="en-US" b="1" dirty="0" err="1"/>
+              <a:t>aniversariantes</a:t>
+            </a:r>
+            <a:r>
+              <a:rPr lang="en-US" b="1" dirty="0"/>
+              <a:t> do </a:t>
+            </a:r>
+            <a:r>
+              <a:rPr lang="en-US" b="1" dirty="0" err="1"/>
+              <a:t>mes</a:t>
+            </a:r>
+            <a:endParaRPr lang="en-US" b="1" dirty="0"/>
+          </a:p>
+        </p:txBody>
+      </p:sp>
+      <p:sp>
+        <p:nvSpPr>
+          <p:cNvPr id="6" name="Espaço Reservado para Número de Slide 5">
+            <a:extLst>
+              <a:ext uri="{FF2B5EF4-FFF2-40B4-BE49-F238E27FC236}">
+                <a16:creationId xmlns:a16="http://schemas.microsoft.com/office/drawing/2014/main" id="{8883A2C0-B521-6A26-937C-5AA581D07BB9}"/>
+              </a:ext>
+            </a:extLst>
+          </p:cNvPr>
+          <p:cNvSpPr>
+            <a:spLocks noGrp="1"/>
+          </p:cNvSpPr>
+          <p:nvPr>
+            <p:ph type="sldNum" sz="quarter" idx="12"/>
+          </p:nvPr>
+        </p:nvSpPr>
+        <p:spPr>
+          <a:xfrm>
+            <a:off x="11429999" y="6356350"/>
+            <a:ext cx="521207" cy="365125"/>
+          </a:xfrm>
+        </p:spPr>
+        <p:txBody>
+          <a:bodyPr anchor="ctr">
+            <a:normAutofit/>
+          </a:bodyPr>
+          <a:lstStyle/>
+          <a:p>
+            <a:pPr>
+              <a:spcAft>
+                <a:spcPts val="600"/>
+              </a:spcAft>
+            </a:pPr>
+            <a:fld id="{C68AC1EC-23E2-4F0E-A5A4-674EC8DB954E}" type="slidenum">
+              <a:rPr lang="en-US" smtClean="0"/>
+              <a:pPr>
+                <a:spcAft>
+                  <a:spcPts val="600"/>
+                </a:spcAft>
+              </a:pPr>
+              <a:t>20</a:t>
             </a:fld>
             <a:endParaRPr lang="en-US"/>
           </a:p>
@@ -10123,294 +11369,7 @@
 </p:sld>
 </file>
 
-<file path=ppt/slides/slide2.xml><?xml version="1.0" encoding="utf-8"?>
-<p:sld xmlns:a="http://schemas.openxmlformats.org/drawingml/2006/main" xmlns:r="http://schemas.openxmlformats.org/officeDocument/2006/relationships" xmlns:p="http://schemas.openxmlformats.org/presentationml/2006/main">
-  <p:cSld>
-    <p:spTree>
-      <p:nvGrpSpPr>
-        <p:cNvPr id="1" name=""/>
-        <p:cNvGrpSpPr/>
-        <p:nvPr/>
-      </p:nvGrpSpPr>
-      <p:grpSpPr>
-        <a:xfrm>
-          <a:off x="0" y="0"/>
-          <a:ext cx="0" cy="0"/>
-          <a:chOff x="0" y="0"/>
-          <a:chExt cx="0" cy="0"/>
-        </a:xfrm>
-      </p:grpSpPr>
-      <p:sp>
-        <p:nvSpPr>
-          <p:cNvPr id="2" name="Título 1">
-            <a:extLst>
-              <a:ext uri="{FF2B5EF4-FFF2-40B4-BE49-F238E27FC236}">
-                <a16:creationId xmlns:a16="http://schemas.microsoft.com/office/drawing/2014/main" id="{5B18BC5C-418B-9723-B5E9-1EE52F22D23B}"/>
-              </a:ext>
-            </a:extLst>
-          </p:cNvPr>
-          <p:cNvSpPr>
-            <a:spLocks noGrp="1"/>
-          </p:cNvSpPr>
-          <p:nvPr>
-            <p:ph type="title"/>
-          </p:nvPr>
-        </p:nvSpPr>
-        <p:spPr>
-          <a:xfrm>
-            <a:off x="1155700" y="1252368"/>
-            <a:ext cx="5842000" cy="1097132"/>
-          </a:xfrm>
-        </p:spPr>
-        <p:txBody>
-          <a:bodyPr anchor="t">
-            <a:normAutofit fontScale="90000"/>
-          </a:bodyPr>
-          <a:lstStyle/>
-          <a:p>
-            <a:r>
-              <a:rPr lang="pt-BR" sz="3100" b="1" dirty="0"/>
-              <a:t>APRESENTAÇÃO DO SOFTWARE</a:t>
-            </a:r>
-            <a:br>
-              <a:rPr lang="pt-BR" dirty="0">
-                <a:effectLst/>
-              </a:rPr>
-            </a:br>
-            <a:endParaRPr lang="pt-BR" dirty="0"/>
-          </a:p>
-        </p:txBody>
-      </p:sp>
-      <p:pic>
-        <p:nvPicPr>
-          <p:cNvPr id="1026" name="Picture 2" descr="Diagrama&#10;&#10;Descrição gerada automaticamente">
-            <a:extLst>
-              <a:ext uri="{FF2B5EF4-FFF2-40B4-BE49-F238E27FC236}">
-                <a16:creationId xmlns:a16="http://schemas.microsoft.com/office/drawing/2014/main" id="{4F75B088-CAE1-5196-A146-20F86E979396}"/>
-              </a:ext>
-            </a:extLst>
-          </p:cNvPr>
-          <p:cNvPicPr>
-            <a:picLocks noChangeAspect="1" noChangeArrowheads="1"/>
-          </p:cNvPicPr>
-          <p:nvPr/>
-        </p:nvPicPr>
-        <p:blipFill>
-          <a:blip r:embed="rId2">
-            <a:extLst>
-              <a:ext uri="{28A0092B-C50C-407E-A947-70E740481C1C}">
-                <a14:useLocalDpi xmlns:a14="http://schemas.microsoft.com/office/drawing/2010/main" val="0"/>
-              </a:ext>
-            </a:extLst>
-          </a:blip>
-          <a:stretch>
-            <a:fillRect/>
-          </a:stretch>
-        </p:blipFill>
-        <p:spPr bwMode="auto">
-          <a:xfrm>
-            <a:off x="6633286" y="383458"/>
-            <a:ext cx="5121180" cy="5972891"/>
-          </a:xfrm>
-          <a:prstGeom prst="rect">
-            <a:avLst/>
-          </a:prstGeom>
-          <a:solidFill>
-            <a:srgbClr val="FFFFFF"/>
-          </a:solidFill>
-        </p:spPr>
-      </p:pic>
-      <p:sp>
-        <p:nvSpPr>
-          <p:cNvPr id="3" name="Espaço Reservado para Conteúdo 2">
-            <a:extLst>
-              <a:ext uri="{FF2B5EF4-FFF2-40B4-BE49-F238E27FC236}">
-                <a16:creationId xmlns:a16="http://schemas.microsoft.com/office/drawing/2014/main" id="{CFEA0649-8914-9CCB-0D86-13DB4CFD912E}"/>
-              </a:ext>
-            </a:extLst>
-          </p:cNvPr>
-          <p:cNvSpPr>
-            <a:spLocks noGrp="1"/>
-          </p:cNvSpPr>
-          <p:nvPr>
-            <p:ph type="body" sz="half" idx="2"/>
-          </p:nvPr>
-        </p:nvSpPr>
-        <p:spPr>
-          <a:xfrm>
-            <a:off x="839788" y="2123768"/>
-            <a:ext cx="5664251" cy="2684206"/>
-          </a:xfrm>
-        </p:spPr>
-        <p:txBody>
-          <a:bodyPr anchor="b">
-            <a:normAutofit/>
-          </a:bodyPr>
-          <a:lstStyle/>
-          <a:p>
-            <a:pPr marL="285750" indent="-285750" algn="just">
-              <a:buFont typeface="Arial" panose="020B0604020202020204" pitchFamily="34" charset="0"/>
-              <a:buChar char="•"/>
-            </a:pPr>
-            <a:r>
-              <a:rPr lang="pt-BR" dirty="0">
-                <a:effectLst/>
-              </a:rPr>
-              <a:t>O objetivo do sistema é efetuar um controle através do cadastro de usuários, alunos e funcionários, bem como efetuar a gestão dos serviços oferecidos na forma de planos.</a:t>
-            </a:r>
-          </a:p>
-          <a:p>
-            <a:pPr marL="285750" indent="-285750" algn="just">
-              <a:buFont typeface="Arial" panose="020B0604020202020204" pitchFamily="34" charset="0"/>
-              <a:buChar char="•"/>
-            </a:pPr>
-            <a:r>
-              <a:rPr lang="pt-BR" dirty="0">
-                <a:effectLst/>
-              </a:rPr>
-              <a:t>Através de uma interface </a:t>
-            </a:r>
-            <a:r>
-              <a:rPr lang="pt-BR" dirty="0"/>
-              <a:t>simples</a:t>
-            </a:r>
-            <a:r>
-              <a:rPr lang="pt-BR" dirty="0">
-                <a:effectLst/>
-              </a:rPr>
-              <a:t> ele centraliza tarefas de controle de acesso, cadastro e segurança de maneira objetiva, tornando-se uma ferramenta ideal para o controle dos ativos de sua academia.</a:t>
-            </a:r>
-          </a:p>
-          <a:p>
-            <a:endParaRPr lang="pt-BR" sz="1500" dirty="0"/>
-          </a:p>
-        </p:txBody>
-      </p:sp>
-      <p:sp>
-        <p:nvSpPr>
-          <p:cNvPr id="4" name="Espaço Reservado para Data 3">
-            <a:extLst>
-              <a:ext uri="{FF2B5EF4-FFF2-40B4-BE49-F238E27FC236}">
-                <a16:creationId xmlns:a16="http://schemas.microsoft.com/office/drawing/2014/main" id="{D02EA9A5-FFAA-5034-0C87-55E0F42207C8}"/>
-              </a:ext>
-            </a:extLst>
-          </p:cNvPr>
-          <p:cNvSpPr>
-            <a:spLocks noGrp="1"/>
-          </p:cNvSpPr>
-          <p:nvPr>
-            <p:ph type="dt" sz="half" idx="10"/>
-          </p:nvPr>
-        </p:nvSpPr>
-        <p:spPr>
-          <a:xfrm>
-            <a:off x="6633286" y="6356350"/>
-            <a:ext cx="2982976" cy="365125"/>
-          </a:xfrm>
-        </p:spPr>
-        <p:txBody>
-          <a:bodyPr anchor="ctr">
-            <a:normAutofit/>
-          </a:bodyPr>
-          <a:lstStyle/>
-          <a:p>
-            <a:pPr>
-              <a:spcAft>
-                <a:spcPts val="600"/>
-              </a:spcAft>
-            </a:pPr>
-            <a:r>
-              <a:rPr lang="en-US" b="1" dirty="0" err="1"/>
-              <a:t>Figura</a:t>
-            </a:r>
-            <a:r>
-              <a:rPr lang="en-US" b="1" dirty="0"/>
-              <a:t> 1- </a:t>
-            </a:r>
-            <a:r>
-              <a:rPr lang="en-US" b="1" dirty="0" err="1"/>
-              <a:t>modelo</a:t>
-            </a:r>
-            <a:r>
-              <a:rPr lang="en-US" b="1" dirty="0"/>
-              <a:t> </a:t>
-            </a:r>
-            <a:r>
-              <a:rPr lang="en-US" b="1" dirty="0" err="1"/>
-              <a:t>caso</a:t>
-            </a:r>
-            <a:r>
-              <a:rPr lang="en-US" b="1" dirty="0"/>
-              <a:t> de </a:t>
-            </a:r>
-            <a:r>
-              <a:rPr lang="en-US" b="1" dirty="0" err="1"/>
-              <a:t>uso</a:t>
-            </a:r>
-            <a:endParaRPr lang="en-US" b="1" dirty="0"/>
-          </a:p>
-        </p:txBody>
-      </p:sp>
-      <p:sp>
-        <p:nvSpPr>
-          <p:cNvPr id="6" name="Espaço Reservado para Número de Slide 5">
-            <a:extLst>
-              <a:ext uri="{FF2B5EF4-FFF2-40B4-BE49-F238E27FC236}">
-                <a16:creationId xmlns:a16="http://schemas.microsoft.com/office/drawing/2014/main" id="{893BDAB9-7523-5E53-2381-25946788E257}"/>
-              </a:ext>
-            </a:extLst>
-          </p:cNvPr>
-          <p:cNvSpPr>
-            <a:spLocks noGrp="1"/>
-          </p:cNvSpPr>
-          <p:nvPr>
-            <p:ph type="sldNum" sz="quarter" idx="12"/>
-          </p:nvPr>
-        </p:nvSpPr>
-        <p:spPr>
-          <a:xfrm>
-            <a:off x="11429999" y="6356350"/>
-            <a:ext cx="521207" cy="365125"/>
-          </a:xfrm>
-        </p:spPr>
-        <p:txBody>
-          <a:bodyPr anchor="ctr">
-            <a:normAutofit/>
-          </a:bodyPr>
-          <a:lstStyle/>
-          <a:p>
-            <a:pPr>
-              <a:spcAft>
-                <a:spcPts val="600"/>
-              </a:spcAft>
-            </a:pPr>
-            <a:fld id="{C68AC1EC-23E2-4F0E-A5A4-674EC8DB954E}" type="slidenum">
-              <a:rPr lang="en-US" smtClean="0"/>
-              <a:pPr>
-                <a:spcAft>
-                  <a:spcPts val="600"/>
-                </a:spcAft>
-              </a:pPr>
-              <a:t>2</a:t>
-            </a:fld>
-            <a:endParaRPr lang="en-US" dirty="0"/>
-          </a:p>
-        </p:txBody>
-      </p:sp>
-    </p:spTree>
-    <p:extLst>
-      <p:ext uri="{BB962C8B-B14F-4D97-AF65-F5344CB8AC3E}">
-        <p14:creationId xmlns:p14="http://schemas.microsoft.com/office/powerpoint/2010/main" val="2534805862"/>
-      </p:ext>
-    </p:extLst>
-  </p:cSld>
-  <p:clrMapOvr>
-    <a:masterClrMapping/>
-  </p:clrMapOvr>
-</p:sld>
-</file>
-
-<file path=ppt/slides/slide20.xml><?xml version="1.0" encoding="utf-8"?>
+<file path=ppt/slides/slide21.xml><?xml version="1.0" encoding="utf-8"?>
 <p:sld xmlns:a="http://schemas.openxmlformats.org/drawingml/2006/main" xmlns:r="http://schemas.openxmlformats.org/officeDocument/2006/relationships" xmlns:p="http://schemas.openxmlformats.org/presentationml/2006/main">
   <p:cSld>
     <p:spTree>
@@ -10670,7 +11629,7 @@
                   <a:spcPts val="600"/>
                 </a:spcAft>
               </a:pPr>
-              <a:t>20</a:t>
+              <a:t>21</a:t>
             </a:fld>
             <a:endParaRPr lang="en-US"/>
           </a:p>
@@ -10680,412 +11639,6 @@
     <p:extLst>
       <p:ext uri="{BB962C8B-B14F-4D97-AF65-F5344CB8AC3E}">
         <p14:creationId xmlns:p14="http://schemas.microsoft.com/office/powerpoint/2010/main" val="1675736896"/>
-      </p:ext>
-    </p:extLst>
-  </p:cSld>
-  <p:clrMapOvr>
-    <a:masterClrMapping/>
-  </p:clrMapOvr>
-</p:sld>
-</file>
-
-<file path=ppt/slides/slide21.xml><?xml version="1.0" encoding="utf-8"?>
-<p:sld xmlns:a="http://schemas.openxmlformats.org/drawingml/2006/main" xmlns:r="http://schemas.openxmlformats.org/officeDocument/2006/relationships" xmlns:p="http://schemas.openxmlformats.org/presentationml/2006/main">
-  <p:cSld>
-    <p:spTree>
-      <p:nvGrpSpPr>
-        <p:cNvPr id="1" name=""/>
-        <p:cNvGrpSpPr/>
-        <p:nvPr/>
-      </p:nvGrpSpPr>
-      <p:grpSpPr>
-        <a:xfrm>
-          <a:off x="0" y="0"/>
-          <a:ext cx="0" cy="0"/>
-          <a:chOff x="0" y="0"/>
-          <a:chExt cx="0" cy="0"/>
-        </a:xfrm>
-      </p:grpSpPr>
-      <p:sp>
-        <p:nvSpPr>
-          <p:cNvPr id="2" name="Título 1">
-            <a:extLst>
-              <a:ext uri="{FF2B5EF4-FFF2-40B4-BE49-F238E27FC236}">
-                <a16:creationId xmlns:a16="http://schemas.microsoft.com/office/drawing/2014/main" id="{67505AC7-381E-215D-DE89-A29A52A396C3}"/>
-              </a:ext>
-            </a:extLst>
-          </p:cNvPr>
-          <p:cNvSpPr>
-            <a:spLocks noGrp="1"/>
-          </p:cNvSpPr>
-          <p:nvPr>
-            <p:ph type="title"/>
-          </p:nvPr>
-        </p:nvSpPr>
-        <p:spPr/>
-        <p:txBody>
-          <a:bodyPr/>
-          <a:lstStyle/>
-          <a:p>
-            <a:r>
-              <a:rPr lang="pt-BR" b="1" dirty="0"/>
-              <a:t>ESPECIFICAÇÕES TÉCNICAS</a:t>
-            </a:r>
-            <a:br>
-              <a:rPr lang="pt-BR" b="1" dirty="0"/>
-            </a:br>
-            <a:endParaRPr lang="pt-BR" b="1" dirty="0"/>
-          </a:p>
-        </p:txBody>
-      </p:sp>
-      <p:sp>
-        <p:nvSpPr>
-          <p:cNvPr id="3" name="Espaço Reservado para Conteúdo 2">
-            <a:extLst>
-              <a:ext uri="{FF2B5EF4-FFF2-40B4-BE49-F238E27FC236}">
-                <a16:creationId xmlns:a16="http://schemas.microsoft.com/office/drawing/2014/main" id="{42456B08-C54C-1760-7377-187C86252AED}"/>
-              </a:ext>
-            </a:extLst>
-          </p:cNvPr>
-          <p:cNvSpPr>
-            <a:spLocks noGrp="1"/>
-          </p:cNvSpPr>
-          <p:nvPr>
-            <p:ph idx="1"/>
-          </p:nvPr>
-        </p:nvSpPr>
-        <p:spPr>
-          <a:xfrm>
-            <a:off x="877824" y="1854173"/>
-            <a:ext cx="10442448" cy="3903819"/>
-          </a:xfrm>
-        </p:spPr>
-        <p:txBody>
-          <a:bodyPr>
-            <a:normAutofit fontScale="92500" lnSpcReduction="10000"/>
-          </a:bodyPr>
-          <a:lstStyle/>
-          <a:p>
-            <a:pPr algn="just">
-              <a:spcBef>
-                <a:spcPts val="1125"/>
-              </a:spcBef>
-              <a:spcAft>
-                <a:spcPts val="1125"/>
-              </a:spcAft>
-            </a:pPr>
-            <a:r>
-              <a:rPr lang="pt-BR" sz="1800">
-                <a:solidFill>
-                  <a:srgbClr val="444444"/>
-                </a:solidFill>
-                <a:effectLst/>
-                <a:latin typeface="Open Sans" panose="020B0606030504020204" pitchFamily="34" charset="0"/>
-                <a:ea typeface="Times New Roman" panose="02020603050405020304" pitchFamily="18" charset="0"/>
-              </a:rPr>
-              <a:t>Banco de Dados: padrão do sistema em </a:t>
-            </a:r>
-            <a:r>
-              <a:rPr lang="pt-BR" sz="1800" err="1">
-                <a:solidFill>
-                  <a:srgbClr val="444444"/>
-                </a:solidFill>
-                <a:effectLst/>
-                <a:latin typeface="Open Sans" panose="020B0606030504020204" pitchFamily="34" charset="0"/>
-                <a:ea typeface="Times New Roman" panose="02020603050405020304" pitchFamily="18" charset="0"/>
-              </a:rPr>
-              <a:t>SQLite</a:t>
-            </a:r>
-            <a:r>
-              <a:rPr lang="pt-BR" sz="1800">
-                <a:solidFill>
-                  <a:srgbClr val="444444"/>
-                </a:solidFill>
-                <a:effectLst/>
-                <a:latin typeface="Open Sans" panose="020B0606030504020204" pitchFamily="34" charset="0"/>
-                <a:ea typeface="Times New Roman" panose="02020603050405020304" pitchFamily="18" charset="0"/>
-              </a:rPr>
-              <a:t>, podendo no entanto, ser utilizado com a maioria dos bancos de dados atualmente disponíveis (Oracle, Sybase, </a:t>
-            </a:r>
-            <a:r>
-              <a:rPr lang="pt-BR" sz="1800" err="1">
-                <a:solidFill>
-                  <a:srgbClr val="444444"/>
-                </a:solidFill>
-                <a:effectLst/>
-                <a:latin typeface="Open Sans" panose="020B0606030504020204" pitchFamily="34" charset="0"/>
-                <a:ea typeface="Times New Roman" panose="02020603050405020304" pitchFamily="18" charset="0"/>
-              </a:rPr>
-              <a:t>Mysql</a:t>
-            </a:r>
-            <a:r>
-              <a:rPr lang="pt-BR" sz="1800">
-                <a:solidFill>
-                  <a:srgbClr val="444444"/>
-                </a:solidFill>
-                <a:effectLst/>
-                <a:latin typeface="Open Sans" panose="020B0606030504020204" pitchFamily="34" charset="0"/>
-                <a:ea typeface="Times New Roman" panose="02020603050405020304" pitchFamily="18" charset="0"/>
-              </a:rPr>
-              <a:t>, </a:t>
-            </a:r>
-            <a:r>
-              <a:rPr lang="pt-BR" sz="1800" err="1">
-                <a:solidFill>
-                  <a:srgbClr val="444444"/>
-                </a:solidFill>
-                <a:effectLst/>
-                <a:latin typeface="Open Sans" panose="020B0606030504020204" pitchFamily="34" charset="0"/>
-                <a:ea typeface="Times New Roman" panose="02020603050405020304" pitchFamily="18" charset="0"/>
-              </a:rPr>
-              <a:t>Firebird</a:t>
-            </a:r>
-            <a:r>
-              <a:rPr lang="pt-BR" sz="1800">
-                <a:solidFill>
-                  <a:srgbClr val="444444"/>
-                </a:solidFill>
-                <a:effectLst/>
-                <a:latin typeface="Open Sans" panose="020B0606030504020204" pitchFamily="34" charset="0"/>
-                <a:ea typeface="Times New Roman" panose="02020603050405020304" pitchFamily="18" charset="0"/>
-              </a:rPr>
-              <a:t>, PostgreSQL);</a:t>
-            </a:r>
-          </a:p>
-          <a:p>
-            <a:pPr algn="just">
-              <a:spcBef>
-                <a:spcPts val="1125"/>
-              </a:spcBef>
-              <a:spcAft>
-                <a:spcPts val="1125"/>
-              </a:spcAft>
-            </a:pPr>
-            <a:r>
-              <a:rPr lang="pt-BR" sz="1800">
-                <a:solidFill>
-                  <a:srgbClr val="444444"/>
-                </a:solidFill>
-                <a:effectLst/>
-                <a:latin typeface="Open Sans" panose="020B0606030504020204" pitchFamily="34" charset="0"/>
-                <a:ea typeface="Times New Roman" panose="02020603050405020304" pitchFamily="18" charset="0"/>
-              </a:rPr>
-              <a:t>Linguagem de programação: Python</a:t>
-            </a:r>
-          </a:p>
-          <a:p>
-            <a:pPr algn="just">
-              <a:spcBef>
-                <a:spcPts val="1125"/>
-              </a:spcBef>
-              <a:spcAft>
-                <a:spcPts val="1125"/>
-              </a:spcAft>
-            </a:pPr>
-            <a:r>
-              <a:rPr lang="pt-BR" sz="1800">
-                <a:solidFill>
-                  <a:srgbClr val="444444"/>
-                </a:solidFill>
-                <a:effectLst/>
-                <a:latin typeface="Open Sans" panose="020B0606030504020204" pitchFamily="34" charset="0"/>
-                <a:ea typeface="Times New Roman" panose="02020603050405020304" pitchFamily="18" charset="0"/>
-              </a:rPr>
-              <a:t>IDE: </a:t>
-            </a:r>
-            <a:r>
-              <a:rPr lang="pt-BR" sz="1800" err="1">
-                <a:solidFill>
-                  <a:srgbClr val="444444"/>
-                </a:solidFill>
-                <a:effectLst/>
-                <a:latin typeface="Open Sans" panose="020B0606030504020204" pitchFamily="34" charset="0"/>
-                <a:ea typeface="Times New Roman" panose="02020603050405020304" pitchFamily="18" charset="0"/>
-              </a:rPr>
-              <a:t>PyCharm</a:t>
-            </a:r>
-            <a:r>
-              <a:rPr lang="pt-BR" sz="1800">
-                <a:solidFill>
-                  <a:srgbClr val="444444"/>
-                </a:solidFill>
-                <a:effectLst/>
-                <a:latin typeface="Open Sans" panose="020B0606030504020204" pitchFamily="34" charset="0"/>
-                <a:ea typeface="Times New Roman" panose="02020603050405020304" pitchFamily="18" charset="0"/>
-              </a:rPr>
-              <a:t> CE</a:t>
-            </a:r>
-          </a:p>
-          <a:p>
-            <a:pPr algn="just">
-              <a:spcBef>
-                <a:spcPts val="1125"/>
-              </a:spcBef>
-              <a:spcAft>
-                <a:spcPts val="1125"/>
-              </a:spcAft>
-            </a:pPr>
-            <a:r>
-              <a:rPr lang="pt-BR" sz="1800">
-                <a:solidFill>
-                  <a:srgbClr val="444444"/>
-                </a:solidFill>
-                <a:effectLst/>
-                <a:latin typeface="Open Sans" panose="020B0606030504020204" pitchFamily="34" charset="0"/>
-                <a:ea typeface="Times New Roman" panose="02020603050405020304" pitchFamily="18" charset="0"/>
-              </a:rPr>
-              <a:t>Computador requerido: Processador com 1 </a:t>
-            </a:r>
-            <a:r>
-              <a:rPr lang="pt-BR" sz="1800" err="1">
-                <a:solidFill>
-                  <a:srgbClr val="444444"/>
-                </a:solidFill>
-                <a:effectLst/>
-                <a:latin typeface="Open Sans" panose="020B0606030504020204" pitchFamily="34" charset="0"/>
-                <a:ea typeface="Times New Roman" panose="02020603050405020304" pitchFamily="18" charset="0"/>
-              </a:rPr>
-              <a:t>Ghz</a:t>
-            </a:r>
-            <a:r>
-              <a:rPr lang="pt-BR" sz="1800">
-                <a:solidFill>
-                  <a:srgbClr val="444444"/>
-                </a:solidFill>
-                <a:effectLst/>
-                <a:latin typeface="Open Sans" panose="020B0606030504020204" pitchFamily="34" charset="0"/>
-                <a:ea typeface="Times New Roman" panose="02020603050405020304" pitchFamily="18" charset="0"/>
-              </a:rPr>
-              <a:t>, memória de 512Mb, espaço em disco de no mínimo 1 Gb, resolução 1024x768 (nesta configuração uso máximo de 3 equipamentos de controle de acesso);</a:t>
-            </a:r>
-          </a:p>
-          <a:p>
-            <a:pPr algn="just">
-              <a:spcBef>
-                <a:spcPts val="1125"/>
-              </a:spcBef>
-              <a:spcAft>
-                <a:spcPts val="1125"/>
-              </a:spcAft>
-            </a:pPr>
-            <a:r>
-              <a:rPr lang="pt-BR" sz="1800">
-                <a:solidFill>
-                  <a:srgbClr val="444444"/>
-                </a:solidFill>
-                <a:effectLst/>
-                <a:latin typeface="Open Sans" panose="020B0606030504020204" pitchFamily="34" charset="0"/>
-                <a:ea typeface="Times New Roman" panose="02020603050405020304" pitchFamily="18" charset="0"/>
-              </a:rPr>
-              <a:t>Computador sugerido: </a:t>
-            </a:r>
-            <a:r>
-              <a:rPr lang="pt-BR" sz="1800" err="1">
-                <a:solidFill>
-                  <a:srgbClr val="444444"/>
-                </a:solidFill>
-                <a:effectLst/>
-                <a:latin typeface="Open Sans" panose="020B0606030504020204" pitchFamily="34" charset="0"/>
-                <a:ea typeface="Times New Roman" panose="02020603050405020304" pitchFamily="18" charset="0"/>
-              </a:rPr>
-              <a:t>Multi-processador</a:t>
-            </a:r>
-            <a:r>
-              <a:rPr lang="pt-BR" sz="1800">
-                <a:solidFill>
-                  <a:srgbClr val="444444"/>
-                </a:solidFill>
-                <a:effectLst/>
-                <a:latin typeface="Open Sans" panose="020B0606030504020204" pitchFamily="34" charset="0"/>
-                <a:ea typeface="Times New Roman" panose="02020603050405020304" pitchFamily="18" charset="0"/>
-              </a:rPr>
-              <a:t> acima de 3 </a:t>
-            </a:r>
-            <a:r>
-              <a:rPr lang="pt-BR" sz="1800" err="1">
-                <a:solidFill>
-                  <a:srgbClr val="444444"/>
-                </a:solidFill>
-                <a:effectLst/>
-                <a:latin typeface="Open Sans" panose="020B0606030504020204" pitchFamily="34" charset="0"/>
-                <a:ea typeface="Times New Roman" panose="02020603050405020304" pitchFamily="18" charset="0"/>
-              </a:rPr>
-              <a:t>Ghz</a:t>
-            </a:r>
-            <a:r>
-              <a:rPr lang="pt-BR" sz="1800">
-                <a:solidFill>
-                  <a:srgbClr val="444444"/>
-                </a:solidFill>
-                <a:effectLst/>
-                <a:latin typeface="Open Sans" panose="020B0606030504020204" pitchFamily="34" charset="0"/>
-                <a:ea typeface="Times New Roman" panose="02020603050405020304" pitchFamily="18" charset="0"/>
-              </a:rPr>
-              <a:t> (</a:t>
-            </a:r>
-            <a:r>
-              <a:rPr lang="pt-BR" sz="1800" err="1">
-                <a:solidFill>
-                  <a:srgbClr val="444444"/>
-                </a:solidFill>
-                <a:effectLst/>
-                <a:latin typeface="Open Sans" panose="020B0606030504020204" pitchFamily="34" charset="0"/>
-                <a:ea typeface="Times New Roman" panose="02020603050405020304" pitchFamily="18" charset="0"/>
-              </a:rPr>
-              <a:t>multi-core</a:t>
-            </a:r>
-            <a:r>
-              <a:rPr lang="pt-BR" sz="1800">
-                <a:solidFill>
-                  <a:srgbClr val="444444"/>
-                </a:solidFill>
-                <a:effectLst/>
-                <a:latin typeface="Open Sans" panose="020B0606030504020204" pitchFamily="34" charset="0"/>
-                <a:ea typeface="Times New Roman" panose="02020603050405020304" pitchFamily="18" charset="0"/>
-              </a:rPr>
-              <a:t> ou vários processadores), memória de 4 Gb, espaço em disco de, no mínimo 10 Gb, resolução 1024x768;</a:t>
-            </a:r>
-            <a:endParaRPr lang="pt-BR" sz="1800">
-              <a:effectLst/>
-              <a:latin typeface="Times New Roman" panose="02020603050405020304" pitchFamily="18" charset="0"/>
-              <a:ea typeface="Times New Roman" panose="02020603050405020304" pitchFamily="18" charset="0"/>
-            </a:endParaRPr>
-          </a:p>
-        </p:txBody>
-      </p:sp>
-      <p:sp>
-        <p:nvSpPr>
-          <p:cNvPr id="6" name="Espaço Reservado para Número de Slide 5">
-            <a:extLst>
-              <a:ext uri="{FF2B5EF4-FFF2-40B4-BE49-F238E27FC236}">
-                <a16:creationId xmlns:a16="http://schemas.microsoft.com/office/drawing/2014/main" id="{08B0DBC5-EA0D-F917-B4DD-EF346E432987}"/>
-              </a:ext>
-            </a:extLst>
-          </p:cNvPr>
-          <p:cNvSpPr>
-            <a:spLocks noGrp="1"/>
-          </p:cNvSpPr>
-          <p:nvPr>
-            <p:ph type="sldNum" sz="quarter" idx="12"/>
-          </p:nvPr>
-        </p:nvSpPr>
-        <p:spPr/>
-        <p:txBody>
-          <a:bodyPr/>
-          <a:lstStyle/>
-          <a:p>
-            <a:fld id="{C68AC1EC-23E2-4F0E-A5A4-674EC8DB954E}" type="slidenum">
-              <a:rPr lang="en-US" smtClean="0"/>
-              <a:t>21</a:t>
-            </a:fld>
-            <a:endParaRPr lang="en-US"/>
-          </a:p>
-        </p:txBody>
-      </p:sp>
-    </p:spTree>
-    <p:extLst>
-      <p:ext uri="{BB962C8B-B14F-4D97-AF65-F5344CB8AC3E}">
-        <p14:creationId xmlns:p14="http://schemas.microsoft.com/office/powerpoint/2010/main" val="1045391905"/>
       </p:ext>
     </p:extLst>
   </p:cSld>
@@ -11135,6 +11688,277 @@
           <a:p>
             <a:r>
               <a:rPr lang="pt-BR" b="1" dirty="0"/>
+              <a:t>ESPECIFICAÇÕES TÉCNICAS</a:t>
+            </a:r>
+            <a:br>
+              <a:rPr lang="pt-BR" b="1" dirty="0"/>
+            </a:br>
+            <a:endParaRPr lang="pt-BR" b="1" dirty="0"/>
+          </a:p>
+        </p:txBody>
+      </p:sp>
+      <p:sp>
+        <p:nvSpPr>
+          <p:cNvPr id="3" name="Espaço Reservado para Conteúdo 2">
+            <a:extLst>
+              <a:ext uri="{FF2B5EF4-FFF2-40B4-BE49-F238E27FC236}">
+                <a16:creationId xmlns:a16="http://schemas.microsoft.com/office/drawing/2014/main" id="{42456B08-C54C-1760-7377-187C86252AED}"/>
+              </a:ext>
+            </a:extLst>
+          </p:cNvPr>
+          <p:cNvSpPr>
+            <a:spLocks noGrp="1"/>
+          </p:cNvSpPr>
+          <p:nvPr>
+            <p:ph idx="1"/>
+          </p:nvPr>
+        </p:nvSpPr>
+        <p:spPr>
+          <a:xfrm>
+            <a:off x="877824" y="1854173"/>
+            <a:ext cx="10442448" cy="3903819"/>
+          </a:xfrm>
+        </p:spPr>
+        <p:txBody>
+          <a:bodyPr>
+            <a:normAutofit/>
+          </a:bodyPr>
+          <a:lstStyle/>
+          <a:p>
+            <a:pPr algn="just">
+              <a:spcBef>
+                <a:spcPts val="1125"/>
+              </a:spcBef>
+              <a:spcAft>
+                <a:spcPts val="1125"/>
+              </a:spcAft>
+            </a:pPr>
+            <a:r>
+              <a:rPr lang="pt-BR" sz="1800" dirty="0">
+                <a:solidFill>
+                  <a:srgbClr val="444444"/>
+                </a:solidFill>
+                <a:effectLst/>
+                <a:latin typeface="Open Sans" panose="020B0606030504020204" pitchFamily="34" charset="0"/>
+                <a:ea typeface="Times New Roman" panose="02020603050405020304" pitchFamily="18" charset="0"/>
+              </a:rPr>
+              <a:t>Banco de Dados: padrão do sistema em </a:t>
+            </a:r>
+            <a:r>
+              <a:rPr lang="pt-BR" sz="1800" dirty="0" err="1">
+                <a:solidFill>
+                  <a:srgbClr val="444444"/>
+                </a:solidFill>
+                <a:effectLst/>
+                <a:latin typeface="Open Sans" panose="020B0606030504020204" pitchFamily="34" charset="0"/>
+                <a:ea typeface="Times New Roman" panose="02020603050405020304" pitchFamily="18" charset="0"/>
+              </a:rPr>
+              <a:t>SQLite</a:t>
+            </a:r>
+            <a:r>
+              <a:rPr lang="pt-BR" sz="1800" dirty="0">
+                <a:solidFill>
+                  <a:srgbClr val="444444"/>
+                </a:solidFill>
+                <a:effectLst/>
+                <a:latin typeface="Open Sans" panose="020B0606030504020204" pitchFamily="34" charset="0"/>
+                <a:ea typeface="Times New Roman" panose="02020603050405020304" pitchFamily="18" charset="0"/>
+              </a:rPr>
+              <a:t>, podendo no entanto, ser utilizado com a maioria dos bancos de dados atualmente disponíveis (Oracle, Sybase, </a:t>
+            </a:r>
+            <a:r>
+              <a:rPr lang="pt-BR" sz="1800" dirty="0" err="1">
+                <a:solidFill>
+                  <a:srgbClr val="444444"/>
+                </a:solidFill>
+                <a:effectLst/>
+                <a:latin typeface="Open Sans" panose="020B0606030504020204" pitchFamily="34" charset="0"/>
+                <a:ea typeface="Times New Roman" panose="02020603050405020304" pitchFamily="18" charset="0"/>
+              </a:rPr>
+              <a:t>Mysql</a:t>
+            </a:r>
+            <a:r>
+              <a:rPr lang="pt-BR" sz="1800" dirty="0">
+                <a:solidFill>
+                  <a:srgbClr val="444444"/>
+                </a:solidFill>
+                <a:effectLst/>
+                <a:latin typeface="Open Sans" panose="020B0606030504020204" pitchFamily="34" charset="0"/>
+                <a:ea typeface="Times New Roman" panose="02020603050405020304" pitchFamily="18" charset="0"/>
+              </a:rPr>
+              <a:t>, </a:t>
+            </a:r>
+            <a:r>
+              <a:rPr lang="pt-BR" sz="1800" dirty="0" err="1">
+                <a:solidFill>
+                  <a:srgbClr val="444444"/>
+                </a:solidFill>
+                <a:effectLst/>
+                <a:latin typeface="Open Sans" panose="020B0606030504020204" pitchFamily="34" charset="0"/>
+                <a:ea typeface="Times New Roman" panose="02020603050405020304" pitchFamily="18" charset="0"/>
+              </a:rPr>
+              <a:t>Firebird</a:t>
+            </a:r>
+            <a:r>
+              <a:rPr lang="pt-BR" sz="1800" dirty="0">
+                <a:solidFill>
+                  <a:srgbClr val="444444"/>
+                </a:solidFill>
+                <a:effectLst/>
+                <a:latin typeface="Open Sans" panose="020B0606030504020204" pitchFamily="34" charset="0"/>
+                <a:ea typeface="Times New Roman" panose="02020603050405020304" pitchFamily="18" charset="0"/>
+              </a:rPr>
+              <a:t>, PostgreSQL);</a:t>
+            </a:r>
+          </a:p>
+          <a:p>
+            <a:pPr algn="just">
+              <a:spcBef>
+                <a:spcPts val="1125"/>
+              </a:spcBef>
+              <a:spcAft>
+                <a:spcPts val="1125"/>
+              </a:spcAft>
+            </a:pPr>
+            <a:r>
+              <a:rPr lang="pt-BR" sz="1800" dirty="0">
+                <a:solidFill>
+                  <a:srgbClr val="444444"/>
+                </a:solidFill>
+                <a:effectLst/>
+                <a:latin typeface="Open Sans" panose="020B0606030504020204" pitchFamily="34" charset="0"/>
+                <a:ea typeface="Times New Roman" panose="02020603050405020304" pitchFamily="18" charset="0"/>
+              </a:rPr>
+              <a:t>Linguagem de programação: Python</a:t>
+            </a:r>
+          </a:p>
+          <a:p>
+            <a:pPr algn="just">
+              <a:spcBef>
+                <a:spcPts val="1125"/>
+              </a:spcBef>
+              <a:spcAft>
+                <a:spcPts val="1125"/>
+              </a:spcAft>
+            </a:pPr>
+            <a:r>
+              <a:rPr lang="pt-BR" sz="1800" dirty="0">
+                <a:solidFill>
+                  <a:srgbClr val="444444"/>
+                </a:solidFill>
+                <a:effectLst/>
+                <a:latin typeface="Open Sans" panose="020B0606030504020204" pitchFamily="34" charset="0"/>
+                <a:ea typeface="Times New Roman" panose="02020603050405020304" pitchFamily="18" charset="0"/>
+              </a:rPr>
+              <a:t>IDE: </a:t>
+            </a:r>
+            <a:r>
+              <a:rPr lang="pt-BR" sz="1800" dirty="0" err="1">
+                <a:solidFill>
+                  <a:srgbClr val="444444"/>
+                </a:solidFill>
+                <a:effectLst/>
+                <a:latin typeface="Open Sans" panose="020B0606030504020204" pitchFamily="34" charset="0"/>
+                <a:ea typeface="Times New Roman" panose="02020603050405020304" pitchFamily="18" charset="0"/>
+              </a:rPr>
+              <a:t>PyCharm</a:t>
+            </a:r>
+            <a:r>
+              <a:rPr lang="pt-BR" sz="1800" dirty="0">
+                <a:solidFill>
+                  <a:srgbClr val="444444"/>
+                </a:solidFill>
+                <a:effectLst/>
+                <a:latin typeface="Open Sans" panose="020B0606030504020204" pitchFamily="34" charset="0"/>
+                <a:ea typeface="Times New Roman" panose="02020603050405020304" pitchFamily="18" charset="0"/>
+              </a:rPr>
+              <a:t> CE</a:t>
+            </a:r>
+          </a:p>
+        </p:txBody>
+      </p:sp>
+      <p:sp>
+        <p:nvSpPr>
+          <p:cNvPr id="6" name="Espaço Reservado para Número de Slide 5">
+            <a:extLst>
+              <a:ext uri="{FF2B5EF4-FFF2-40B4-BE49-F238E27FC236}">
+                <a16:creationId xmlns:a16="http://schemas.microsoft.com/office/drawing/2014/main" id="{08B0DBC5-EA0D-F917-B4DD-EF346E432987}"/>
+              </a:ext>
+            </a:extLst>
+          </p:cNvPr>
+          <p:cNvSpPr>
+            <a:spLocks noGrp="1"/>
+          </p:cNvSpPr>
+          <p:nvPr>
+            <p:ph type="sldNum" sz="quarter" idx="12"/>
+          </p:nvPr>
+        </p:nvSpPr>
+        <p:spPr/>
+        <p:txBody>
+          <a:bodyPr/>
+          <a:lstStyle/>
+          <a:p>
+            <a:fld id="{C68AC1EC-23E2-4F0E-A5A4-674EC8DB954E}" type="slidenum">
+              <a:rPr lang="en-US" smtClean="0"/>
+              <a:t>22</a:t>
+            </a:fld>
+            <a:endParaRPr lang="en-US"/>
+          </a:p>
+        </p:txBody>
+      </p:sp>
+    </p:spTree>
+    <p:extLst>
+      <p:ext uri="{BB962C8B-B14F-4D97-AF65-F5344CB8AC3E}">
+        <p14:creationId xmlns:p14="http://schemas.microsoft.com/office/powerpoint/2010/main" val="1045391905"/>
+      </p:ext>
+    </p:extLst>
+  </p:cSld>
+  <p:clrMapOvr>
+    <a:masterClrMapping/>
+  </p:clrMapOvr>
+</p:sld>
+</file>
+
+<file path=ppt/slides/slide23.xml><?xml version="1.0" encoding="utf-8"?>
+<p:sld xmlns:a="http://schemas.openxmlformats.org/drawingml/2006/main" xmlns:r="http://schemas.openxmlformats.org/officeDocument/2006/relationships" xmlns:p="http://schemas.openxmlformats.org/presentationml/2006/main">
+  <p:cSld>
+    <p:spTree>
+      <p:nvGrpSpPr>
+        <p:cNvPr id="1" name=""/>
+        <p:cNvGrpSpPr/>
+        <p:nvPr/>
+      </p:nvGrpSpPr>
+      <p:grpSpPr>
+        <a:xfrm>
+          <a:off x="0" y="0"/>
+          <a:ext cx="0" cy="0"/>
+          <a:chOff x="0" y="0"/>
+          <a:chExt cx="0" cy="0"/>
+        </a:xfrm>
+      </p:grpSpPr>
+      <p:sp>
+        <p:nvSpPr>
+          <p:cNvPr id="2" name="Título 1">
+            <a:extLst>
+              <a:ext uri="{FF2B5EF4-FFF2-40B4-BE49-F238E27FC236}">
+                <a16:creationId xmlns:a16="http://schemas.microsoft.com/office/drawing/2014/main" id="{67505AC7-381E-215D-DE89-A29A52A396C3}"/>
+              </a:ext>
+            </a:extLst>
+          </p:cNvPr>
+          <p:cNvSpPr>
+            <a:spLocks noGrp="1"/>
+          </p:cNvSpPr>
+          <p:nvPr>
+            <p:ph type="title"/>
+          </p:nvPr>
+        </p:nvSpPr>
+        <p:spPr/>
+        <p:txBody>
+          <a:bodyPr/>
+          <a:lstStyle/>
+          <a:p>
+            <a:r>
+              <a:rPr lang="pt-BR" b="1" dirty="0"/>
               <a:t>MELHORIAS PARA O PROXIMO MODULO</a:t>
             </a:r>
             <a:br>
@@ -11319,7 +12143,7 @@
           <a:p>
             <a:fld id="{C68AC1EC-23E2-4F0E-A5A4-674EC8DB954E}" type="slidenum">
               <a:rPr lang="en-US" smtClean="0"/>
-              <a:t>22</a:t>
+              <a:t>23</a:t>
             </a:fld>
             <a:endParaRPr lang="en-US"/>
           </a:p>
@@ -11391,7 +12215,7 @@
 </p:sld>
 </file>
 
-<file path=ppt/slides/slide23.xml><?xml version="1.0" encoding="utf-8"?>
+<file path=ppt/slides/slide24.xml><?xml version="1.0" encoding="utf-8"?>
 <p:sld xmlns:a="http://schemas.openxmlformats.org/drawingml/2006/main" xmlns:r="http://schemas.openxmlformats.org/officeDocument/2006/relationships" xmlns:p="http://schemas.openxmlformats.org/presentationml/2006/main">
   <p:cSld>
     <p:bg>
@@ -12608,88 +13432,6 @@
       </p:pic>
       <p:sp>
         <p:nvSpPr>
-          <p:cNvPr id="2055" name="Date Placeholder 4">
-            <a:extLst>
-              <a:ext uri="{FF2B5EF4-FFF2-40B4-BE49-F238E27FC236}">
-                <a16:creationId xmlns:a16="http://schemas.microsoft.com/office/drawing/2014/main" id="{E234CE6E-AEE4-EBC1-5AF5-33207EF84907}"/>
-              </a:ext>
-            </a:extLst>
-          </p:cNvPr>
-          <p:cNvSpPr>
-            <a:spLocks noGrp="1"/>
-          </p:cNvSpPr>
-          <p:nvPr>
-            <p:ph type="dt" sz="half" idx="10"/>
-          </p:nvPr>
-        </p:nvSpPr>
-        <p:spPr>
-          <a:xfrm>
-            <a:off x="877824" y="6356350"/>
-            <a:ext cx="2743200" cy="365125"/>
-          </a:xfrm>
-        </p:spPr>
-        <p:txBody>
-          <a:bodyPr/>
-          <a:lstStyle/>
-          <a:p>
-            <a:pPr>
-              <a:spcAft>
-                <a:spcPts val="600"/>
-              </a:spcAft>
-            </a:pPr>
-            <a:fld id="{0B283B5C-2325-42FF-AF91-C1451D9D66CC}" type="datetime1">
-              <a:rPr lang="en-US" smtClean="0"/>
-              <a:pPr>
-                <a:spcAft>
-                  <a:spcPts val="600"/>
-                </a:spcAft>
-              </a:pPr>
-              <a:t>12/11/23</a:t>
-            </a:fld>
-            <a:endParaRPr lang="en-US"/>
-          </a:p>
-        </p:txBody>
-      </p:sp>
-      <p:sp>
-        <p:nvSpPr>
-          <p:cNvPr id="2057" name="Footer Placeholder 5">
-            <a:extLst>
-              <a:ext uri="{FF2B5EF4-FFF2-40B4-BE49-F238E27FC236}">
-                <a16:creationId xmlns:a16="http://schemas.microsoft.com/office/drawing/2014/main" id="{83FE5ABA-7C94-FEE7-6CCD-0EAE0D9DEACB}"/>
-              </a:ext>
-            </a:extLst>
-          </p:cNvPr>
-          <p:cNvSpPr>
-            <a:spLocks noGrp="1"/>
-          </p:cNvSpPr>
-          <p:nvPr>
-            <p:ph type="ftr" sz="quarter" idx="11"/>
-          </p:nvPr>
-        </p:nvSpPr>
-        <p:spPr>
-          <a:xfrm>
-            <a:off x="7132320" y="6356350"/>
-            <a:ext cx="4297680" cy="365125"/>
-          </a:xfrm>
-        </p:spPr>
-        <p:txBody>
-          <a:bodyPr/>
-          <a:lstStyle/>
-          <a:p>
-            <a:pPr>
-              <a:spcAft>
-                <a:spcPts val="600"/>
-              </a:spcAft>
-            </a:pPr>
-            <a:r>
-              <a:rPr lang="en-US"/>
-              <a:t>Sample Footer Text</a:t>
-            </a:r>
-          </a:p>
-        </p:txBody>
-      </p:sp>
-      <p:sp>
-        <p:nvSpPr>
           <p:cNvPr id="6" name="Espaço Reservado para Número de Slide 5">
             <a:extLst>
               <a:ext uri="{FF2B5EF4-FFF2-40B4-BE49-F238E27FC236}">
@@ -13303,7 +14045,7 @@
         <p:spPr>
           <a:xfrm>
             <a:off x="839788" y="820881"/>
-            <a:ext cx="3639312" cy="2062595"/>
+            <a:ext cx="3871912" cy="2062595"/>
           </a:xfrm>
         </p:spPr>
         <p:txBody>
@@ -13312,10 +14054,9 @@
           </a:bodyPr>
           <a:lstStyle/>
           <a:p>
-            <a:pPr algn="ctr"/>
             <a:r>
               <a:rPr lang="pt-BR" b="1" dirty="0"/>
-              <a:t>Diagrama do banco de dados</a:t>
+              <a:t>Diagrama Classe</a:t>
             </a:r>
             <a:br>
               <a:rPr lang="pt-BR" dirty="0">
@@ -13326,56 +14067,25 @@
           </a:p>
         </p:txBody>
       </p:sp>
-      <p:pic>
-        <p:nvPicPr>
-          <p:cNvPr id="7" name="Imagem 6" descr="Diagrama&#10;&#10;Descrição gerada automaticamente">
-            <a:extLst>
-              <a:ext uri="{FF2B5EF4-FFF2-40B4-BE49-F238E27FC236}">
-                <a16:creationId xmlns:a16="http://schemas.microsoft.com/office/drawing/2014/main" id="{AB609E3F-829C-228F-D62E-A18EF07CFEED}"/>
-              </a:ext>
-            </a:extLst>
-          </p:cNvPr>
-          <p:cNvPicPr>
-            <a:picLocks noChangeAspect="1"/>
-          </p:cNvPicPr>
-          <p:nvPr/>
-        </p:nvPicPr>
-        <p:blipFill>
-          <a:blip r:embed="rId2"/>
-          <a:stretch>
-            <a:fillRect/>
-          </a:stretch>
-        </p:blipFill>
+      <p:sp>
+        <p:nvSpPr>
+          <p:cNvPr id="3" name="Espaço Reservado para Conteúdo 2">
+            <a:extLst>
+              <a:ext uri="{FF2B5EF4-FFF2-40B4-BE49-F238E27FC236}">
+                <a16:creationId xmlns:a16="http://schemas.microsoft.com/office/drawing/2014/main" id="{B2C2D533-A922-CE6A-C372-7A2861219EAC}"/>
+              </a:ext>
+            </a:extLst>
+          </p:cNvPr>
+          <p:cNvSpPr>
+            <a:spLocks noGrp="1"/>
+          </p:cNvSpPr>
+          <p:nvPr>
+            <p:ph type="body" sz="half" idx="2"/>
+          </p:nvPr>
+        </p:nvSpPr>
         <p:spPr>
           <a:xfrm>
-            <a:off x="4711700" y="661265"/>
-            <a:ext cx="7048500" cy="5535469"/>
-          </a:xfrm>
-          <a:prstGeom prst="rect">
-            <a:avLst/>
-          </a:prstGeom>
-          <a:noFill/>
-        </p:spPr>
-      </p:pic>
-      <p:sp>
-        <p:nvSpPr>
-          <p:cNvPr id="3" name="Espaço Reservado para Conteúdo 2">
-            <a:extLst>
-              <a:ext uri="{FF2B5EF4-FFF2-40B4-BE49-F238E27FC236}">
-                <a16:creationId xmlns:a16="http://schemas.microsoft.com/office/drawing/2014/main" id="{B2C2D533-A922-CE6A-C372-7A2861219EAC}"/>
-              </a:ext>
-            </a:extLst>
-          </p:cNvPr>
-          <p:cNvSpPr>
-            <a:spLocks noGrp="1"/>
-          </p:cNvSpPr>
-          <p:nvPr>
-            <p:ph type="body" sz="half" idx="2"/>
-          </p:nvPr>
-        </p:nvSpPr>
-        <p:spPr>
-          <a:xfrm>
-            <a:off x="837499" y="2260601"/>
+            <a:off x="291399" y="1759526"/>
             <a:ext cx="3643889" cy="2247900"/>
           </a:xfrm>
         </p:spPr>
@@ -13396,15 +14106,12 @@
               <a:rPr lang="pt-BR" sz="1500" dirty="0">
                 <a:effectLst/>
               </a:rPr>
-              <a:t>O objetivo é a modelagem do banco de dados sua entidade </a:t>
+              <a:t>O objetivo  do diagrama de classe é modelar os objetos que compõe o sistema</a:t>
             </a:r>
             <a:r>
               <a:rPr lang="pt-BR" sz="1500" dirty="0"/>
-              <a:t>de relacionamento em termos de regras logicas e de negócio.</a:t>
-            </a:r>
-            <a:endParaRPr lang="pt-BR" sz="1500" dirty="0">
-              <a:effectLst/>
-            </a:endParaRPr>
+              <a:t>.</a:t>
+            </a:r>
           </a:p>
           <a:p>
             <a:pPr marL="285750" indent="-285750">
@@ -13418,15 +14125,8 @@
               <a:rPr lang="pt-BR" sz="1500" dirty="0">
                 <a:effectLst/>
               </a:rPr>
-              <a:t>Neste </a:t>
-            </a:r>
-            <a:r>
-              <a:rPr lang="pt-BR" sz="1500" dirty="0"/>
-              <a:t>fluxo percebemos o esquema do banco onde as entidades se conectam.</a:t>
-            </a:r>
-            <a:endParaRPr lang="pt-BR" sz="1500" dirty="0">
-              <a:effectLst/>
-            </a:endParaRPr>
+              <a:t>Nele está contido as Classes, atributos e métodos que serão utilizados no sistema.</a:t>
+            </a:r>
           </a:p>
           <a:p>
             <a:pPr>
@@ -13435,58 +14135,6 @@
               </a:lnSpc>
             </a:pPr>
             <a:endParaRPr lang="pt-BR" sz="1500" dirty="0"/>
-          </a:p>
-        </p:txBody>
-      </p:sp>
-      <p:sp>
-        <p:nvSpPr>
-          <p:cNvPr id="4" name="Espaço Reservado para Data 3">
-            <a:extLst>
-              <a:ext uri="{FF2B5EF4-FFF2-40B4-BE49-F238E27FC236}">
-                <a16:creationId xmlns:a16="http://schemas.microsoft.com/office/drawing/2014/main" id="{3F5C8E30-2A2A-BB5C-0C6E-E2D2377418D6}"/>
-              </a:ext>
-            </a:extLst>
-          </p:cNvPr>
-          <p:cNvSpPr>
-            <a:spLocks noGrp="1"/>
-          </p:cNvSpPr>
-          <p:nvPr>
-            <p:ph type="dt" sz="half" idx="10"/>
-          </p:nvPr>
-        </p:nvSpPr>
-        <p:spPr>
-          <a:xfrm>
-            <a:off x="4596638" y="6372224"/>
-            <a:ext cx="3639312" cy="365125"/>
-          </a:xfrm>
-        </p:spPr>
-        <p:txBody>
-          <a:bodyPr anchor="ctr">
-            <a:normAutofit/>
-          </a:bodyPr>
-          <a:lstStyle/>
-          <a:p>
-            <a:pPr>
-              <a:spcAft>
-                <a:spcPts val="600"/>
-              </a:spcAft>
-            </a:pPr>
-            <a:r>
-              <a:rPr lang="en-US" b="1" dirty="0" err="1"/>
-              <a:t>Figura</a:t>
-            </a:r>
-            <a:r>
-              <a:rPr lang="en-US" b="1" dirty="0"/>
-              <a:t> 1- </a:t>
-            </a:r>
-            <a:r>
-              <a:rPr lang="en-US" b="1" dirty="0" err="1"/>
-              <a:t>modelo</a:t>
-            </a:r>
-            <a:r>
-              <a:rPr lang="en-US" b="1" dirty="0"/>
-              <a:t> de banco de dados</a:t>
-            </a:r>
           </a:p>
         </p:txBody>
       </p:sp>
@@ -13536,10 +14184,100 @@
           </a:p>
         </p:txBody>
       </p:sp>
+      <p:sp>
+        <p:nvSpPr>
+          <p:cNvPr id="8" name="Espaço Reservado para Data 3">
+            <a:extLst>
+              <a:ext uri="{FF2B5EF4-FFF2-40B4-BE49-F238E27FC236}">
+                <a16:creationId xmlns:a16="http://schemas.microsoft.com/office/drawing/2014/main" id="{27F4C552-BEE2-CAE3-F0C1-29759126BAA2}"/>
+              </a:ext>
+            </a:extLst>
+          </p:cNvPr>
+          <p:cNvSpPr>
+            <a:spLocks noGrp="1"/>
+          </p:cNvSpPr>
+          <p:nvPr>
+            <p:ph type="dt" sz="half" idx="10"/>
+          </p:nvPr>
+        </p:nvSpPr>
+        <p:spPr>
+          <a:xfrm>
+            <a:off x="4356100" y="6453188"/>
+            <a:ext cx="4229862" cy="231776"/>
+          </a:xfrm>
+        </p:spPr>
+        <p:txBody>
+          <a:bodyPr anchor="ctr">
+            <a:normAutofit/>
+          </a:bodyPr>
+          <a:lstStyle/>
+          <a:p>
+            <a:pPr>
+              <a:spcAft>
+                <a:spcPts val="600"/>
+              </a:spcAft>
+            </a:pPr>
+            <a:r>
+              <a:rPr lang="en-US" b="1" dirty="0" err="1"/>
+              <a:t>Figura</a:t>
+            </a:r>
+            <a:r>
+              <a:rPr lang="en-US" b="1" dirty="0"/>
+              <a:t> 1- </a:t>
+            </a:r>
+            <a:r>
+              <a:rPr lang="en-US" b="1" dirty="0" err="1"/>
+              <a:t>modelo</a:t>
+            </a:r>
+            <a:r>
+              <a:rPr lang="en-US" b="1" dirty="0"/>
+              <a:t> do </a:t>
+            </a:r>
+            <a:r>
+              <a:rPr lang="en-US" b="1" dirty="0" err="1"/>
+              <a:t>diagrama</a:t>
+            </a:r>
+            <a:r>
+              <a:rPr lang="en-US" b="1" dirty="0"/>
+              <a:t> de classes</a:t>
+            </a:r>
+          </a:p>
+        </p:txBody>
+      </p:sp>
+      <p:pic>
+        <p:nvPicPr>
+          <p:cNvPr id="10" name="Imagem 9" descr="Diagrama, Esquemático&#10;&#10;Descrição gerada automaticamente">
+            <a:extLst>
+              <a:ext uri="{FF2B5EF4-FFF2-40B4-BE49-F238E27FC236}">
+                <a16:creationId xmlns:a16="http://schemas.microsoft.com/office/drawing/2014/main" id="{D59A147A-37F2-8B9B-BF50-DB06B051CE03}"/>
+              </a:ext>
+            </a:extLst>
+          </p:cNvPr>
+          <p:cNvPicPr>
+            <a:picLocks noChangeAspect="1"/>
+          </p:cNvPicPr>
+          <p:nvPr/>
+        </p:nvPicPr>
+        <p:blipFill>
+          <a:blip r:embed="rId2"/>
+          <a:stretch>
+            <a:fillRect/>
+          </a:stretch>
+        </p:blipFill>
+        <p:spPr>
+          <a:xfrm>
+            <a:off x="4356100" y="288924"/>
+            <a:ext cx="7544501" cy="6067426"/>
+          </a:xfrm>
+          <a:prstGeom prst="rect">
+            <a:avLst/>
+          </a:prstGeom>
+        </p:spPr>
+      </p:pic>
     </p:spTree>
     <p:extLst>
       <p:ext uri="{BB962C8B-B14F-4D97-AF65-F5344CB8AC3E}">
-        <p14:creationId xmlns:p14="http://schemas.microsoft.com/office/powerpoint/2010/main" val="3114609820"/>
+        <p14:creationId xmlns:p14="http://schemas.microsoft.com/office/powerpoint/2010/main" val="3831051134"/>
       </p:ext>
     </p:extLst>
   </p:cSld>
@@ -13571,6 +14309,288 @@
           <p:cNvPr id="2" name="Título 1">
             <a:extLst>
               <a:ext uri="{FF2B5EF4-FFF2-40B4-BE49-F238E27FC236}">
+                <a16:creationId xmlns:a16="http://schemas.microsoft.com/office/drawing/2014/main" id="{8C753BDE-13E8-CB66-E6AD-F44CEA8B6A90}"/>
+              </a:ext>
+            </a:extLst>
+          </p:cNvPr>
+          <p:cNvSpPr>
+            <a:spLocks noGrp="1"/>
+          </p:cNvSpPr>
+          <p:nvPr>
+            <p:ph type="title"/>
+          </p:nvPr>
+        </p:nvSpPr>
+        <p:spPr>
+          <a:xfrm>
+            <a:off x="839788" y="820881"/>
+            <a:ext cx="3639312" cy="2062595"/>
+          </a:xfrm>
+        </p:spPr>
+        <p:txBody>
+          <a:bodyPr anchor="t">
+            <a:normAutofit/>
+          </a:bodyPr>
+          <a:lstStyle/>
+          <a:p>
+            <a:pPr algn="ctr"/>
+            <a:r>
+              <a:rPr lang="pt-BR" b="1" dirty="0"/>
+              <a:t>Diagrama do banco de dados</a:t>
+            </a:r>
+            <a:br>
+              <a:rPr lang="pt-BR" dirty="0">
+                <a:effectLst/>
+              </a:rPr>
+            </a:br>
+            <a:endParaRPr lang="pt-BR" dirty="0"/>
+          </a:p>
+        </p:txBody>
+      </p:sp>
+      <p:pic>
+        <p:nvPicPr>
+          <p:cNvPr id="7" name="Imagem 6" descr="Diagrama&#10;&#10;Descrição gerada automaticamente">
+            <a:extLst>
+              <a:ext uri="{FF2B5EF4-FFF2-40B4-BE49-F238E27FC236}">
+                <a16:creationId xmlns:a16="http://schemas.microsoft.com/office/drawing/2014/main" id="{AB609E3F-829C-228F-D62E-A18EF07CFEED}"/>
+              </a:ext>
+            </a:extLst>
+          </p:cNvPr>
+          <p:cNvPicPr>
+            <a:picLocks noChangeAspect="1"/>
+          </p:cNvPicPr>
+          <p:nvPr/>
+        </p:nvPicPr>
+        <p:blipFill>
+          <a:blip r:embed="rId2"/>
+          <a:stretch>
+            <a:fillRect/>
+          </a:stretch>
+        </p:blipFill>
+        <p:spPr>
+          <a:xfrm>
+            <a:off x="4711700" y="279400"/>
+            <a:ext cx="7137400" cy="6092823"/>
+          </a:xfrm>
+          <a:prstGeom prst="rect">
+            <a:avLst/>
+          </a:prstGeom>
+          <a:noFill/>
+        </p:spPr>
+      </p:pic>
+      <p:sp>
+        <p:nvSpPr>
+          <p:cNvPr id="3" name="Espaço Reservado para Conteúdo 2">
+            <a:extLst>
+              <a:ext uri="{FF2B5EF4-FFF2-40B4-BE49-F238E27FC236}">
+                <a16:creationId xmlns:a16="http://schemas.microsoft.com/office/drawing/2014/main" id="{B2C2D533-A922-CE6A-C372-7A2861219EAC}"/>
+              </a:ext>
+            </a:extLst>
+          </p:cNvPr>
+          <p:cNvSpPr>
+            <a:spLocks noGrp="1"/>
+          </p:cNvSpPr>
+          <p:nvPr>
+            <p:ph type="body" sz="half" idx="2"/>
+          </p:nvPr>
+        </p:nvSpPr>
+        <p:spPr>
+          <a:xfrm>
+            <a:off x="837499" y="2260601"/>
+            <a:ext cx="3643889" cy="2247900"/>
+          </a:xfrm>
+        </p:spPr>
+        <p:txBody>
+          <a:bodyPr anchor="b">
+            <a:normAutofit/>
+          </a:bodyPr>
+          <a:lstStyle/>
+          <a:p>
+            <a:pPr marL="285750" indent="-285750">
+              <a:lnSpc>
+                <a:spcPct val="110000"/>
+              </a:lnSpc>
+              <a:buFont typeface="Arial" panose="020B0604020202020204" pitchFamily="34" charset="0"/>
+              <a:buChar char="•"/>
+            </a:pPr>
+            <a:r>
+              <a:rPr lang="pt-BR" sz="1500" dirty="0">
+                <a:effectLst/>
+              </a:rPr>
+              <a:t>O objetivo é a modelagem do banco de dados sua entidade </a:t>
+            </a:r>
+            <a:r>
+              <a:rPr lang="pt-BR" sz="1500" dirty="0"/>
+              <a:t>de relacionamento em termos de regras logicas e de negócio.</a:t>
+            </a:r>
+            <a:endParaRPr lang="pt-BR" sz="1500" dirty="0">
+              <a:effectLst/>
+            </a:endParaRPr>
+          </a:p>
+          <a:p>
+            <a:pPr marL="285750" indent="-285750">
+              <a:lnSpc>
+                <a:spcPct val="110000"/>
+              </a:lnSpc>
+              <a:buFont typeface="Arial" panose="020B0604020202020204" pitchFamily="34" charset="0"/>
+              <a:buChar char="•"/>
+            </a:pPr>
+            <a:r>
+              <a:rPr lang="pt-BR" sz="1500" dirty="0">
+                <a:effectLst/>
+              </a:rPr>
+              <a:t>Neste </a:t>
+            </a:r>
+            <a:r>
+              <a:rPr lang="pt-BR" sz="1500" dirty="0"/>
+              <a:t>fluxo percebemos o esquema do banco onde as entidades se conectam.</a:t>
+            </a:r>
+            <a:endParaRPr lang="pt-BR" sz="1500" dirty="0">
+              <a:effectLst/>
+            </a:endParaRPr>
+          </a:p>
+          <a:p>
+            <a:pPr>
+              <a:lnSpc>
+                <a:spcPct val="110000"/>
+              </a:lnSpc>
+            </a:pPr>
+            <a:endParaRPr lang="pt-BR" sz="1500" dirty="0"/>
+          </a:p>
+        </p:txBody>
+      </p:sp>
+      <p:sp>
+        <p:nvSpPr>
+          <p:cNvPr id="4" name="Espaço Reservado para Data 3">
+            <a:extLst>
+              <a:ext uri="{FF2B5EF4-FFF2-40B4-BE49-F238E27FC236}">
+                <a16:creationId xmlns:a16="http://schemas.microsoft.com/office/drawing/2014/main" id="{3F5C8E30-2A2A-BB5C-0C6E-E2D2377418D6}"/>
+              </a:ext>
+            </a:extLst>
+          </p:cNvPr>
+          <p:cNvSpPr>
+            <a:spLocks noGrp="1"/>
+          </p:cNvSpPr>
+          <p:nvPr>
+            <p:ph type="dt" sz="half" idx="10"/>
+          </p:nvPr>
+        </p:nvSpPr>
+        <p:spPr>
+          <a:xfrm>
+            <a:off x="4596638" y="6372224"/>
+            <a:ext cx="3639312" cy="365125"/>
+          </a:xfrm>
+        </p:spPr>
+        <p:txBody>
+          <a:bodyPr anchor="ctr">
+            <a:normAutofit/>
+          </a:bodyPr>
+          <a:lstStyle/>
+          <a:p>
+            <a:pPr>
+              <a:spcAft>
+                <a:spcPts val="600"/>
+              </a:spcAft>
+            </a:pPr>
+            <a:r>
+              <a:rPr lang="en-US" b="1" dirty="0" err="1"/>
+              <a:t>Figura</a:t>
+            </a:r>
+            <a:r>
+              <a:rPr lang="en-US" b="1" dirty="0"/>
+              <a:t> 1- </a:t>
+            </a:r>
+            <a:r>
+              <a:rPr lang="en-US" b="1" dirty="0" err="1"/>
+              <a:t>modelo</a:t>
+            </a:r>
+            <a:r>
+              <a:rPr lang="en-US" b="1" dirty="0"/>
+              <a:t> de banco de dados</a:t>
+            </a:r>
+          </a:p>
+        </p:txBody>
+      </p:sp>
+      <p:sp>
+        <p:nvSpPr>
+          <p:cNvPr id="6" name="Espaço Reservado para Número de Slide 5">
+            <a:extLst>
+              <a:ext uri="{FF2B5EF4-FFF2-40B4-BE49-F238E27FC236}">
+                <a16:creationId xmlns:a16="http://schemas.microsoft.com/office/drawing/2014/main" id="{16B9C1CF-68E9-91DC-E1E5-88E851FE5DD5}"/>
+              </a:ext>
+            </a:extLst>
+          </p:cNvPr>
+          <p:cNvSpPr>
+            <a:spLocks noGrp="1"/>
+          </p:cNvSpPr>
+          <p:nvPr>
+            <p:ph type="sldNum" sz="quarter" idx="12"/>
+          </p:nvPr>
+        </p:nvSpPr>
+        <p:spPr>
+          <a:xfrm>
+            <a:off x="11429999" y="6356350"/>
+            <a:ext cx="521207" cy="365125"/>
+          </a:xfrm>
+        </p:spPr>
+        <p:txBody>
+          <a:bodyPr anchor="ctr">
+            <a:normAutofit/>
+          </a:bodyPr>
+          <a:lstStyle/>
+          <a:p>
+            <a:pPr>
+              <a:spcAft>
+                <a:spcPts val="600"/>
+              </a:spcAft>
+            </a:pPr>
+            <a:fld id="{C68AC1EC-23E2-4F0E-A5A4-674EC8DB954E}" type="slidenum">
+              <a:rPr lang="en-US" smtClean="0"/>
+              <a:pPr>
+                <a:spcAft>
+                  <a:spcPts val="600"/>
+                </a:spcAft>
+              </a:pPr>
+              <a:t>8</a:t>
+            </a:fld>
+            <a:endParaRPr lang="en-US"/>
+          </a:p>
+        </p:txBody>
+      </p:sp>
+    </p:spTree>
+    <p:extLst>
+      <p:ext uri="{BB962C8B-B14F-4D97-AF65-F5344CB8AC3E}">
+        <p14:creationId xmlns:p14="http://schemas.microsoft.com/office/powerpoint/2010/main" val="3114609820"/>
+      </p:ext>
+    </p:extLst>
+  </p:cSld>
+  <p:clrMapOvr>
+    <a:masterClrMapping/>
+  </p:clrMapOvr>
+</p:sld>
+</file>
+
+<file path=ppt/slides/slide9.xml><?xml version="1.0" encoding="utf-8"?>
+<p:sld xmlns:a="http://schemas.openxmlformats.org/drawingml/2006/main" xmlns:r="http://schemas.openxmlformats.org/officeDocument/2006/relationships" xmlns:p="http://schemas.openxmlformats.org/presentationml/2006/main">
+  <p:cSld>
+    <p:spTree>
+      <p:nvGrpSpPr>
+        <p:cNvPr id="1" name=""/>
+        <p:cNvGrpSpPr/>
+        <p:nvPr/>
+      </p:nvGrpSpPr>
+      <p:grpSpPr>
+        <a:xfrm>
+          <a:off x="0" y="0"/>
+          <a:ext cx="0" cy="0"/>
+          <a:chOff x="0" y="0"/>
+          <a:chExt cx="0" cy="0"/>
+        </a:xfrm>
+      </p:grpSpPr>
+      <p:sp>
+        <p:nvSpPr>
+          <p:cNvPr id="2" name="Título 1">
+            <a:extLst>
+              <a:ext uri="{FF2B5EF4-FFF2-40B4-BE49-F238E27FC236}">
                 <a16:creationId xmlns:a16="http://schemas.microsoft.com/office/drawing/2014/main" id="{67505AC7-381E-215D-DE89-A29A52A396C3}"/>
               </a:ext>
             </a:extLst>
@@ -13772,7 +14792,7 @@
           <a:p>
             <a:fld id="{C68AC1EC-23E2-4F0E-A5A4-674EC8DB954E}" type="slidenum">
               <a:rPr lang="en-US" smtClean="0"/>
-              <a:t>8</a:t>
+              <a:t>9</a:t>
             </a:fld>
             <a:endParaRPr lang="en-US" dirty="0"/>
           </a:p>
@@ -13974,963 +14994,6 @@
     <p:extLst>
       <p:ext uri="{BB962C8B-B14F-4D97-AF65-F5344CB8AC3E}">
         <p14:creationId xmlns:p14="http://schemas.microsoft.com/office/powerpoint/2010/main" val="1884196417"/>
-      </p:ext>
-    </p:extLst>
-  </p:cSld>
-  <p:clrMapOvr>
-    <a:masterClrMapping/>
-  </p:clrMapOvr>
-</p:sld>
-</file>
-
-<file path=ppt/slides/slide9.xml><?xml version="1.0" encoding="utf-8"?>
-<p:sld xmlns:a="http://schemas.openxmlformats.org/drawingml/2006/main" xmlns:r="http://schemas.openxmlformats.org/officeDocument/2006/relationships" xmlns:p="http://schemas.openxmlformats.org/presentationml/2006/main">
-  <p:cSld>
-    <p:spTree>
-      <p:nvGrpSpPr>
-        <p:cNvPr id="1" name=""/>
-        <p:cNvGrpSpPr/>
-        <p:nvPr/>
-      </p:nvGrpSpPr>
-      <p:grpSpPr>
-        <a:xfrm>
-          <a:off x="0" y="0"/>
-          <a:ext cx="0" cy="0"/>
-          <a:chOff x="0" y="0"/>
-          <a:chExt cx="0" cy="0"/>
-        </a:xfrm>
-      </p:grpSpPr>
-      <p:sp>
-        <p:nvSpPr>
-          <p:cNvPr id="2" name="Título 1">
-            <a:extLst>
-              <a:ext uri="{FF2B5EF4-FFF2-40B4-BE49-F238E27FC236}">
-                <a16:creationId xmlns:a16="http://schemas.microsoft.com/office/drawing/2014/main" id="{67505AC7-381E-215D-DE89-A29A52A396C3}"/>
-              </a:ext>
-            </a:extLst>
-          </p:cNvPr>
-          <p:cNvSpPr>
-            <a:spLocks noGrp="1"/>
-          </p:cNvSpPr>
-          <p:nvPr>
-            <p:ph type="title"/>
-          </p:nvPr>
-        </p:nvSpPr>
-        <p:spPr/>
-        <p:txBody>
-          <a:bodyPr/>
-          <a:lstStyle/>
-          <a:p>
-            <a:r>
-              <a:rPr lang="pt-BR" sz="2800" b="1" dirty="0"/>
-              <a:t>CADASTRO DE USUARIOS</a:t>
-            </a:r>
-            <a:br>
-              <a:rPr lang="pt-BR" sz="1800" dirty="0">
-                <a:effectLst/>
-                <a:latin typeface="Times New Roman" panose="02020603050405020304" pitchFamily="18" charset="0"/>
-                <a:ea typeface="Times New Roman" panose="02020603050405020304" pitchFamily="18" charset="0"/>
-              </a:rPr>
-            </a:br>
-            <a:endParaRPr lang="pt-BR" dirty="0"/>
-          </a:p>
-        </p:txBody>
-      </p:sp>
-      <p:sp>
-        <p:nvSpPr>
-          <p:cNvPr id="3" name="Espaço Reservado para Conteúdo 2">
-            <a:extLst>
-              <a:ext uri="{FF2B5EF4-FFF2-40B4-BE49-F238E27FC236}">
-                <a16:creationId xmlns:a16="http://schemas.microsoft.com/office/drawing/2014/main" id="{42456B08-C54C-1760-7377-187C86252AED}"/>
-              </a:ext>
-            </a:extLst>
-          </p:cNvPr>
-          <p:cNvSpPr>
-            <a:spLocks noGrp="1"/>
-          </p:cNvSpPr>
-          <p:nvPr>
-            <p:ph idx="1"/>
-          </p:nvPr>
-        </p:nvSpPr>
-        <p:spPr>
-          <a:xfrm>
-            <a:off x="877824" y="1659302"/>
-            <a:ext cx="10442448" cy="1265928"/>
-          </a:xfrm>
-        </p:spPr>
-        <p:txBody>
-          <a:bodyPr/>
-          <a:lstStyle/>
-          <a:p>
-            <a:pPr algn="just">
-              <a:lnSpc>
-                <a:spcPct val="100000"/>
-              </a:lnSpc>
-              <a:spcBef>
-                <a:spcPts val="1125"/>
-              </a:spcBef>
-              <a:spcAft>
-                <a:spcPts val="1125"/>
-              </a:spcAft>
-            </a:pPr>
-            <a:r>
-              <a:rPr lang="pt-BR" sz="1800" dirty="0">
-                <a:solidFill>
-                  <a:srgbClr val="444444"/>
-                </a:solidFill>
-                <a:effectLst/>
-                <a:latin typeface="Open Sans" panose="020B0606030504020204" pitchFamily="34" charset="0"/>
-                <a:ea typeface="Times New Roman" panose="02020603050405020304" pitchFamily="18" charset="0"/>
-              </a:rPr>
-              <a:t>Cadastro de Usuários: permite cadastrar novos usuários para acesso ao sistema.</a:t>
-            </a:r>
-          </a:p>
-          <a:p>
-            <a:pPr algn="just">
-              <a:lnSpc>
-                <a:spcPct val="100000"/>
-              </a:lnSpc>
-              <a:spcBef>
-                <a:spcPts val="1125"/>
-              </a:spcBef>
-              <a:spcAft>
-                <a:spcPts val="1125"/>
-              </a:spcAft>
-            </a:pPr>
-            <a:r>
-              <a:rPr lang="pt-BR" sz="1800" dirty="0">
-                <a:solidFill>
-                  <a:srgbClr val="444444"/>
-                </a:solidFill>
-                <a:effectLst/>
-                <a:latin typeface="Open Sans" panose="020B0606030504020204" pitchFamily="34" charset="0"/>
-                <a:ea typeface="Times New Roman" panose="02020603050405020304" pitchFamily="18" charset="0"/>
-              </a:rPr>
-              <a:t>Registra informações básicas para acessar o sistema:</a:t>
-            </a:r>
-          </a:p>
-          <a:p>
-            <a:pPr algn="just">
-              <a:spcBef>
-                <a:spcPts val="1125"/>
-              </a:spcBef>
-              <a:spcAft>
-                <a:spcPts val="1125"/>
-              </a:spcAft>
-            </a:pPr>
-            <a:endParaRPr lang="pt-BR" sz="1800" dirty="0">
-              <a:effectLst/>
-              <a:latin typeface="Times New Roman" panose="02020603050405020304" pitchFamily="18" charset="0"/>
-              <a:ea typeface="Times New Roman" panose="02020603050405020304" pitchFamily="18" charset="0"/>
-            </a:endParaRPr>
-          </a:p>
-          <a:p>
-            <a:endParaRPr lang="pt-BR" dirty="0"/>
-          </a:p>
-        </p:txBody>
-      </p:sp>
-      <p:sp>
-        <p:nvSpPr>
-          <p:cNvPr id="4" name="Espaço Reservado para Data 3">
-            <a:extLst>
-              <a:ext uri="{FF2B5EF4-FFF2-40B4-BE49-F238E27FC236}">
-                <a16:creationId xmlns:a16="http://schemas.microsoft.com/office/drawing/2014/main" id="{3A397401-3F94-58C5-2A84-4B1AF3986A69}"/>
-              </a:ext>
-            </a:extLst>
-          </p:cNvPr>
-          <p:cNvSpPr>
-            <a:spLocks noGrp="1"/>
-          </p:cNvSpPr>
-          <p:nvPr>
-            <p:ph type="dt" sz="half" idx="10"/>
-          </p:nvPr>
-        </p:nvSpPr>
-        <p:spPr>
-          <a:xfrm>
-            <a:off x="871107" y="6312807"/>
-            <a:ext cx="3926179" cy="365125"/>
-          </a:xfrm>
-        </p:spPr>
-        <p:txBody>
-          <a:bodyPr/>
-          <a:lstStyle/>
-          <a:p>
-            <a:r>
-              <a:rPr lang="en-US" b="1" dirty="0"/>
-              <a:t>Figura4 – </a:t>
-            </a:r>
-            <a:r>
-              <a:rPr lang="en-US" b="1" dirty="0" err="1"/>
-              <a:t>tela</a:t>
-            </a:r>
-            <a:r>
-              <a:rPr lang="en-US" b="1" dirty="0"/>
-              <a:t> de </a:t>
-            </a:r>
-            <a:r>
-              <a:rPr lang="en-US" b="1" dirty="0" err="1"/>
-              <a:t>cadastro</a:t>
-            </a:r>
-            <a:r>
-              <a:rPr lang="en-US" b="1" dirty="0"/>
-              <a:t> de </a:t>
-            </a:r>
-            <a:r>
-              <a:rPr lang="en-US" b="1" dirty="0" err="1"/>
-              <a:t>alunos</a:t>
-            </a:r>
-            <a:endParaRPr lang="en-US" b="1" dirty="0"/>
-          </a:p>
-        </p:txBody>
-      </p:sp>
-      <p:sp>
-        <p:nvSpPr>
-          <p:cNvPr id="6" name="Espaço Reservado para Número de Slide 5">
-            <a:extLst>
-              <a:ext uri="{FF2B5EF4-FFF2-40B4-BE49-F238E27FC236}">
-                <a16:creationId xmlns:a16="http://schemas.microsoft.com/office/drawing/2014/main" id="{08B0DBC5-EA0D-F917-B4DD-EF346E432987}"/>
-              </a:ext>
-            </a:extLst>
-          </p:cNvPr>
-          <p:cNvSpPr>
-            <a:spLocks noGrp="1"/>
-          </p:cNvSpPr>
-          <p:nvPr>
-            <p:ph type="sldNum" sz="quarter" idx="12"/>
-          </p:nvPr>
-        </p:nvSpPr>
-        <p:spPr/>
-        <p:txBody>
-          <a:bodyPr/>
-          <a:lstStyle/>
-          <a:p>
-            <a:fld id="{C68AC1EC-23E2-4F0E-A5A4-674EC8DB954E}" type="slidenum">
-              <a:rPr lang="en-US" smtClean="0"/>
-              <a:t>9</a:t>
-            </a:fld>
-            <a:endParaRPr lang="en-US" dirty="0"/>
-          </a:p>
-        </p:txBody>
-      </p:sp>
-      <p:graphicFrame>
-        <p:nvGraphicFramePr>
-          <p:cNvPr id="9" name="Tabela 8">
-            <a:extLst>
-              <a:ext uri="{FF2B5EF4-FFF2-40B4-BE49-F238E27FC236}">
-                <a16:creationId xmlns:a16="http://schemas.microsoft.com/office/drawing/2014/main" id="{DE376607-CE3A-336A-1759-EEDBB639BFBF}"/>
-              </a:ext>
-            </a:extLst>
-          </p:cNvPr>
-          <p:cNvGraphicFramePr>
-            <a:graphicFrameLocks noGrp="1"/>
-          </p:cNvGraphicFramePr>
-          <p:nvPr>
-            <p:extLst>
-              <p:ext uri="{D42A27DB-BD31-4B8C-83A1-F6EECF244321}">
-                <p14:modId xmlns:p14="http://schemas.microsoft.com/office/powerpoint/2010/main" val="3165817392"/>
-              </p:ext>
-            </p:extLst>
-          </p:nvPr>
-        </p:nvGraphicFramePr>
-        <p:xfrm>
-          <a:off x="6824870" y="2611215"/>
-          <a:ext cx="4452511" cy="3679557"/>
-        </p:xfrm>
-        <a:graphic>
-          <a:graphicData uri="http://schemas.openxmlformats.org/drawingml/2006/table">
-            <a:tbl>
-              <a:tblPr>
-                <a:tableStyleId>{5C22544A-7EE6-4342-B048-85BDC9FD1C3A}</a:tableStyleId>
-              </a:tblPr>
-              <a:tblGrid>
-                <a:gridCol w="2067237">
-                  <a:extLst>
-                    <a:ext uri="{9D8B030D-6E8A-4147-A177-3AD203B41FA5}">
-                      <a16:colId xmlns:a16="http://schemas.microsoft.com/office/drawing/2014/main" val="4263610643"/>
-                    </a:ext>
-                  </a:extLst>
-                </a:gridCol>
-                <a:gridCol w="2385274">
-                  <a:extLst>
-                    <a:ext uri="{9D8B030D-6E8A-4147-A177-3AD203B41FA5}">
-                      <a16:colId xmlns:a16="http://schemas.microsoft.com/office/drawing/2014/main" val="232851033"/>
-                    </a:ext>
-                  </a:extLst>
-                </a:gridCol>
-              </a:tblGrid>
-              <a:tr h="328867">
-                <a:tc rowSpan="11">
-                  <a:txBody>
-                    <a:bodyPr/>
-                    <a:lstStyle/>
-                    <a:p>
-                      <a:pPr algn="ctr" fontAlgn="ctr"/>
-                      <a:r>
-                        <a:rPr lang="pt-BR" sz="1600" u="none" strike="noStrike" dirty="0" err="1">
-                          <a:effectLst/>
-                        </a:rPr>
-                        <a:t>tb_usuario</a:t>
-                      </a:r>
-                      <a:endParaRPr lang="pt-BR" sz="1600" b="1" i="0" u="none" strike="noStrike" dirty="0">
-                        <a:solidFill>
-                          <a:srgbClr val="000000"/>
-                        </a:solidFill>
-                        <a:effectLst/>
-                        <a:latin typeface="Calibri" panose="020F0502020204030204" pitchFamily="34" charset="0"/>
-                      </a:endParaRPr>
-                    </a:p>
-                  </a:txBody>
-                  <a:tcPr marL="9525" marR="9525" marT="9525" marB="0" anchor="ctr"/>
-                </a:tc>
-                <a:tc>
-                  <a:txBody>
-                    <a:bodyPr/>
-                    <a:lstStyle/>
-                    <a:p>
-                      <a:pPr algn="l" fontAlgn="b"/>
-                      <a:r>
-                        <a:rPr lang="pt-BR" sz="1600" u="none" strike="noStrike">
-                          <a:effectLst/>
-                        </a:rPr>
-                        <a:t>id</a:t>
-                      </a:r>
-                      <a:endParaRPr lang="pt-BR" sz="1600" b="0" i="0" u="none" strike="noStrike">
-                        <a:solidFill>
-                          <a:srgbClr val="000000"/>
-                        </a:solidFill>
-                        <a:effectLst/>
-                        <a:latin typeface="Calibri" panose="020F0502020204030204" pitchFamily="34" charset="0"/>
-                      </a:endParaRPr>
-                    </a:p>
-                  </a:txBody>
-                  <a:tcPr marL="9525" marR="9525" marT="9525" marB="0" anchor="b"/>
-                </a:tc>
-                <a:extLst>
-                  <a:ext uri="{0D108BD9-81ED-4DB2-BD59-A6C34878D82A}">
-                    <a16:rowId xmlns:a16="http://schemas.microsoft.com/office/drawing/2014/main" val="1963379903"/>
-                  </a:ext>
-                </a:extLst>
-              </a:tr>
-              <a:tr h="335069">
-                <a:tc vMerge="1">
-                  <a:txBody>
-                    <a:bodyPr/>
-                    <a:lstStyle/>
-                    <a:p>
-                      <a:endParaRPr lang="pt-BR"/>
-                    </a:p>
-                  </a:txBody>
-                  <a:tcPr/>
-                </a:tc>
-                <a:tc>
-                  <a:txBody>
-                    <a:bodyPr/>
-                    <a:lstStyle/>
-                    <a:p>
-                      <a:pPr algn="l" fontAlgn="b"/>
-                      <a:r>
-                        <a:rPr lang="pt-BR" sz="1600" u="none" strike="noStrike">
-                          <a:effectLst/>
-                        </a:rPr>
-                        <a:t>matricula</a:t>
-                      </a:r>
-                      <a:endParaRPr lang="pt-BR" sz="1600" b="0" i="0" u="none" strike="noStrike">
-                        <a:solidFill>
-                          <a:srgbClr val="000000"/>
-                        </a:solidFill>
-                        <a:effectLst/>
-                        <a:latin typeface="Calibri" panose="020F0502020204030204" pitchFamily="34" charset="0"/>
-                      </a:endParaRPr>
-                    </a:p>
-                  </a:txBody>
-                  <a:tcPr marL="9525" marR="9525" marT="9525" marB="0" anchor="b"/>
-                </a:tc>
-                <a:extLst>
-                  <a:ext uri="{0D108BD9-81ED-4DB2-BD59-A6C34878D82A}">
-                    <a16:rowId xmlns:a16="http://schemas.microsoft.com/office/drawing/2014/main" val="2756212425"/>
-                  </a:ext>
-                </a:extLst>
-              </a:tr>
-              <a:tr h="335069">
-                <a:tc vMerge="1">
-                  <a:txBody>
-                    <a:bodyPr/>
-                    <a:lstStyle/>
-                    <a:p>
-                      <a:endParaRPr lang="pt-BR"/>
-                    </a:p>
-                  </a:txBody>
-                  <a:tcPr/>
-                </a:tc>
-                <a:tc>
-                  <a:txBody>
-                    <a:bodyPr/>
-                    <a:lstStyle/>
-                    <a:p>
-                      <a:pPr algn="l" fontAlgn="b"/>
-                      <a:r>
-                        <a:rPr lang="pt-BR" sz="1600" u="none" strike="noStrike" err="1">
-                          <a:effectLst/>
-                        </a:rPr>
-                        <a:t>usuario</a:t>
-                      </a:r>
-                      <a:endParaRPr lang="pt-BR" sz="1600" b="0" i="0" u="none" strike="noStrike">
-                        <a:solidFill>
-                          <a:srgbClr val="000000"/>
-                        </a:solidFill>
-                        <a:effectLst/>
-                        <a:latin typeface="Calibri" panose="020F0502020204030204" pitchFamily="34" charset="0"/>
-                      </a:endParaRPr>
-                    </a:p>
-                  </a:txBody>
-                  <a:tcPr marL="9525" marR="9525" marT="9525" marB="0" anchor="b"/>
-                </a:tc>
-                <a:extLst>
-                  <a:ext uri="{0D108BD9-81ED-4DB2-BD59-A6C34878D82A}">
-                    <a16:rowId xmlns:a16="http://schemas.microsoft.com/office/drawing/2014/main" val="3549588028"/>
-                  </a:ext>
-                </a:extLst>
-              </a:tr>
-              <a:tr h="335069">
-                <a:tc vMerge="1">
-                  <a:txBody>
-                    <a:bodyPr/>
-                    <a:lstStyle/>
-                    <a:p>
-                      <a:endParaRPr lang="pt-BR"/>
-                    </a:p>
-                  </a:txBody>
-                  <a:tcPr/>
-                </a:tc>
-                <a:tc>
-                  <a:txBody>
-                    <a:bodyPr/>
-                    <a:lstStyle/>
-                    <a:p>
-                      <a:pPr algn="l" fontAlgn="b"/>
-                      <a:r>
-                        <a:rPr lang="pt-BR" sz="1600" u="none" strike="noStrike">
-                          <a:effectLst/>
-                        </a:rPr>
-                        <a:t>senha</a:t>
-                      </a:r>
-                      <a:endParaRPr lang="pt-BR" sz="1600" b="0" i="0" u="none" strike="noStrike">
-                        <a:solidFill>
-                          <a:srgbClr val="000000"/>
-                        </a:solidFill>
-                        <a:effectLst/>
-                        <a:latin typeface="Calibri" panose="020F0502020204030204" pitchFamily="34" charset="0"/>
-                      </a:endParaRPr>
-                    </a:p>
-                  </a:txBody>
-                  <a:tcPr marL="9525" marR="9525" marT="9525" marB="0" anchor="b"/>
-                </a:tc>
-                <a:extLst>
-                  <a:ext uri="{0D108BD9-81ED-4DB2-BD59-A6C34878D82A}">
-                    <a16:rowId xmlns:a16="http://schemas.microsoft.com/office/drawing/2014/main" val="325737574"/>
-                  </a:ext>
-                </a:extLst>
-              </a:tr>
-              <a:tr h="335069">
-                <a:tc vMerge="1">
-                  <a:txBody>
-                    <a:bodyPr/>
-                    <a:lstStyle/>
-                    <a:p>
-                      <a:endParaRPr lang="pt-BR"/>
-                    </a:p>
-                  </a:txBody>
-                  <a:tcPr/>
-                </a:tc>
-                <a:tc>
-                  <a:txBody>
-                    <a:bodyPr/>
-                    <a:lstStyle/>
-                    <a:p>
-                      <a:pPr algn="l" fontAlgn="b"/>
-                      <a:r>
-                        <a:rPr lang="pt-BR" sz="1600" u="none" strike="noStrike" dirty="0">
-                          <a:effectLst/>
-                        </a:rPr>
-                        <a:t>nome</a:t>
-                      </a:r>
-                      <a:endParaRPr lang="pt-BR" sz="1600" b="0" i="0" u="none" strike="noStrike" dirty="0">
-                        <a:solidFill>
-                          <a:srgbClr val="000000"/>
-                        </a:solidFill>
-                        <a:effectLst/>
-                        <a:latin typeface="Calibri" panose="020F0502020204030204" pitchFamily="34" charset="0"/>
-                      </a:endParaRPr>
-                    </a:p>
-                  </a:txBody>
-                  <a:tcPr marL="9525" marR="9525" marT="9525" marB="0" anchor="b"/>
-                </a:tc>
-                <a:extLst>
-                  <a:ext uri="{0D108BD9-81ED-4DB2-BD59-A6C34878D82A}">
-                    <a16:rowId xmlns:a16="http://schemas.microsoft.com/office/drawing/2014/main" val="1672054426"/>
-                  </a:ext>
-                </a:extLst>
-              </a:tr>
-              <a:tr h="335069">
-                <a:tc vMerge="1">
-                  <a:txBody>
-                    <a:bodyPr/>
-                    <a:lstStyle/>
-                    <a:p>
-                      <a:endParaRPr lang="pt-BR"/>
-                    </a:p>
-                  </a:txBody>
-                  <a:tcPr/>
-                </a:tc>
-                <a:tc>
-                  <a:txBody>
-                    <a:bodyPr/>
-                    <a:lstStyle/>
-                    <a:p>
-                      <a:pPr algn="l" fontAlgn="b"/>
-                      <a:r>
-                        <a:rPr lang="pt-BR" sz="1600" u="none" strike="noStrike" err="1">
-                          <a:effectLst/>
-                        </a:rPr>
-                        <a:t>email</a:t>
-                      </a:r>
-                      <a:endParaRPr lang="pt-BR" sz="1600" b="0" i="0" u="none" strike="noStrike">
-                        <a:solidFill>
-                          <a:srgbClr val="000000"/>
-                        </a:solidFill>
-                        <a:effectLst/>
-                        <a:latin typeface="Calibri" panose="020F0502020204030204" pitchFamily="34" charset="0"/>
-                      </a:endParaRPr>
-                    </a:p>
-                  </a:txBody>
-                  <a:tcPr marL="9525" marR="9525" marT="9525" marB="0" anchor="b"/>
-                </a:tc>
-                <a:extLst>
-                  <a:ext uri="{0D108BD9-81ED-4DB2-BD59-A6C34878D82A}">
-                    <a16:rowId xmlns:a16="http://schemas.microsoft.com/office/drawing/2014/main" val="2426191845"/>
-                  </a:ext>
-                </a:extLst>
-              </a:tr>
-              <a:tr h="335069">
-                <a:tc vMerge="1">
-                  <a:txBody>
-                    <a:bodyPr/>
-                    <a:lstStyle/>
-                    <a:p>
-                      <a:endParaRPr lang="pt-BR"/>
-                    </a:p>
-                  </a:txBody>
-                  <a:tcPr/>
-                </a:tc>
-                <a:tc>
-                  <a:txBody>
-                    <a:bodyPr/>
-                    <a:lstStyle/>
-                    <a:p>
-                      <a:pPr algn="l" fontAlgn="b"/>
-                      <a:r>
-                        <a:rPr lang="pt-BR" sz="1600" u="none" strike="noStrike" err="1">
-                          <a:effectLst/>
-                        </a:rPr>
-                        <a:t>tipo_documento</a:t>
-                      </a:r>
-                      <a:endParaRPr lang="pt-BR" sz="1600" b="0" i="0" u="none" strike="noStrike">
-                        <a:solidFill>
-                          <a:srgbClr val="000000"/>
-                        </a:solidFill>
-                        <a:effectLst/>
-                        <a:latin typeface="Calibri" panose="020F0502020204030204" pitchFamily="34" charset="0"/>
-                      </a:endParaRPr>
-                    </a:p>
-                  </a:txBody>
-                  <a:tcPr marL="9525" marR="9525" marT="9525" marB="0" anchor="b"/>
-                </a:tc>
-                <a:extLst>
-                  <a:ext uri="{0D108BD9-81ED-4DB2-BD59-A6C34878D82A}">
-                    <a16:rowId xmlns:a16="http://schemas.microsoft.com/office/drawing/2014/main" val="3151027583"/>
-                  </a:ext>
-                </a:extLst>
-              </a:tr>
-              <a:tr h="335069">
-                <a:tc vMerge="1">
-                  <a:txBody>
-                    <a:bodyPr/>
-                    <a:lstStyle/>
-                    <a:p>
-                      <a:endParaRPr lang="pt-BR"/>
-                    </a:p>
-                  </a:txBody>
-                  <a:tcPr/>
-                </a:tc>
-                <a:tc>
-                  <a:txBody>
-                    <a:bodyPr/>
-                    <a:lstStyle/>
-                    <a:p>
-                      <a:pPr algn="l" fontAlgn="b"/>
-                      <a:r>
-                        <a:rPr lang="pt-BR" sz="1600" u="none" strike="noStrike" err="1">
-                          <a:effectLst/>
-                        </a:rPr>
-                        <a:t>num_documento</a:t>
-                      </a:r>
-                      <a:endParaRPr lang="pt-BR" sz="1600" b="0" i="0" u="none" strike="noStrike">
-                        <a:solidFill>
-                          <a:srgbClr val="000000"/>
-                        </a:solidFill>
-                        <a:effectLst/>
-                        <a:latin typeface="Calibri" panose="020F0502020204030204" pitchFamily="34" charset="0"/>
-                      </a:endParaRPr>
-                    </a:p>
-                  </a:txBody>
-                  <a:tcPr marL="9525" marR="9525" marT="9525" marB="0" anchor="b"/>
-                </a:tc>
-                <a:extLst>
-                  <a:ext uri="{0D108BD9-81ED-4DB2-BD59-A6C34878D82A}">
-                    <a16:rowId xmlns:a16="http://schemas.microsoft.com/office/drawing/2014/main" val="223369351"/>
-                  </a:ext>
-                </a:extLst>
-              </a:tr>
-              <a:tr h="335069">
-                <a:tc vMerge="1">
-                  <a:txBody>
-                    <a:bodyPr/>
-                    <a:lstStyle/>
-                    <a:p>
-                      <a:endParaRPr lang="pt-BR"/>
-                    </a:p>
-                  </a:txBody>
-                  <a:tcPr/>
-                </a:tc>
-                <a:tc>
-                  <a:txBody>
-                    <a:bodyPr/>
-                    <a:lstStyle/>
-                    <a:p>
-                      <a:pPr algn="l" fontAlgn="b"/>
-                      <a:r>
-                        <a:rPr lang="pt-BR" sz="1600" u="none" strike="noStrike">
-                          <a:effectLst/>
-                        </a:rPr>
-                        <a:t>status</a:t>
-                      </a:r>
-                      <a:endParaRPr lang="pt-BR" sz="1600" b="0" i="0" u="none" strike="noStrike">
-                        <a:solidFill>
-                          <a:srgbClr val="000000"/>
-                        </a:solidFill>
-                        <a:effectLst/>
-                        <a:latin typeface="Calibri" panose="020F0502020204030204" pitchFamily="34" charset="0"/>
-                      </a:endParaRPr>
-                    </a:p>
-                  </a:txBody>
-                  <a:tcPr marL="9525" marR="9525" marT="9525" marB="0" anchor="b"/>
-                </a:tc>
-                <a:extLst>
-                  <a:ext uri="{0D108BD9-81ED-4DB2-BD59-A6C34878D82A}">
-                    <a16:rowId xmlns:a16="http://schemas.microsoft.com/office/drawing/2014/main" val="2656179854"/>
-                  </a:ext>
-                </a:extLst>
-              </a:tr>
-              <a:tr h="335069">
-                <a:tc vMerge="1">
-                  <a:txBody>
-                    <a:bodyPr/>
-                    <a:lstStyle/>
-                    <a:p>
-                      <a:endParaRPr lang="pt-BR"/>
-                    </a:p>
-                  </a:txBody>
-                  <a:tcPr/>
-                </a:tc>
-                <a:tc>
-                  <a:txBody>
-                    <a:bodyPr/>
-                    <a:lstStyle/>
-                    <a:p>
-                      <a:pPr algn="l" fontAlgn="b"/>
-                      <a:r>
-                        <a:rPr lang="pt-BR" sz="1600" u="none" strike="noStrike" err="1">
-                          <a:effectLst/>
-                        </a:rPr>
-                        <a:t>dt_nascimento</a:t>
-                      </a:r>
-                      <a:endParaRPr lang="pt-BR" sz="1600" b="0" i="0" u="none" strike="noStrike">
-                        <a:solidFill>
-                          <a:srgbClr val="000000"/>
-                        </a:solidFill>
-                        <a:effectLst/>
-                        <a:latin typeface="Calibri" panose="020F0502020204030204" pitchFamily="34" charset="0"/>
-                      </a:endParaRPr>
-                    </a:p>
-                  </a:txBody>
-                  <a:tcPr marL="9525" marR="9525" marT="9525" marB="0" anchor="b"/>
-                </a:tc>
-                <a:extLst>
-                  <a:ext uri="{0D108BD9-81ED-4DB2-BD59-A6C34878D82A}">
-                    <a16:rowId xmlns:a16="http://schemas.microsoft.com/office/drawing/2014/main" val="3116824569"/>
-                  </a:ext>
-                </a:extLst>
-              </a:tr>
-              <a:tr h="335069">
-                <a:tc vMerge="1">
-                  <a:txBody>
-                    <a:bodyPr/>
-                    <a:lstStyle/>
-                    <a:p>
-                      <a:endParaRPr lang="pt-BR"/>
-                    </a:p>
-                  </a:txBody>
-                  <a:tcPr/>
-                </a:tc>
-                <a:tc>
-                  <a:txBody>
-                    <a:bodyPr/>
-                    <a:lstStyle/>
-                    <a:p>
-                      <a:pPr algn="l" fontAlgn="b"/>
-                      <a:r>
-                        <a:rPr lang="pt-BR" sz="1600" u="none" strike="noStrike" dirty="0">
-                          <a:effectLst/>
-                        </a:rPr>
-                        <a:t>dt_cadastro</a:t>
-                      </a:r>
-                      <a:endParaRPr lang="pt-BR" sz="1600" b="0" i="0" u="none" strike="noStrike" dirty="0">
-                        <a:solidFill>
-                          <a:srgbClr val="000000"/>
-                        </a:solidFill>
-                        <a:effectLst/>
-                        <a:latin typeface="Calibri" panose="020F0502020204030204" pitchFamily="34" charset="0"/>
-                      </a:endParaRPr>
-                    </a:p>
-                  </a:txBody>
-                  <a:tcPr marL="9525" marR="9525" marT="9525" marB="0" anchor="b"/>
-                </a:tc>
-                <a:extLst>
-                  <a:ext uri="{0D108BD9-81ED-4DB2-BD59-A6C34878D82A}">
-                    <a16:rowId xmlns:a16="http://schemas.microsoft.com/office/drawing/2014/main" val="722801819"/>
-                  </a:ext>
-                </a:extLst>
-              </a:tr>
-            </a:tbl>
-          </a:graphicData>
-        </a:graphic>
-      </p:graphicFrame>
-      <p:sp>
-        <p:nvSpPr>
-          <p:cNvPr id="11" name="Espaço Reservado para Data 3">
-            <a:extLst>
-              <a:ext uri="{FF2B5EF4-FFF2-40B4-BE49-F238E27FC236}">
-                <a16:creationId xmlns:a16="http://schemas.microsoft.com/office/drawing/2014/main" id="{C7289784-9CA9-4016-567C-91CFA843CE11}"/>
-              </a:ext>
-            </a:extLst>
-          </p:cNvPr>
-          <p:cNvSpPr txBox="1">
-            <a:spLocks/>
-          </p:cNvSpPr>
-          <p:nvPr/>
-        </p:nvSpPr>
-        <p:spPr>
-          <a:xfrm>
-            <a:off x="6824870" y="6312807"/>
-            <a:ext cx="2743200" cy="365125"/>
-          </a:xfrm>
-          <a:prstGeom prst="rect">
-            <a:avLst/>
-          </a:prstGeom>
-        </p:spPr>
-        <p:txBody>
-          <a:bodyPr vert="horz" lIns="91440" tIns="45720" rIns="91440" bIns="45720" rtlCol="0" anchor="ctr"/>
-          <a:lstStyle>
-            <a:defPPr>
-              <a:defRPr lang="pt-BR"/>
-            </a:defPPr>
-            <a:lvl1pPr marL="0" algn="l" defTabSz="914400" rtl="0" eaLnBrk="1" latinLnBrk="0" hangingPunct="1">
-              <a:defRPr sz="800" kern="1200" cap="all" spc="300" baseline="0">
-                <a:solidFill>
-                  <a:schemeClr val="tx2"/>
-                </a:solidFill>
-                <a:latin typeface="+mn-lt"/>
-                <a:ea typeface="+mn-ea"/>
-                <a:cs typeface="+mn-cs"/>
-              </a:defRPr>
-            </a:lvl1pPr>
-            <a:lvl2pPr marL="457200" algn="l" defTabSz="914400" rtl="0" eaLnBrk="1" latinLnBrk="0" hangingPunct="1">
-              <a:defRPr sz="1800" kern="1200">
-                <a:solidFill>
-                  <a:schemeClr val="tx1"/>
-                </a:solidFill>
-                <a:latin typeface="+mn-lt"/>
-                <a:ea typeface="+mn-ea"/>
-                <a:cs typeface="+mn-cs"/>
-              </a:defRPr>
-            </a:lvl2pPr>
-            <a:lvl3pPr marL="914400" algn="l" defTabSz="914400" rtl="0" eaLnBrk="1" latinLnBrk="0" hangingPunct="1">
-              <a:defRPr sz="1800" kern="1200">
-                <a:solidFill>
-                  <a:schemeClr val="tx1"/>
-                </a:solidFill>
-                <a:latin typeface="+mn-lt"/>
-                <a:ea typeface="+mn-ea"/>
-                <a:cs typeface="+mn-cs"/>
-              </a:defRPr>
-            </a:lvl3pPr>
-            <a:lvl4pPr marL="1371600" algn="l" defTabSz="914400" rtl="0" eaLnBrk="1" latinLnBrk="0" hangingPunct="1">
-              <a:defRPr sz="1800" kern="1200">
-                <a:solidFill>
-                  <a:schemeClr val="tx1"/>
-                </a:solidFill>
-                <a:latin typeface="+mn-lt"/>
-                <a:ea typeface="+mn-ea"/>
-                <a:cs typeface="+mn-cs"/>
-              </a:defRPr>
-            </a:lvl4pPr>
-            <a:lvl5pPr marL="1828800" algn="l" defTabSz="914400" rtl="0" eaLnBrk="1" latinLnBrk="0" hangingPunct="1">
-              <a:defRPr sz="1800" kern="1200">
-                <a:solidFill>
-                  <a:schemeClr val="tx1"/>
-                </a:solidFill>
-                <a:latin typeface="+mn-lt"/>
-                <a:ea typeface="+mn-ea"/>
-                <a:cs typeface="+mn-cs"/>
-              </a:defRPr>
-            </a:lvl5pPr>
-            <a:lvl6pPr marL="2286000" algn="l" defTabSz="914400" rtl="0" eaLnBrk="1" latinLnBrk="0" hangingPunct="1">
-              <a:defRPr sz="1800" kern="1200">
-                <a:solidFill>
-                  <a:schemeClr val="tx1"/>
-                </a:solidFill>
-                <a:latin typeface="+mn-lt"/>
-                <a:ea typeface="+mn-ea"/>
-                <a:cs typeface="+mn-cs"/>
-              </a:defRPr>
-            </a:lvl6pPr>
-            <a:lvl7pPr marL="2743200" algn="l" defTabSz="914400" rtl="0" eaLnBrk="1" latinLnBrk="0" hangingPunct="1">
-              <a:defRPr sz="1800" kern="1200">
-                <a:solidFill>
-                  <a:schemeClr val="tx1"/>
-                </a:solidFill>
-                <a:latin typeface="+mn-lt"/>
-                <a:ea typeface="+mn-ea"/>
-                <a:cs typeface="+mn-cs"/>
-              </a:defRPr>
-            </a:lvl7pPr>
-            <a:lvl8pPr marL="3200400" algn="l" defTabSz="914400" rtl="0" eaLnBrk="1" latinLnBrk="0" hangingPunct="1">
-              <a:defRPr sz="1800" kern="1200">
-                <a:solidFill>
-                  <a:schemeClr val="tx1"/>
-                </a:solidFill>
-                <a:latin typeface="+mn-lt"/>
-                <a:ea typeface="+mn-ea"/>
-                <a:cs typeface="+mn-cs"/>
-              </a:defRPr>
-            </a:lvl8pPr>
-            <a:lvl9pPr marL="3657600" algn="l" defTabSz="914400" rtl="0" eaLnBrk="1" latinLnBrk="0" hangingPunct="1">
-              <a:defRPr sz="1800" kern="1200">
-                <a:solidFill>
-                  <a:schemeClr val="tx1"/>
-                </a:solidFill>
-                <a:latin typeface="+mn-lt"/>
-                <a:ea typeface="+mn-ea"/>
-                <a:cs typeface="+mn-cs"/>
-              </a:defRPr>
-            </a:lvl9pPr>
-          </a:lstStyle>
-          <a:p>
-            <a:r>
-              <a:rPr lang="en-US" b="1" dirty="0"/>
-              <a:t>Figura3 – </a:t>
-            </a:r>
-            <a:r>
-              <a:rPr lang="en-US" b="1" dirty="0" err="1"/>
-              <a:t>tabela</a:t>
-            </a:r>
-            <a:r>
-              <a:rPr lang="en-US" b="1" dirty="0"/>
-              <a:t> do banco</a:t>
-            </a:r>
-          </a:p>
-        </p:txBody>
-      </p:sp>
-      <p:pic>
-        <p:nvPicPr>
-          <p:cNvPr id="7" name="Imagem 6" descr="Interface gráfica do usuário, Texto, Aplicativo&#10;&#10;Descrição gerada automaticamente">
-            <a:extLst>
-              <a:ext uri="{FF2B5EF4-FFF2-40B4-BE49-F238E27FC236}">
-                <a16:creationId xmlns:a16="http://schemas.microsoft.com/office/drawing/2014/main" id="{C8C0844E-1CEF-6B0C-C1A3-2C051746DE94}"/>
-              </a:ext>
-            </a:extLst>
-          </p:cNvPr>
-          <p:cNvPicPr>
-            <a:picLocks noChangeAspect="1"/>
-          </p:cNvPicPr>
-          <p:nvPr/>
-        </p:nvPicPr>
-        <p:blipFill>
-          <a:blip r:embed="rId2"/>
-          <a:stretch>
-            <a:fillRect/>
-          </a:stretch>
-        </p:blipFill>
-        <p:spPr>
-          <a:xfrm>
-            <a:off x="929801" y="2611215"/>
-            <a:ext cx="4257290" cy="3745135"/>
-          </a:xfrm>
-          <a:prstGeom prst="rect">
-            <a:avLst/>
-          </a:prstGeom>
-        </p:spPr>
-      </p:pic>
-      <p:sp>
-        <p:nvSpPr>
-          <p:cNvPr id="8" name="Seta para a Direita 7">
-            <a:extLst>
-              <a:ext uri="{FF2B5EF4-FFF2-40B4-BE49-F238E27FC236}">
-                <a16:creationId xmlns:a16="http://schemas.microsoft.com/office/drawing/2014/main" id="{3A3092D9-C0EE-15C5-5BE9-69C137E10E29}"/>
-              </a:ext>
-            </a:extLst>
-          </p:cNvPr>
-          <p:cNvSpPr/>
-          <p:nvPr/>
-        </p:nvSpPr>
-        <p:spPr>
-          <a:xfrm>
-            <a:off x="5433391" y="4267200"/>
-            <a:ext cx="1099931" cy="503583"/>
-          </a:xfrm>
-          <a:prstGeom prst="rightArrow">
-            <a:avLst/>
-          </a:prstGeom>
-        </p:spPr>
-        <p:style>
-          <a:lnRef idx="2">
-            <a:schemeClr val="dk1">
-              <a:shade val="15000"/>
-            </a:schemeClr>
-          </a:lnRef>
-          <a:fillRef idx="1">
-            <a:schemeClr val="dk1"/>
-          </a:fillRef>
-          <a:effectRef idx="0">
-            <a:schemeClr val="dk1"/>
-          </a:effectRef>
-          <a:fontRef idx="minor">
-            <a:schemeClr val="lt1"/>
-          </a:fontRef>
-        </p:style>
-        <p:txBody>
-          <a:bodyPr rtlCol="0" anchor="ctr"/>
-          <a:lstStyle/>
-          <a:p>
-            <a:pPr algn="ctr"/>
-            <a:endParaRPr lang="pt-BR"/>
-          </a:p>
-        </p:txBody>
-      </p:sp>
-    </p:spTree>
-    <p:extLst>
-      <p:ext uri="{BB962C8B-B14F-4D97-AF65-F5344CB8AC3E}">
-        <p14:creationId xmlns:p14="http://schemas.microsoft.com/office/powerpoint/2010/main" val="3240958650"/>
       </p:ext>
     </p:extLst>
   </p:cSld>

</xml_diff>

<commit_message>
- Atualização da Apresentação e diagramas
</commit_message>
<xml_diff>
--- a/Documentos/Apresentação -Gestão de Academia.pptx
+++ b/Documentos/Apresentação -Gestão de Academia.pptx
@@ -12,8 +12,8 @@
     <p:sldId id="257" r:id="rId3"/>
     <p:sldId id="280" r:id="rId4"/>
     <p:sldId id="286" r:id="rId5"/>
-    <p:sldId id="285" r:id="rId6"/>
-    <p:sldId id="281" r:id="rId7"/>
+    <p:sldId id="281" r:id="rId6"/>
+    <p:sldId id="285" r:id="rId7"/>
     <p:sldId id="287" r:id="rId8"/>
     <p:sldId id="282" r:id="rId9"/>
     <p:sldId id="258" r:id="rId10"/>
@@ -220,7 +220,7 @@
           <a:p>
             <a:fld id="{E25F0F3D-B854-BB47-93D4-241CDD40E044}" type="datetimeFigureOut">
               <a:rPr lang="pt-BR" smtClean="0"/>
-              <a:t>11/12/2023</a:t>
+              <a:t>12/12/2023</a:t>
             </a:fld>
             <a:endParaRPr lang="pt-BR"/>
           </a:p>
@@ -1562,7 +1562,7 @@
           <a:p>
             <a:fld id="{1ECB5883-038C-4696-8E27-1811E470D6D4}" type="datetime1">
               <a:rPr lang="en-US" smtClean="0"/>
-              <a:t>12/11/23</a:t>
+              <a:t>12/12/23</a:t>
             </a:fld>
             <a:endParaRPr lang="en-US"/>
           </a:p>
@@ -1763,7 +1763,7 @@
           <a:p>
             <a:fld id="{61E8A6D4-154B-4E4D-9001-7A6C328D243E}" type="datetime1">
               <a:rPr lang="en-US" smtClean="0"/>
-              <a:t>12/11/23</a:t>
+              <a:t>12/12/23</a:t>
             </a:fld>
             <a:endParaRPr lang="en-US"/>
           </a:p>
@@ -1974,7 +1974,7 @@
           <a:p>
             <a:fld id="{EF880999-9BD6-4929-BDEC-B84E21C16701}" type="datetime1">
               <a:rPr lang="en-US" smtClean="0"/>
-              <a:t>12/11/23</a:t>
+              <a:t>12/12/23</a:t>
             </a:fld>
             <a:endParaRPr lang="en-US"/>
           </a:p>
@@ -2175,7 +2175,7 @@
           <a:p>
             <a:fld id="{579F6069-8263-4296-913A-BC2234E8D32B}" type="datetime1">
               <a:rPr lang="en-US" smtClean="0"/>
-              <a:t>12/11/23</a:t>
+              <a:t>12/12/23</a:t>
             </a:fld>
             <a:endParaRPr lang="en-US"/>
           </a:p>
@@ -2455,7 +2455,7 @@
           <a:p>
             <a:fld id="{BC9F5005-EC25-4FB9-B19B-2437F0B120D2}" type="datetime1">
               <a:rPr lang="en-US" smtClean="0"/>
-              <a:t>12/11/23</a:t>
+              <a:t>12/12/23</a:t>
             </a:fld>
             <a:endParaRPr lang="en-US"/>
           </a:p>
@@ -2723,7 +2723,7 @@
           <a:p>
             <a:fld id="{0B283B5C-2325-42FF-AF91-C1451D9D66CC}" type="datetime1">
               <a:rPr lang="en-US" smtClean="0"/>
-              <a:t>12/11/23</a:t>
+              <a:t>12/12/23</a:t>
             </a:fld>
             <a:endParaRPr lang="en-US"/>
           </a:p>
@@ -3142,7 +3142,7 @@
           <a:p>
             <a:fld id="{0F88DB08-3B01-46DD-99F2-F6F6334EA669}" type="datetime1">
               <a:rPr lang="en-US" smtClean="0"/>
-              <a:t>12/11/23</a:t>
+              <a:t>12/12/23</a:t>
             </a:fld>
             <a:endParaRPr lang="en-US"/>
           </a:p>
@@ -3286,7 +3286,7 @@
           <a:p>
             <a:fld id="{5892AC11-ACC3-4129-BBD7-C580BF1A4EE7}" type="datetime1">
               <a:rPr lang="en-US" smtClean="0"/>
-              <a:t>12/11/23</a:t>
+              <a:t>12/12/23</a:t>
             </a:fld>
             <a:endParaRPr lang="en-US"/>
           </a:p>
@@ -3402,7 +3402,7 @@
           <a:p>
             <a:fld id="{6D80F7F3-E406-44E2-93AF-674B3F1A2E51}" type="datetime1">
               <a:rPr lang="en-US" smtClean="0"/>
-              <a:t>12/11/23</a:t>
+              <a:t>12/12/23</a:t>
             </a:fld>
             <a:endParaRPr lang="en-US"/>
           </a:p>
@@ -3720,7 +3720,7 @@
           <a:p>
             <a:fld id="{2FB1DD93-7C9D-4E53-81F0-DDE57FEA7EDB}" type="datetime1">
               <a:rPr lang="en-US" smtClean="0"/>
-              <a:t>12/11/23</a:t>
+              <a:t>12/12/23</a:t>
             </a:fld>
             <a:endParaRPr lang="en-US"/>
           </a:p>
@@ -4013,7 +4013,7 @@
           <a:p>
             <a:fld id="{3DF7BC28-59DE-4F83-B4A1-497203279FAD}" type="datetime1">
               <a:rPr lang="en-US" smtClean="0"/>
-              <a:t>12/11/23</a:t>
+              <a:t>12/12/23</a:t>
             </a:fld>
             <a:endParaRPr lang="en-US"/>
           </a:p>
@@ -4313,7 +4313,7 @@
           <a:p>
             <a:fld id="{0BDC4764-F656-4735-9820-9886F8DF1D6A}" type="datetime1">
               <a:rPr lang="en-US" smtClean="0"/>
-              <a:t>12/11/23</a:t>
+              <a:t>12/12/23</a:t>
             </a:fld>
             <a:endParaRPr lang="en-US"/>
           </a:p>
@@ -5076,8 +5076,12 @@
           <a:lstStyle/>
           <a:p>
             <a:r>
+              <a:rPr lang="en-US" b="1" dirty="0" err="1"/>
+              <a:t>Figura</a:t>
+            </a:r>
+            <a:r>
               <a:rPr lang="en-US" b="1" dirty="0"/>
-              <a:t>Figura4 – </a:t>
+              <a:t> 7 – </a:t>
             </a:r>
             <a:r>
               <a:rPr lang="en-US" b="1" dirty="0" err="1"/>
@@ -5651,7 +5655,7 @@
         </p:nvSpPr>
         <p:spPr>
           <a:xfrm>
-            <a:off x="6824870" y="6312807"/>
+            <a:off x="6805206" y="6312807"/>
             <a:ext cx="2743200" cy="365125"/>
           </a:xfrm>
           <a:prstGeom prst="rect">
@@ -5757,8 +5761,12 @@
           </a:lstStyle>
           <a:p>
             <a:r>
+              <a:rPr lang="en-US" b="1" dirty="0" err="1"/>
+              <a:t>Figura</a:t>
+            </a:r>
+            <a:r>
               <a:rPr lang="en-US" b="1" dirty="0"/>
-              <a:t>Figura3 – </a:t>
+              <a:t> 8 – </a:t>
             </a:r>
             <a:r>
               <a:rPr lang="en-US" b="1" dirty="0" err="1"/>
@@ -5996,8 +6004,12 @@
           <a:lstStyle/>
           <a:p>
             <a:r>
+              <a:rPr lang="en-US" b="1" dirty="0" err="1"/>
+              <a:t>Figura</a:t>
+            </a:r>
+            <a:r>
               <a:rPr lang="en-US" b="1" dirty="0"/>
-              <a:t>Figura5 – </a:t>
+              <a:t> 9 – </a:t>
             </a:r>
             <a:r>
               <a:rPr lang="en-US" b="1" dirty="0" err="1"/>
@@ -6068,7 +6080,7 @@
         </p:nvSpPr>
         <p:spPr>
           <a:xfrm>
-            <a:off x="6824870" y="6312807"/>
+            <a:off x="6742042" y="6322760"/>
             <a:ext cx="2743200" cy="365125"/>
           </a:xfrm>
           <a:prstGeom prst="rect">
@@ -6179,7 +6191,7 @@
             </a:r>
             <a:r>
               <a:rPr lang="en-US" b="1" dirty="0"/>
-              <a:t> 6 – </a:t>
+              <a:t> 10 – </a:t>
             </a:r>
             <a:r>
               <a:rPr lang="en-US" b="1" dirty="0" err="1"/>
@@ -6908,8 +6920,8 @@
         </p:nvSpPr>
         <p:spPr>
           <a:xfrm>
-            <a:off x="871107" y="6312807"/>
-            <a:ext cx="4091834" cy="365125"/>
+            <a:off x="910434" y="6312807"/>
+            <a:ext cx="4214591" cy="365125"/>
           </a:xfrm>
         </p:spPr>
         <p:txBody>
@@ -6917,8 +6929,12 @@
           <a:lstStyle/>
           <a:p>
             <a:r>
+              <a:rPr lang="en-US" b="1" dirty="0" err="1"/>
+              <a:t>Figura</a:t>
+            </a:r>
+            <a:r>
               <a:rPr lang="en-US" b="1" dirty="0"/>
-              <a:t>Figura7 – </a:t>
+              <a:t> 11 – </a:t>
             </a:r>
             <a:r>
               <a:rPr lang="en-US" b="1" dirty="0" err="1"/>
@@ -6989,7 +7005,7 @@
         </p:nvSpPr>
         <p:spPr>
           <a:xfrm>
-            <a:off x="6824870" y="6312807"/>
+            <a:off x="6805206" y="6312807"/>
             <a:ext cx="2743200" cy="365125"/>
           </a:xfrm>
           <a:prstGeom prst="rect">
@@ -7100,7 +7116,7 @@
             </a:r>
             <a:r>
               <a:rPr lang="en-US" b="1" dirty="0"/>
-              <a:t> 8 – </a:t>
+              <a:t> 12 – </a:t>
             </a:r>
             <a:r>
               <a:rPr lang="en-US" b="1" dirty="0" err="1"/>
@@ -7974,8 +7990,12 @@
           <a:lstStyle/>
           <a:p>
             <a:r>
+              <a:rPr lang="en-US" b="1" dirty="0" err="1"/>
+              <a:t>Figura</a:t>
+            </a:r>
+            <a:r>
               <a:rPr lang="en-US" b="1" dirty="0"/>
-              <a:t>Figura9 – </a:t>
+              <a:t> 13 – </a:t>
             </a:r>
             <a:r>
               <a:rPr lang="en-US" b="1" dirty="0" err="1"/>
@@ -8152,7 +8172,7 @@
             </a:r>
             <a:r>
               <a:rPr lang="en-US" b="1" dirty="0"/>
-              <a:t> 10 – </a:t>
+              <a:t> 14 – </a:t>
             </a:r>
             <a:r>
               <a:rPr lang="en-US" b="1" dirty="0" err="1"/>
@@ -8700,7 +8720,7 @@
         </p:nvSpPr>
         <p:spPr>
           <a:xfrm>
-            <a:off x="871107" y="6312807"/>
+            <a:off x="871107" y="6352135"/>
             <a:ext cx="4233328" cy="365125"/>
           </a:xfrm>
         </p:spPr>
@@ -8710,7 +8730,7 @@
           <a:p>
             <a:r>
               <a:rPr lang="en-US" b="1" dirty="0"/>
-              <a:t>FigurA11 – </a:t>
+              <a:t>FigurA15 – </a:t>
             </a:r>
             <a:r>
               <a:rPr lang="en-US" b="1" dirty="0" err="1"/>
@@ -8887,7 +8907,7 @@
             </a:r>
             <a:r>
               <a:rPr lang="en-US" b="1" dirty="0"/>
-              <a:t> 12 – </a:t>
+              <a:t> 16 – </a:t>
             </a:r>
             <a:r>
               <a:rPr lang="en-US" b="1" dirty="0" err="1"/>
@@ -9661,7 +9681,7 @@
         </p:nvSpPr>
         <p:spPr>
           <a:xfrm>
-            <a:off x="6587876" y="6087192"/>
+            <a:off x="6568212" y="6067528"/>
             <a:ext cx="4233328" cy="365125"/>
           </a:xfrm>
         </p:spPr>
@@ -9671,7 +9691,7 @@
           <a:p>
             <a:r>
               <a:rPr lang="en-US" b="1" dirty="0"/>
-              <a:t>FigurA13 – </a:t>
+              <a:t>FigurA17 – </a:t>
             </a:r>
             <a:r>
               <a:rPr lang="en-US" b="1" dirty="0" err="1"/>
@@ -9965,7 +9985,7 @@
         </p:nvSpPr>
         <p:spPr>
           <a:xfrm>
-            <a:off x="6587876" y="6087192"/>
+            <a:off x="6558380" y="6067528"/>
             <a:ext cx="4233328" cy="365125"/>
           </a:xfrm>
         </p:spPr>
@@ -9975,7 +9995,7 @@
           <a:p>
             <a:r>
               <a:rPr lang="en-US" b="1" dirty="0"/>
-              <a:t>FigurA13 – </a:t>
+              <a:t>FigurA18 – </a:t>
             </a:r>
             <a:r>
               <a:rPr lang="en-US" b="1" dirty="0" err="1"/>
@@ -10232,7 +10252,7 @@
         </p:nvSpPr>
         <p:spPr>
           <a:xfrm>
-            <a:off x="4190741" y="6269755"/>
+            <a:off x="4161245" y="6269755"/>
             <a:ext cx="6070859" cy="365125"/>
           </a:xfrm>
         </p:spPr>
@@ -10249,7 +10269,7 @@
             </a:pPr>
             <a:r>
               <a:rPr lang="en-US" b="1" dirty="0"/>
-              <a:t>FigurA14 – </a:t>
+              <a:t>FigurA19 – </a:t>
             </a:r>
             <a:r>
               <a:rPr lang="en-US" b="1" dirty="0" err="1"/>
@@ -10462,7 +10482,7 @@
         </p:nvSpPr>
         <p:spPr>
           <a:xfrm>
-            <a:off x="3917581" y="6308355"/>
+            <a:off x="3868421" y="6318187"/>
             <a:ext cx="6598019" cy="365125"/>
           </a:xfrm>
         </p:spPr>
@@ -10479,7 +10499,7 @@
             </a:pPr>
             <a:r>
               <a:rPr lang="en-US" b="1" dirty="0"/>
-              <a:t>FigurA15 – </a:t>
+              <a:t>FigurA20 – </a:t>
             </a:r>
             <a:r>
               <a:rPr lang="en-US" b="1" dirty="0" err="1"/>
@@ -10725,8 +10745,12 @@
               </a:spcAft>
             </a:pPr>
             <a:r>
+              <a:rPr lang="en-US" b="1" dirty="0" err="1"/>
+              <a:t>FigurA</a:t>
+            </a:r>
+            <a:r>
               <a:rPr lang="en-US" b="1" dirty="0"/>
-              <a:t>FigurA16 – </a:t>
+              <a:t> 21 – </a:t>
             </a:r>
             <a:r>
               <a:rPr lang="en-US" b="1" dirty="0" err="1"/>
@@ -11237,7 +11261,7 @@
         </p:nvSpPr>
         <p:spPr>
           <a:xfrm>
-            <a:off x="3917581" y="6308355"/>
+            <a:off x="3878253" y="6318187"/>
             <a:ext cx="6598019" cy="365125"/>
           </a:xfrm>
         </p:spPr>
@@ -11253,8 +11277,12 @@
               </a:spcAft>
             </a:pPr>
             <a:r>
+              <a:rPr lang="en-US" b="1" dirty="0" err="1"/>
+              <a:t>FigurA</a:t>
+            </a:r>
+            <a:r>
               <a:rPr lang="en-US" b="1" dirty="0"/>
-              <a:t>FigurA17 – </a:t>
+              <a:t> 22 – </a:t>
             </a:r>
             <a:r>
               <a:rPr lang="en-US" b="1" dirty="0" err="1"/>
@@ -11538,7 +11566,7 @@
         </p:nvSpPr>
         <p:spPr>
           <a:xfrm>
-            <a:off x="4279900" y="6176962"/>
+            <a:off x="4240572" y="6176962"/>
             <a:ext cx="5218176" cy="365125"/>
           </a:xfrm>
         </p:spPr>
@@ -11554,8 +11582,12 @@
               </a:spcAft>
             </a:pPr>
             <a:r>
+              <a:rPr lang="en-US" b="1" dirty="0" err="1"/>
+              <a:t>FigurA</a:t>
+            </a:r>
+            <a:r>
               <a:rPr lang="en-US" b="1" dirty="0"/>
-              <a:t>FigurA18 – </a:t>
+              <a:t> 23 – </a:t>
             </a:r>
             <a:r>
               <a:rPr lang="en-US" b="1" dirty="0" err="1"/>
@@ -11992,9 +12024,346 @@
         </p:spPr>
         <p:txBody>
           <a:bodyPr>
-            <a:normAutofit/>
+            <a:normAutofit fontScale="92500" lnSpcReduction="20000"/>
           </a:bodyPr>
           <a:lstStyle/>
+          <a:p>
+            <a:pPr marL="342900" indent="-342900" algn="just">
+              <a:lnSpc>
+                <a:spcPct val="100000"/>
+              </a:lnSpc>
+              <a:spcBef>
+                <a:spcPts val="525"/>
+              </a:spcBef>
+              <a:spcAft>
+                <a:spcPts val="525"/>
+              </a:spcAft>
+              <a:buFont typeface="+mj-lt"/>
+              <a:buAutoNum type="arabicPeriod"/>
+            </a:pPr>
+            <a:r>
+              <a:rPr lang="pt-BR" sz="1800" dirty="0">
+                <a:solidFill>
+                  <a:srgbClr val="444444"/>
+                </a:solidFill>
+                <a:effectLst/>
+                <a:latin typeface="Open Sans" panose="020B0606030504020204" pitchFamily="34" charset="0"/>
+                <a:ea typeface="Times New Roman" panose="02020603050405020304" pitchFamily="18" charset="0"/>
+              </a:rPr>
+              <a:t>Criação do módulo </a:t>
+            </a:r>
+            <a:r>
+              <a:rPr lang="pt-BR" sz="1800" dirty="0">
+                <a:solidFill>
+                  <a:srgbClr val="444444"/>
+                </a:solidFill>
+                <a:latin typeface="Open Sans" panose="020B0606030504020204" pitchFamily="34" charset="0"/>
+                <a:ea typeface="Times New Roman" panose="02020603050405020304" pitchFamily="18" charset="0"/>
+              </a:rPr>
+              <a:t>F</a:t>
+            </a:r>
+            <a:r>
+              <a:rPr lang="pt-BR" sz="1800" dirty="0">
+                <a:solidFill>
+                  <a:srgbClr val="444444"/>
+                </a:solidFill>
+                <a:effectLst/>
+                <a:latin typeface="Open Sans" panose="020B0606030504020204" pitchFamily="34" charset="0"/>
+                <a:ea typeface="Times New Roman" panose="02020603050405020304" pitchFamily="18" charset="0"/>
+              </a:rPr>
+              <a:t>inanceiro;</a:t>
+            </a:r>
+          </a:p>
+          <a:p>
+            <a:pPr marL="342900" indent="-342900" algn="just">
+              <a:lnSpc>
+                <a:spcPct val="100000"/>
+              </a:lnSpc>
+              <a:spcBef>
+                <a:spcPts val="525"/>
+              </a:spcBef>
+              <a:spcAft>
+                <a:spcPts val="525"/>
+              </a:spcAft>
+              <a:buFont typeface="+mj-lt"/>
+              <a:buAutoNum type="arabicPeriod"/>
+            </a:pPr>
+            <a:r>
+              <a:rPr lang="pt-BR" sz="1800" dirty="0">
+                <a:solidFill>
+                  <a:srgbClr val="444444"/>
+                </a:solidFill>
+                <a:effectLst/>
+                <a:latin typeface="Open Sans" panose="020B0606030504020204" pitchFamily="34" charset="0"/>
+                <a:ea typeface="Times New Roman" panose="02020603050405020304" pitchFamily="18" charset="0"/>
+              </a:rPr>
+              <a:t>Criação do módulo Matricular aluno;</a:t>
+            </a:r>
+          </a:p>
+          <a:p>
+            <a:pPr marL="342900" indent="-342900" algn="just">
+              <a:lnSpc>
+                <a:spcPct val="100000"/>
+              </a:lnSpc>
+              <a:spcBef>
+                <a:spcPts val="525"/>
+              </a:spcBef>
+              <a:spcAft>
+                <a:spcPts val="525"/>
+              </a:spcAft>
+              <a:buFont typeface="+mj-lt"/>
+              <a:buAutoNum type="arabicPeriod"/>
+            </a:pPr>
+            <a:r>
+              <a:rPr lang="pt-BR" sz="2000" dirty="0">
+                <a:solidFill>
+                  <a:schemeClr val="tx1"/>
+                </a:solidFill>
+                <a:effectLst/>
+              </a:rPr>
+              <a:t>Verificação no banco se o registro já existe;</a:t>
+            </a:r>
+          </a:p>
+          <a:p>
+            <a:pPr marL="342900" indent="-342900" algn="just">
+              <a:lnSpc>
+                <a:spcPct val="100000"/>
+              </a:lnSpc>
+              <a:spcBef>
+                <a:spcPts val="525"/>
+              </a:spcBef>
+              <a:spcAft>
+                <a:spcPts val="525"/>
+              </a:spcAft>
+              <a:buFont typeface="+mj-lt"/>
+              <a:buAutoNum type="arabicPeriod"/>
+            </a:pPr>
+            <a:r>
+              <a:rPr lang="pt-BR" sz="2000" dirty="0">
+                <a:solidFill>
+                  <a:schemeClr val="tx1"/>
+                </a:solidFill>
+              </a:rPr>
+              <a:t>Criar função esconder senha digitada;</a:t>
+            </a:r>
+          </a:p>
+          <a:p>
+            <a:pPr marL="342900" indent="-342900" algn="just">
+              <a:lnSpc>
+                <a:spcPct val="100000"/>
+              </a:lnSpc>
+              <a:spcBef>
+                <a:spcPts val="525"/>
+              </a:spcBef>
+              <a:spcAft>
+                <a:spcPts val="525"/>
+              </a:spcAft>
+              <a:buFont typeface="+mj-lt"/>
+              <a:buAutoNum type="arabicPeriod"/>
+            </a:pPr>
+            <a:r>
+              <a:rPr lang="pt-BR" sz="2100" dirty="0">
+                <a:solidFill>
+                  <a:schemeClr val="tx1"/>
+                </a:solidFill>
+              </a:rPr>
+              <a:t>Validação de e-mail;</a:t>
+            </a:r>
+          </a:p>
+          <a:p>
+            <a:pPr marL="342900" indent="-342900" algn="just">
+              <a:lnSpc>
+                <a:spcPct val="100000"/>
+              </a:lnSpc>
+              <a:spcBef>
+                <a:spcPts val="525"/>
+              </a:spcBef>
+              <a:spcAft>
+                <a:spcPts val="525"/>
+              </a:spcAft>
+              <a:buFont typeface="+mj-lt"/>
+              <a:buAutoNum type="arabicPeriod"/>
+            </a:pPr>
+            <a:r>
+              <a:rPr lang="pt-BR" sz="2000" dirty="0">
+                <a:solidFill>
+                  <a:schemeClr val="tx1"/>
+                </a:solidFill>
+                <a:effectLst/>
+              </a:rPr>
+              <a:t>Ajustar o padrão de datas </a:t>
+            </a:r>
+            <a:r>
+              <a:rPr lang="pt-BR" sz="2100" dirty="0">
+                <a:solidFill>
+                  <a:schemeClr val="tx1"/>
+                </a:solidFill>
+              </a:rPr>
+              <a:t>para BR de datas de AAAA-MM-DD para DD-MM-AAAA</a:t>
+            </a:r>
+            <a:r>
+              <a:rPr lang="pt-BR" sz="2000" dirty="0">
+                <a:solidFill>
+                  <a:schemeClr val="tx1"/>
+                </a:solidFill>
+                <a:effectLst/>
+              </a:rPr>
+              <a:t>;</a:t>
+            </a:r>
+          </a:p>
+          <a:p>
+            <a:pPr marL="342900" indent="-342900" algn="just">
+              <a:lnSpc>
+                <a:spcPct val="100000"/>
+              </a:lnSpc>
+              <a:spcBef>
+                <a:spcPts val="525"/>
+              </a:spcBef>
+              <a:spcAft>
+                <a:spcPts val="525"/>
+              </a:spcAft>
+              <a:buFont typeface="+mj-lt"/>
+              <a:buAutoNum type="arabicPeriod"/>
+            </a:pPr>
+            <a:r>
+              <a:rPr lang="pt-BR" sz="2000" dirty="0">
+                <a:solidFill>
+                  <a:schemeClr val="tx1"/>
+                </a:solidFill>
+              </a:rPr>
+              <a:t>Criar opção de 0 pra sair quando iniciado o cadastro;</a:t>
+            </a:r>
+          </a:p>
+          <a:p>
+            <a:pPr marL="342900" indent="-342900" algn="just">
+              <a:lnSpc>
+                <a:spcPct val="100000"/>
+              </a:lnSpc>
+              <a:spcBef>
+                <a:spcPts val="525"/>
+              </a:spcBef>
+              <a:spcAft>
+                <a:spcPts val="525"/>
+              </a:spcAft>
+              <a:buFont typeface="+mj-lt"/>
+              <a:buAutoNum type="arabicPeriod"/>
+            </a:pPr>
+            <a:r>
+              <a:rPr lang="pt-BR" sz="2000" dirty="0">
+                <a:solidFill>
+                  <a:schemeClr val="tx1"/>
+                </a:solidFill>
+              </a:rPr>
+              <a:t>Criar tabela de log no sistema;</a:t>
+            </a:r>
+          </a:p>
+          <a:p>
+            <a:pPr marL="342900" indent="-342900" algn="just">
+              <a:lnSpc>
+                <a:spcPct val="110000"/>
+              </a:lnSpc>
+              <a:spcBef>
+                <a:spcPts val="525"/>
+              </a:spcBef>
+              <a:spcAft>
+                <a:spcPts val="525"/>
+              </a:spcAft>
+              <a:buFont typeface="+mj-lt"/>
+              <a:buAutoNum type="arabicPeriod"/>
+            </a:pPr>
+            <a:r>
+              <a:rPr lang="pt-BR" sz="2000" dirty="0">
+                <a:solidFill>
+                  <a:schemeClr val="tx1"/>
+                </a:solidFill>
+              </a:rPr>
+              <a:t>Esconder a senha digitada;</a:t>
+            </a:r>
+          </a:p>
+          <a:p>
+            <a:pPr marL="342900" indent="-342900" algn="just">
+              <a:lnSpc>
+                <a:spcPct val="110000"/>
+              </a:lnSpc>
+              <a:spcBef>
+                <a:spcPts val="525"/>
+              </a:spcBef>
+              <a:spcAft>
+                <a:spcPts val="525"/>
+              </a:spcAft>
+              <a:buFont typeface="+mj-lt"/>
+              <a:buAutoNum type="arabicPeriod"/>
+            </a:pPr>
+            <a:r>
+              <a:rPr lang="pt-BR" sz="2000" dirty="0">
+                <a:solidFill>
+                  <a:schemeClr val="tx1"/>
+                </a:solidFill>
+              </a:rPr>
+              <a:t>Exportar relatório para PDF;</a:t>
+            </a:r>
+          </a:p>
+          <a:p>
+            <a:pPr marL="342900" indent="-342900" algn="just">
+              <a:lnSpc>
+                <a:spcPct val="100000"/>
+              </a:lnSpc>
+              <a:spcBef>
+                <a:spcPts val="525"/>
+              </a:spcBef>
+              <a:spcAft>
+                <a:spcPts val="525"/>
+              </a:spcAft>
+              <a:buFont typeface="+mj-lt"/>
+              <a:buAutoNum type="arabicPeriod"/>
+            </a:pPr>
+            <a:endParaRPr lang="pt-BR" sz="2000" dirty="0">
+              <a:solidFill>
+                <a:schemeClr val="tx1"/>
+              </a:solidFill>
+            </a:endParaRPr>
+          </a:p>
+          <a:p>
+            <a:pPr marL="342900" indent="-342900" algn="just">
+              <a:lnSpc>
+                <a:spcPct val="100000"/>
+              </a:lnSpc>
+              <a:spcBef>
+                <a:spcPts val="525"/>
+              </a:spcBef>
+              <a:spcAft>
+                <a:spcPts val="525"/>
+              </a:spcAft>
+              <a:buFont typeface="+mj-lt"/>
+              <a:buAutoNum type="arabicPeriod"/>
+            </a:pPr>
+            <a:endParaRPr lang="pt-BR" sz="2400" dirty="0">
+              <a:solidFill>
+                <a:srgbClr val="BCBEC4"/>
+              </a:solidFill>
+              <a:effectLst/>
+            </a:endParaRPr>
+          </a:p>
+          <a:p>
+            <a:pPr marL="342900" indent="-342900" algn="just">
+              <a:lnSpc>
+                <a:spcPct val="100000"/>
+              </a:lnSpc>
+              <a:spcBef>
+                <a:spcPts val="525"/>
+              </a:spcBef>
+              <a:spcAft>
+                <a:spcPts val="525"/>
+              </a:spcAft>
+              <a:buFont typeface="+mj-lt"/>
+              <a:buAutoNum type="arabicPeriod"/>
+            </a:pPr>
+            <a:endParaRPr lang="pt-BR" sz="2000" dirty="0">
+              <a:solidFill>
+                <a:schemeClr val="tx1"/>
+              </a:solidFill>
+            </a:endParaRPr>
+          </a:p>
           <a:p>
             <a:pPr marL="342900" indent="-342900" algn="just">
               <a:spcBef>
@@ -12006,58 +12375,6 @@
               <a:buFont typeface="+mj-lt"/>
               <a:buAutoNum type="arabicPeriod"/>
             </a:pPr>
-            <a:r>
-              <a:rPr lang="pt-BR" sz="1800" dirty="0">
-                <a:solidFill>
-                  <a:srgbClr val="444444"/>
-                </a:solidFill>
-                <a:effectLst/>
-                <a:latin typeface="Open Sans" panose="020B0606030504020204" pitchFamily="34" charset="0"/>
-                <a:ea typeface="Times New Roman" panose="02020603050405020304" pitchFamily="18" charset="0"/>
-              </a:rPr>
-              <a:t>Criação do módulo financeiro;</a:t>
-            </a:r>
-          </a:p>
-          <a:p>
-            <a:pPr marL="342900" indent="-342900" algn="just">
-              <a:spcBef>
-                <a:spcPts val="1125"/>
-              </a:spcBef>
-              <a:spcAft>
-                <a:spcPts val="1125"/>
-              </a:spcAft>
-              <a:buFont typeface="+mj-lt"/>
-              <a:buAutoNum type="arabicPeriod"/>
-            </a:pPr>
-            <a:r>
-              <a:rPr lang="pt-BR" sz="2000" dirty="0">
-                <a:solidFill>
-                  <a:schemeClr val="tx1"/>
-                </a:solidFill>
-                <a:effectLst/>
-              </a:rPr>
-              <a:t>Verificação no banco se o registro já existe;</a:t>
-            </a:r>
-          </a:p>
-          <a:p>
-            <a:pPr marL="342900" indent="-342900" algn="just">
-              <a:spcBef>
-                <a:spcPts val="1125"/>
-              </a:spcBef>
-              <a:spcAft>
-                <a:spcPts val="1125"/>
-              </a:spcAft>
-              <a:buFont typeface="+mj-lt"/>
-              <a:buAutoNum type="arabicPeriod"/>
-            </a:pPr>
-            <a:r>
-              <a:rPr lang="pt-BR" sz="2000" dirty="0">
-                <a:solidFill>
-                  <a:schemeClr val="tx1"/>
-                </a:solidFill>
-              </a:rPr>
-              <a:t>Criar função esconder senha digitada;</a:t>
-            </a:r>
             <a:endParaRPr lang="pt-BR" sz="2000" dirty="0">
               <a:solidFill>
                 <a:schemeClr val="tx1"/>
@@ -12149,59 +12466,53 @@
           </a:p>
         </p:txBody>
       </p:sp>
-      <p:sp>
-        <p:nvSpPr>
-          <p:cNvPr id="4" name="Símbolo de &quot;Não&quot; 3">
-            <a:extLst>
-              <a:ext uri="{FF2B5EF4-FFF2-40B4-BE49-F238E27FC236}">
-                <a16:creationId xmlns:a16="http://schemas.microsoft.com/office/drawing/2014/main" id="{ADE6CEB2-111A-B95C-0386-DFC9EA8F44C9}"/>
-              </a:ext>
-            </a:extLst>
-          </p:cNvPr>
-          <p:cNvSpPr/>
+      <p:pic>
+        <p:nvPicPr>
+          <p:cNvPr id="1026" name="Picture 2" descr="Promove">
+            <a:extLst>
+              <a:ext uri="{FF2B5EF4-FFF2-40B4-BE49-F238E27FC236}">
+                <a16:creationId xmlns:a16="http://schemas.microsoft.com/office/drawing/2014/main" id="{DFF58960-CBFD-13E7-19AE-90101DA57254}"/>
+              </a:ext>
+            </a:extLst>
+          </p:cNvPr>
+          <p:cNvPicPr>
+            <a:picLocks noChangeAspect="1" noChangeArrowheads="1"/>
+          </p:cNvPicPr>
           <p:nvPr/>
-        </p:nvSpPr>
-        <p:spPr>
+        </p:nvPicPr>
+        <p:blipFill>
+          <a:blip r:embed="rId2">
+            <a:extLst>
+              <a:ext uri="{28A0092B-C50C-407E-A947-70E740481C1C}">
+                <a14:useLocalDpi xmlns:a14="http://schemas.microsoft.com/office/drawing/2010/main" val="0"/>
+              </a:ext>
+            </a:extLst>
+          </a:blip>
+          <a:srcRect/>
+          <a:stretch>
+            <a:fillRect/>
+          </a:stretch>
+        </p:blipFill>
+        <p:spPr bwMode="auto">
           <a:xfrm>
-            <a:off x="8001000" y="3162300"/>
-            <a:ext cx="3060700" cy="2349500"/>
+            <a:off x="8946024" y="1311275"/>
+            <a:ext cx="2839576" cy="2129682"/>
           </a:xfrm>
-          <a:prstGeom prst="noSmoking">
+          <a:prstGeom prst="rect">
             <a:avLst/>
           </a:prstGeom>
-          <a:solidFill>
-            <a:schemeClr val="accent2"/>
-          </a:solidFill>
+          <a:noFill/>
+          <a:extLst>
+            <a:ext uri="{909E8E84-426E-40DD-AFC4-6F175D3DCCD1}">
+              <a14:hiddenFill xmlns:a14="http://schemas.microsoft.com/office/drawing/2010/main">
+                <a:solidFill>
+                  <a:srgbClr val="FFFFFF"/>
+                </a:solidFill>
+              </a14:hiddenFill>
+            </a:ext>
+          </a:extLst>
         </p:spPr>
-        <p:style>
-          <a:lnRef idx="2">
-            <a:schemeClr val="accent1">
-              <a:shade val="15000"/>
-            </a:schemeClr>
-          </a:lnRef>
-          <a:fillRef idx="1">
-            <a:schemeClr val="accent1"/>
-          </a:fillRef>
-          <a:effectRef idx="0">
-            <a:schemeClr val="accent1"/>
-          </a:effectRef>
-          <a:fontRef idx="minor">
-            <a:schemeClr val="lt1"/>
-          </a:fontRef>
-        </p:style>
-        <p:txBody>
-          <a:bodyPr rtlCol="0" anchor="ctr"/>
-          <a:lstStyle/>
-          <a:p>
-            <a:pPr algn="ctr"/>
-            <a:endParaRPr lang="pt-BR">
-              <a:solidFill>
-                <a:schemeClr val="tx1"/>
-              </a:solidFill>
-            </a:endParaRPr>
-          </a:p>
-        </p:txBody>
-      </p:sp>
+      </p:pic>
     </p:spTree>
     <p:extLst>
       <p:ext uri="{BB962C8B-B14F-4D97-AF65-F5344CB8AC3E}">
@@ -13508,126 +13819,105 @@
       </p:grpSpPr>
       <p:sp>
         <p:nvSpPr>
-          <p:cNvPr id="2" name="Título 1">
-            <a:extLst>
-              <a:ext uri="{FF2B5EF4-FFF2-40B4-BE49-F238E27FC236}">
-                <a16:creationId xmlns:a16="http://schemas.microsoft.com/office/drawing/2014/main" id="{8C753BDE-13E8-CB66-E6AD-F44CEA8B6A90}"/>
-              </a:ext>
-            </a:extLst>
-          </p:cNvPr>
-          <p:cNvSpPr>
-            <a:spLocks noGrp="1"/>
-          </p:cNvSpPr>
-          <p:nvPr>
-            <p:ph type="title"/>
+          <p:cNvPr id="3" name="Espaço Reservado para Conteúdo 2">
+            <a:extLst>
+              <a:ext uri="{FF2B5EF4-FFF2-40B4-BE49-F238E27FC236}">
+                <a16:creationId xmlns:a16="http://schemas.microsoft.com/office/drawing/2014/main" id="{B2C2D533-A922-CE6A-C372-7A2861219EAC}"/>
+              </a:ext>
+            </a:extLst>
+          </p:cNvPr>
+          <p:cNvSpPr>
+            <a:spLocks noGrp="1"/>
+          </p:cNvSpPr>
+          <p:nvPr>
+            <p:ph sz="half" idx="1"/>
           </p:nvPr>
         </p:nvSpPr>
         <p:spPr>
           <a:xfrm>
-            <a:off x="839788" y="820881"/>
-            <a:ext cx="3639312" cy="2062595"/>
+            <a:off x="877825" y="2159175"/>
+            <a:ext cx="3171662" cy="2844653"/>
           </a:xfrm>
         </p:spPr>
         <p:txBody>
-          <a:bodyPr anchor="t">
+          <a:bodyPr>
             <a:normAutofit/>
           </a:bodyPr>
           <a:lstStyle/>
           <a:p>
-            <a:r>
-              <a:rPr lang="pt-BR" b="1" dirty="0"/>
-              <a:t>Modelo lógico</a:t>
-            </a:r>
-            <a:br>
+            <a:pPr marL="285750" indent="-285750">
+              <a:buFont typeface="Arial" panose="020B0604020202020204" pitchFamily="34" charset="0"/>
+              <a:buChar char="•"/>
+            </a:pPr>
+            <a:r>
               <a:rPr lang="pt-BR" dirty="0">
                 <a:effectLst/>
               </a:rPr>
-            </a:br>
-            <a:endParaRPr lang="pt-BR" dirty="0"/>
-          </a:p>
-        </p:txBody>
-      </p:sp>
-      <p:sp>
-        <p:nvSpPr>
-          <p:cNvPr id="3" name="Espaço Reservado para Conteúdo 2">
-            <a:extLst>
-              <a:ext uri="{FF2B5EF4-FFF2-40B4-BE49-F238E27FC236}">
-                <a16:creationId xmlns:a16="http://schemas.microsoft.com/office/drawing/2014/main" id="{B2C2D533-A922-CE6A-C372-7A2861219EAC}"/>
-              </a:ext>
-            </a:extLst>
-          </p:cNvPr>
-          <p:cNvSpPr>
-            <a:spLocks noGrp="1"/>
-          </p:cNvSpPr>
-          <p:nvPr>
-            <p:ph type="body" sz="half" idx="2"/>
-          </p:nvPr>
-        </p:nvSpPr>
-        <p:spPr>
-          <a:xfrm>
-            <a:off x="837499" y="2260601"/>
-            <a:ext cx="3643889" cy="2247900"/>
-          </a:xfrm>
-        </p:spPr>
-        <p:txBody>
-          <a:bodyPr anchor="b">
-            <a:normAutofit/>
-          </a:bodyPr>
-          <a:lstStyle/>
+              <a:t>O objetivo é a modelagem do banco de dados sua entidade </a:t>
+            </a:r>
+            <a:r>
+              <a:rPr lang="pt-BR" dirty="0"/>
+              <a:t>de relacionamento em termos de regras logicas e de negócio.</a:t>
+            </a:r>
+            <a:endParaRPr lang="pt-BR" dirty="0">
+              <a:effectLst/>
+            </a:endParaRPr>
+          </a:p>
           <a:p>
             <a:pPr marL="285750" indent="-285750">
-              <a:lnSpc>
-                <a:spcPct val="110000"/>
-              </a:lnSpc>
               <a:buFont typeface="Arial" panose="020B0604020202020204" pitchFamily="34" charset="0"/>
               <a:buChar char="•"/>
             </a:pPr>
             <a:r>
-              <a:rPr lang="pt-BR" sz="1500" dirty="0">
-                <a:effectLst/>
-              </a:rPr>
-              <a:t>O objetivo é a modelagem do banco de dados sua entidade </a:t>
-            </a:r>
-            <a:r>
-              <a:rPr lang="pt-BR" sz="1500" dirty="0"/>
-              <a:t>de relacionamento em termos de regras logicas e de negócio.</a:t>
-            </a:r>
-            <a:endParaRPr lang="pt-BR" sz="1500" dirty="0">
-              <a:effectLst/>
-            </a:endParaRPr>
-          </a:p>
-          <a:p>
-            <a:pPr marL="285750" indent="-285750">
-              <a:lnSpc>
-                <a:spcPct val="110000"/>
-              </a:lnSpc>
-              <a:buFont typeface="Arial" panose="020B0604020202020204" pitchFamily="34" charset="0"/>
-              <a:buChar char="•"/>
-            </a:pPr>
-            <a:r>
-              <a:rPr lang="pt-BR" sz="1500" dirty="0">
+              <a:rPr lang="pt-BR" dirty="0">
                 <a:effectLst/>
               </a:rPr>
               <a:t>Neste </a:t>
             </a:r>
             <a:r>
-              <a:rPr lang="pt-BR" sz="1500" dirty="0"/>
+              <a:rPr lang="pt-BR" dirty="0"/>
               <a:t>fluxo percebemos o esquema do banco onde as entidades se conectam.</a:t>
             </a:r>
-            <a:endParaRPr lang="pt-BR" sz="1500" dirty="0">
+            <a:endParaRPr lang="pt-BR" dirty="0">
               <a:effectLst/>
             </a:endParaRPr>
           </a:p>
           <a:p>
-            <a:pPr>
-              <a:lnSpc>
-                <a:spcPct val="110000"/>
-              </a:lnSpc>
-            </a:pPr>
-            <a:endParaRPr lang="pt-BR" sz="1500" dirty="0"/>
-          </a:p>
-        </p:txBody>
-      </p:sp>
+            <a:endParaRPr lang="pt-BR" dirty="0"/>
+          </a:p>
+        </p:txBody>
+      </p:sp>
+      <p:pic>
+        <p:nvPicPr>
+          <p:cNvPr id="7" name="Imagem 6" descr="Diagrama, Esquemático&#10;&#10;Descrição gerada automaticamente">
+            <a:extLst>
+              <a:ext uri="{FF2B5EF4-FFF2-40B4-BE49-F238E27FC236}">
+                <a16:creationId xmlns:a16="http://schemas.microsoft.com/office/drawing/2014/main" id="{157182F0-D815-5541-FE59-C18ACA2702B0}"/>
+              </a:ext>
+            </a:extLst>
+          </p:cNvPr>
+          <p:cNvPicPr>
+            <a:picLocks noChangeAspect="1"/>
+          </p:cNvPicPr>
+          <p:nvPr/>
+        </p:nvPicPr>
+        <p:blipFill>
+          <a:blip r:embed="rId2"/>
+          <a:stretch>
+            <a:fillRect/>
+          </a:stretch>
+        </p:blipFill>
+        <p:spPr>
+          <a:xfrm>
+            <a:off x="4049487" y="320634"/>
+            <a:ext cx="7901720" cy="6035716"/>
+          </a:xfrm>
+          <a:prstGeom prst="rect">
+            <a:avLst/>
+          </a:prstGeom>
+          <a:noFill/>
+        </p:spPr>
+      </p:pic>
       <p:sp>
         <p:nvSpPr>
           <p:cNvPr id="6" name="Espaço Reservado para Número de Slide 5">
@@ -13676,70 +13966,123 @@
       </p:sp>
       <p:sp>
         <p:nvSpPr>
-          <p:cNvPr id="8" name="Símbolo de &quot;Não&quot; 7">
-            <a:extLst>
-              <a:ext uri="{FF2B5EF4-FFF2-40B4-BE49-F238E27FC236}">
-                <a16:creationId xmlns:a16="http://schemas.microsoft.com/office/drawing/2014/main" id="{68177546-98DB-5DA5-FFB8-A9B3C7281285}"/>
-              </a:ext>
-            </a:extLst>
-          </p:cNvPr>
-          <p:cNvSpPr/>
+          <p:cNvPr id="10" name="Título 1">
+            <a:extLst>
+              <a:ext uri="{FF2B5EF4-FFF2-40B4-BE49-F238E27FC236}">
+                <a16:creationId xmlns:a16="http://schemas.microsoft.com/office/drawing/2014/main" id="{066EDB4B-2506-D89C-4F45-945D869B6206}"/>
+              </a:ext>
+            </a:extLst>
+          </p:cNvPr>
+          <p:cNvSpPr txBox="1">
+            <a:spLocks/>
+          </p:cNvSpPr>
           <p:nvPr/>
         </p:nvSpPr>
         <p:spPr>
           <a:xfrm>
-            <a:off x="6096000" y="2362200"/>
-            <a:ext cx="4635500" cy="3454400"/>
+            <a:off x="839788" y="820881"/>
+            <a:ext cx="3639312" cy="2062595"/>
           </a:xfrm>
-          <a:prstGeom prst="noSmoking">
+          <a:prstGeom prst="rect">
             <a:avLst/>
           </a:prstGeom>
-          <a:solidFill>
-            <a:schemeClr val="accent2"/>
-          </a:solidFill>
         </p:spPr>
-        <p:style>
-          <a:lnRef idx="2">
-            <a:schemeClr val="accent1">
-              <a:shade val="15000"/>
-            </a:schemeClr>
-          </a:lnRef>
-          <a:fillRef idx="1">
-            <a:schemeClr val="accent1"/>
-          </a:fillRef>
-          <a:effectRef idx="0">
-            <a:schemeClr val="accent1"/>
-          </a:effectRef>
-          <a:fontRef idx="minor">
-            <a:schemeClr val="lt1"/>
-          </a:fontRef>
-        </p:style>
-        <p:txBody>
-          <a:bodyPr rtlCol="0" anchor="ctr"/>
-          <a:lstStyle/>
-          <a:p>
-            <a:pPr algn="ctr"/>
-            <a:endParaRPr lang="pt-BR" b="1">
-              <a:ln w="22225">
+        <p:txBody>
+          <a:bodyPr vert="horz" lIns="91440" tIns="45720" rIns="91440" bIns="45720" rtlCol="0" anchor="t">
+            <a:normAutofit/>
+          </a:bodyPr>
+          <a:lstStyle>
+            <a:lvl1pPr algn="l" defTabSz="914400" rtl="0" eaLnBrk="1" latinLnBrk="0" hangingPunct="1">
+              <a:lnSpc>
+                <a:spcPct val="100000"/>
+              </a:lnSpc>
+              <a:spcBef>
+                <a:spcPct val="0"/>
+              </a:spcBef>
+              <a:buNone/>
+              <a:defRPr sz="3200" kern="1200">
                 <a:solidFill>
-                  <a:schemeClr val="accent2"/>
+                  <a:schemeClr val="tx2"/>
                 </a:solidFill>
-                <a:prstDash val="solid"/>
-              </a:ln>
-              <a:solidFill>
-                <a:schemeClr val="accent2">
-                  <a:lumMod val="40000"/>
-                  <a:lumOff val="60000"/>
-                </a:schemeClr>
-              </a:solidFill>
-            </a:endParaRPr>
+                <a:latin typeface="+mj-lt"/>
+                <a:ea typeface="+mj-ea"/>
+                <a:cs typeface="+mj-cs"/>
+              </a:defRPr>
+            </a:lvl1pPr>
+          </a:lstStyle>
+          <a:p>
+            <a:r>
+              <a:rPr lang="pt-BR" sz="2800" b="1" dirty="0"/>
+              <a:t>Modelo Conceitual</a:t>
+            </a:r>
+            <a:br>
+              <a:rPr lang="pt-BR" dirty="0"/>
+            </a:br>
+            <a:endParaRPr lang="pt-BR" dirty="0"/>
+          </a:p>
+        </p:txBody>
+      </p:sp>
+      <p:sp>
+        <p:nvSpPr>
+          <p:cNvPr id="11" name="Espaço Reservado para Data 3">
+            <a:extLst>
+              <a:ext uri="{FF2B5EF4-FFF2-40B4-BE49-F238E27FC236}">
+                <a16:creationId xmlns:a16="http://schemas.microsoft.com/office/drawing/2014/main" id="{2EBCD5DC-4CD4-FFB2-31B0-CF21EAA4224D}"/>
+              </a:ext>
+            </a:extLst>
+          </p:cNvPr>
+          <p:cNvSpPr>
+            <a:spLocks noGrp="1"/>
+          </p:cNvSpPr>
+          <p:nvPr>
+            <p:ph type="dt" sz="half" idx="10"/>
+          </p:nvPr>
+        </p:nvSpPr>
+        <p:spPr>
+          <a:xfrm>
+            <a:off x="4049487" y="6423024"/>
+            <a:ext cx="4229862" cy="231776"/>
+          </a:xfrm>
+        </p:spPr>
+        <p:txBody>
+          <a:bodyPr anchor="ctr">
+            <a:normAutofit/>
+          </a:bodyPr>
+          <a:lstStyle/>
+          <a:p>
+            <a:pPr>
+              <a:spcAft>
+                <a:spcPts val="600"/>
+              </a:spcAft>
+            </a:pPr>
+            <a:r>
+              <a:rPr lang="en-US" b="1" dirty="0" err="1"/>
+              <a:t>Figura</a:t>
+            </a:r>
+            <a:r>
+              <a:rPr lang="en-US" b="1" dirty="0"/>
+              <a:t> 1- </a:t>
+            </a:r>
+            <a:r>
+              <a:rPr lang="en-US" b="1" dirty="0" err="1"/>
+              <a:t>modelo</a:t>
+            </a:r>
+            <a:r>
+              <a:rPr lang="en-US" b="1" dirty="0"/>
+              <a:t> </a:t>
+            </a:r>
+            <a:r>
+              <a:rPr lang="en-US" b="1" dirty="0" err="1"/>
+              <a:t>conceitual</a:t>
+            </a:r>
+            <a:endParaRPr lang="en-US" b="1" dirty="0"/>
           </a:p>
         </p:txBody>
       </p:sp>
     </p:spTree>
     <p:extLst>
       <p:ext uri="{BB962C8B-B14F-4D97-AF65-F5344CB8AC3E}">
-        <p14:creationId xmlns:p14="http://schemas.microsoft.com/office/powerpoint/2010/main" val="408000674"/>
+        <p14:creationId xmlns:p14="http://schemas.microsoft.com/office/powerpoint/2010/main" val="4056259079"/>
       </p:ext>
     </p:extLst>
   </p:cSld>
@@ -13785,7 +14128,7 @@
         <p:spPr>
           <a:xfrm>
             <a:off x="839788" y="820881"/>
-            <a:ext cx="3871912" cy="2062595"/>
+            <a:ext cx="3639312" cy="2062595"/>
           </a:xfrm>
         </p:spPr>
         <p:txBody>
@@ -13796,7 +14139,7 @@
           <a:p>
             <a:r>
               <a:rPr lang="pt-BR" b="1" dirty="0"/>
-              <a:t>Modelo Conceitual</a:t>
+              <a:t>Modelo lógico</a:t>
             </a:r>
             <a:br>
               <a:rPr lang="pt-BR" dirty="0">
@@ -13825,8 +14168,8 @@
         </p:nvSpPr>
         <p:spPr>
           <a:xfrm>
-            <a:off x="837499" y="2260601"/>
-            <a:ext cx="3643889" cy="2247900"/>
+            <a:off x="532699" y="1559561"/>
+            <a:ext cx="3516787" cy="2247900"/>
           </a:xfrm>
         </p:spPr>
         <p:txBody>
@@ -13846,7 +14189,7 @@
               <a:rPr lang="pt-BR" sz="1500" dirty="0">
                 <a:effectLst/>
               </a:rPr>
-              <a:t>O objetivo é a modelagem do banco de dados sua entidade </a:t>
+              <a:t>O objetivo é a modelagem do banco de dados, sua entidade </a:t>
             </a:r>
             <a:r>
               <a:rPr lang="pt-BR" sz="1500" dirty="0"/>
@@ -13934,72 +14277,97 @@
           </a:p>
         </p:txBody>
       </p:sp>
-      <p:sp>
-        <p:nvSpPr>
-          <p:cNvPr id="5" name="Símbolo de &quot;Não&quot; 4">
-            <a:extLst>
-              <a:ext uri="{FF2B5EF4-FFF2-40B4-BE49-F238E27FC236}">
-                <a16:creationId xmlns:a16="http://schemas.microsoft.com/office/drawing/2014/main" id="{774B1A82-BFB0-C3DD-322E-0BE2CB4FF062}"/>
-              </a:ext>
-            </a:extLst>
-          </p:cNvPr>
-          <p:cNvSpPr/>
+      <p:pic>
+        <p:nvPicPr>
+          <p:cNvPr id="5" name="Imagem 4" descr="Diagrama&#10;&#10;Descrição gerada automaticamente">
+            <a:extLst>
+              <a:ext uri="{FF2B5EF4-FFF2-40B4-BE49-F238E27FC236}">
+                <a16:creationId xmlns:a16="http://schemas.microsoft.com/office/drawing/2014/main" id="{927B72EB-1D1B-7E1F-41EE-314FAE9D270D}"/>
+              </a:ext>
+            </a:extLst>
+          </p:cNvPr>
+          <p:cNvPicPr>
+            <a:picLocks noChangeAspect="1"/>
+          </p:cNvPicPr>
           <p:nvPr/>
-        </p:nvSpPr>
+        </p:nvPicPr>
+        <p:blipFill>
+          <a:blip r:embed="rId2"/>
+          <a:stretch>
+            <a:fillRect/>
+          </a:stretch>
+        </p:blipFill>
         <p:spPr>
           <a:xfrm>
-            <a:off x="6096000" y="2362200"/>
-            <a:ext cx="4635500" cy="3454400"/>
+            <a:off x="4049486" y="350520"/>
+            <a:ext cx="7750460" cy="6072503"/>
           </a:xfrm>
-          <a:prstGeom prst="noSmoking">
+          <a:prstGeom prst="rect">
             <a:avLst/>
           </a:prstGeom>
-          <a:solidFill>
-            <a:schemeClr val="accent2"/>
-          </a:solidFill>
         </p:spPr>
-        <p:style>
-          <a:lnRef idx="2">
-            <a:schemeClr val="accent1">
-              <a:shade val="15000"/>
-            </a:schemeClr>
-          </a:lnRef>
-          <a:fillRef idx="1">
-            <a:schemeClr val="accent1"/>
-          </a:fillRef>
-          <a:effectRef idx="0">
-            <a:schemeClr val="accent1"/>
-          </a:effectRef>
-          <a:fontRef idx="minor">
-            <a:schemeClr val="lt1"/>
-          </a:fontRef>
-        </p:style>
-        <p:txBody>
-          <a:bodyPr rtlCol="0" anchor="ctr"/>
-          <a:lstStyle/>
-          <a:p>
-            <a:pPr algn="ctr"/>
-            <a:endParaRPr lang="pt-BR" b="1">
-              <a:ln w="22225">
-                <a:solidFill>
-                  <a:schemeClr val="accent2"/>
-                </a:solidFill>
-                <a:prstDash val="solid"/>
-              </a:ln>
-              <a:solidFill>
-                <a:schemeClr val="accent2">
-                  <a:lumMod val="40000"/>
-                  <a:lumOff val="60000"/>
-                </a:schemeClr>
-              </a:solidFill>
-            </a:endParaRPr>
+      </p:pic>
+      <p:sp>
+        <p:nvSpPr>
+          <p:cNvPr id="7" name="Espaço Reservado para Data 3">
+            <a:extLst>
+              <a:ext uri="{FF2B5EF4-FFF2-40B4-BE49-F238E27FC236}">
+                <a16:creationId xmlns:a16="http://schemas.microsoft.com/office/drawing/2014/main" id="{2CB833D3-00CD-6436-1037-74D68E3752FC}"/>
+              </a:ext>
+            </a:extLst>
+          </p:cNvPr>
+          <p:cNvSpPr>
+            <a:spLocks noGrp="1"/>
+          </p:cNvSpPr>
+          <p:nvPr>
+            <p:ph type="dt" sz="half" idx="10"/>
+          </p:nvPr>
+        </p:nvSpPr>
+        <p:spPr>
+          <a:xfrm>
+            <a:off x="4049487" y="6423024"/>
+            <a:ext cx="4229862" cy="231776"/>
+          </a:xfrm>
+        </p:spPr>
+        <p:txBody>
+          <a:bodyPr anchor="ctr">
+            <a:normAutofit/>
+          </a:bodyPr>
+          <a:lstStyle/>
+          <a:p>
+            <a:pPr>
+              <a:spcAft>
+                <a:spcPts val="600"/>
+              </a:spcAft>
+            </a:pPr>
+            <a:r>
+              <a:rPr lang="en-US" b="1" dirty="0" err="1"/>
+              <a:t>Figura</a:t>
+            </a:r>
+            <a:r>
+              <a:rPr lang="en-US" b="1" dirty="0"/>
+              <a:t> 2- </a:t>
+            </a:r>
+            <a:r>
+              <a:rPr lang="en-US" b="1" dirty="0" err="1"/>
+              <a:t>modelo</a:t>
+            </a:r>
+            <a:r>
+              <a:rPr lang="en-US" b="1" dirty="0"/>
+              <a:t> </a:t>
+            </a:r>
+            <a:r>
+              <a:rPr lang="en-US" b="1" dirty="0" err="1"/>
+              <a:t>logico</a:t>
+            </a:r>
+            <a:endParaRPr lang="en-US" b="1" dirty="0"/>
           </a:p>
         </p:txBody>
       </p:sp>
     </p:spTree>
     <p:extLst>
       <p:ext uri="{BB962C8B-B14F-4D97-AF65-F5344CB8AC3E}">
-        <p14:creationId xmlns:p14="http://schemas.microsoft.com/office/powerpoint/2010/main" val="4056259079"/>
+        <p14:creationId xmlns:p14="http://schemas.microsoft.com/office/powerpoint/2010/main" val="408000674"/>
       </p:ext>
     </p:extLst>
   </p:cSld>
@@ -14044,8 +14412,8 @@
         </p:nvSpPr>
         <p:spPr>
           <a:xfrm>
-            <a:off x="839788" y="820881"/>
-            <a:ext cx="3871912" cy="2062595"/>
+            <a:off x="484188" y="820881"/>
+            <a:ext cx="3643889" cy="2062595"/>
           </a:xfrm>
         </p:spPr>
         <p:txBody>
@@ -14202,7 +14570,7 @@
         </p:nvSpPr>
         <p:spPr>
           <a:xfrm>
-            <a:off x="4356100" y="6453188"/>
+            <a:off x="4128077" y="6423024"/>
             <a:ext cx="4229862" cy="231776"/>
           </a:xfrm>
         </p:spPr>
@@ -14223,7 +14591,7 @@
             </a:r>
             <a:r>
               <a:rPr lang="en-US" b="1" dirty="0"/>
-              <a:t> 1- </a:t>
+              <a:t> 2- </a:t>
             </a:r>
             <a:r>
               <a:rPr lang="en-US" b="1" dirty="0" err="1"/>
@@ -14266,8 +14634,8 @@
         </p:blipFill>
         <p:spPr>
           <a:xfrm>
-            <a:off x="4356100" y="288924"/>
-            <a:ext cx="7544501" cy="6067426"/>
+            <a:off x="4128078" y="288924"/>
+            <a:ext cx="7772524" cy="6067426"/>
           </a:xfrm>
           <a:prstGeom prst="rect">
             <a:avLst/>
@@ -14323,7 +14691,7 @@
         <p:spPr>
           <a:xfrm>
             <a:off x="839788" y="820881"/>
-            <a:ext cx="3639312" cy="2062595"/>
+            <a:ext cx="3233448" cy="2062595"/>
           </a:xfrm>
         </p:spPr>
         <p:txBody>
@@ -14368,8 +14736,8 @@
         </p:blipFill>
         <p:spPr>
           <a:xfrm>
-            <a:off x="4711700" y="279400"/>
-            <a:ext cx="7137400" cy="6092823"/>
+            <a:off x="4070948" y="279400"/>
+            <a:ext cx="7778152" cy="6092823"/>
           </a:xfrm>
           <a:prstGeom prst="rect">
             <a:avLst/>
@@ -14395,8 +14763,8 @@
         </p:nvSpPr>
         <p:spPr>
           <a:xfrm>
-            <a:off x="837499" y="2260601"/>
-            <a:ext cx="3643889" cy="2247900"/>
+            <a:off x="837500" y="2260601"/>
+            <a:ext cx="3233448" cy="2247900"/>
           </a:xfrm>
         </p:spPr>
         <p:txBody>
@@ -14476,7 +14844,7 @@
         </p:nvSpPr>
         <p:spPr>
           <a:xfrm>
-            <a:off x="4596638" y="6372224"/>
+            <a:off x="4070948" y="6415768"/>
             <a:ext cx="3639312" cy="365125"/>
           </a:xfrm>
         </p:spPr>
@@ -14497,7 +14865,7 @@
             </a:r>
             <a:r>
               <a:rPr lang="en-US" b="1" dirty="0"/>
-              <a:t> 1- </a:t>
+              <a:t> 4- </a:t>
             </a:r>
             <a:r>
               <a:rPr lang="en-US" b="1" dirty="0" err="1"/>
@@ -14756,7 +15124,7 @@
             </a:r>
             <a:r>
               <a:rPr lang="en-US" b="1" dirty="0"/>
-              <a:t> 2 – </a:t>
+              <a:t> 5 – </a:t>
             </a:r>
             <a:r>
               <a:rPr lang="en-US" b="1" dirty="0" err="1"/>
@@ -14814,7 +15182,7 @@
         </p:nvSpPr>
         <p:spPr>
           <a:xfrm>
-            <a:off x="6665843" y="6312808"/>
+            <a:off x="6587185" y="6312808"/>
             <a:ext cx="2743200" cy="365125"/>
           </a:xfrm>
           <a:prstGeom prst="rect">
@@ -14920,12 +15288,8 @@
           </a:lstStyle>
           <a:p>
             <a:r>
-              <a:rPr lang="en-US" b="1" dirty="0" err="1"/>
-              <a:t>Figura</a:t>
-            </a:r>
-            <a:r>
               <a:rPr lang="en-US" b="1" dirty="0"/>
-              <a:t> 3 – TELA DE LOGADO</a:t>
+              <a:t>Figura6 – TELA DE LOGADO</a:t>
             </a:r>
           </a:p>
         </p:txBody>

</xml_diff>